<commit_message>
[update] word latex e aktarildi sekiller ekleniyor
</commit_message>
<xml_diff>
--- a/sunum2.pptx
+++ b/sunum2.pptx
@@ -19,6 +19,7 @@
     <p:sldId id="266" r:id="rId13"/>
     <p:sldId id="267" r:id="rId14"/>
     <p:sldId id="268" r:id="rId15"/>
+    <p:sldId id="270" r:id="rId16"/>
   </p:sldIdLst>
   <p:sldSz cx="9144000" cy="6858000" type="screen4x3"/>
   <p:notesSz cx="6858000" cy="9144000"/>
@@ -779,7 +780,7 @@
             <a:fld id="{1D8BD707-D9CF-40AE-B4C6-C98DA3205C09}" type="datetimeFigureOut">
               <a:rPr lang="en-US" smtClean="0"/>
               <a:pPr/>
-              <a:t>6/3/2015</a:t>
+              <a:t>2/21/2016</a:t>
             </a:fld>
             <a:endParaRPr lang="en-US"/>
           </a:p>
@@ -964,7 +965,7 @@
             <a:fld id="{1D8BD707-D9CF-40AE-B4C6-C98DA3205C09}" type="datetimeFigureOut">
               <a:rPr lang="en-US" smtClean="0"/>
               <a:pPr/>
-              <a:t>6/3/2015</a:t>
+              <a:t>2/21/2016</a:t>
             </a:fld>
             <a:endParaRPr lang="en-US"/>
           </a:p>
@@ -1141,7 +1142,7 @@
             <a:fld id="{1D8BD707-D9CF-40AE-B4C6-C98DA3205C09}" type="datetimeFigureOut">
               <a:rPr lang="en-US" smtClean="0"/>
               <a:pPr/>
-              <a:t>6/3/2015</a:t>
+              <a:t>2/21/2016</a:t>
             </a:fld>
             <a:endParaRPr lang="en-US"/>
           </a:p>
@@ -1308,7 +1309,7 @@
             <a:fld id="{1D8BD707-D9CF-40AE-B4C6-C98DA3205C09}" type="datetimeFigureOut">
               <a:rPr lang="en-US" smtClean="0"/>
               <a:pPr/>
-              <a:t>6/3/2015</a:t>
+              <a:t>2/21/2016</a:t>
             </a:fld>
             <a:endParaRPr lang="en-US"/>
           </a:p>
@@ -1531,7 +1532,7 @@
             <a:fld id="{1D8BD707-D9CF-40AE-B4C6-C98DA3205C09}" type="datetimeFigureOut">
               <a:rPr lang="en-US" smtClean="0"/>
               <a:pPr/>
-              <a:t>6/3/2015</a:t>
+              <a:t>2/21/2016</a:t>
             </a:fld>
             <a:endParaRPr lang="en-US"/>
           </a:p>
@@ -1792,7 +1793,7 @@
             <a:fld id="{1D8BD707-D9CF-40AE-B4C6-C98DA3205C09}" type="datetimeFigureOut">
               <a:rPr lang="en-US" smtClean="0"/>
               <a:pPr/>
-              <a:t>6/3/2015</a:t>
+              <a:t>2/21/2016</a:t>
             </a:fld>
             <a:endParaRPr lang="en-US"/>
           </a:p>
@@ -2198,7 +2199,7 @@
             <a:fld id="{1D8BD707-D9CF-40AE-B4C6-C98DA3205C09}" type="datetimeFigureOut">
               <a:rPr lang="en-US" smtClean="0"/>
               <a:pPr/>
-              <a:t>6/3/2015</a:t>
+              <a:t>2/21/2016</a:t>
             </a:fld>
             <a:endParaRPr lang="en-US"/>
           </a:p>
@@ -2331,7 +2332,7 @@
             <a:fld id="{1D8BD707-D9CF-40AE-B4C6-C98DA3205C09}" type="datetimeFigureOut">
               <a:rPr lang="en-US" smtClean="0"/>
               <a:pPr/>
-              <a:t>6/3/2015</a:t>
+              <a:t>2/21/2016</a:t>
             </a:fld>
             <a:endParaRPr lang="en-US"/>
           </a:p>
@@ -2433,7 +2434,7 @@
             <a:fld id="{1D8BD707-D9CF-40AE-B4C6-C98DA3205C09}" type="datetimeFigureOut">
               <a:rPr lang="en-US" smtClean="0"/>
               <a:pPr/>
-              <a:t>6/3/2015</a:t>
+              <a:t>2/21/2016</a:t>
             </a:fld>
             <a:endParaRPr lang="en-US"/>
           </a:p>
@@ -2680,7 +2681,7 @@
             <a:fld id="{1D8BD707-D9CF-40AE-B4C6-C98DA3205C09}" type="datetimeFigureOut">
               <a:rPr lang="en-US" smtClean="0"/>
               <a:pPr/>
-              <a:t>6/3/2015</a:t>
+              <a:t>2/21/2016</a:t>
             </a:fld>
             <a:endParaRPr lang="en-US"/>
           </a:p>
@@ -2926,7 +2927,7 @@
             <a:fld id="{1D8BD707-D9CF-40AE-B4C6-C98DA3205C09}" type="datetimeFigureOut">
               <a:rPr lang="en-US" smtClean="0"/>
               <a:pPr/>
-              <a:t>6/3/2015</a:t>
+              <a:t>2/21/2016</a:t>
             </a:fld>
             <a:endParaRPr lang="en-US"/>
           </a:p>
@@ -3752,7 +3753,7 @@
             <a:fld id="{1D8BD707-D9CF-40AE-B4C6-C98DA3205C09}" type="datetimeFigureOut">
               <a:rPr lang="en-US" smtClean="0"/>
               <a:pPr/>
-              <a:t>6/3/2015</a:t>
+              <a:t>2/21/2016</a:t>
             </a:fld>
             <a:endParaRPr lang="en-US"/>
           </a:p>
@@ -4783,13 +4784,8 @@
             <a:pPr algn="just"/>
             <a:r>
               <a:rPr lang="tr-TR" dirty="0" smtClean="0"/>
-              <a:t>To increase the bandwith of the controllers, desired setpoints are defined in the velocity domain. </a:t>
+              <a:t>To increase the bandwith of the controllers, desired setpoints are defined in the velocity domain. Velocity setpoints are assumed to have the amplitude proportional with the euclidian distance of each agent to the desired goal state. The direction of these velocity setpoints must have a bearing angle of the line segment drawn from the agent to the goal state. </a:t>
             </a:r>
-            <a:r>
-              <a:rPr lang="tr-TR" dirty="0" smtClean="0"/>
-              <a:t>Velocity setpoints are assumed to have the amplitude proportional with the euclidian distance of each agent to the desired goal state. The direction of these velocity setpoints must have a bearing angle of the line segment drawn from the agent to the goal state. </a:t>
-            </a:r>
-            <a:endParaRPr lang="tr-TR" dirty="0" smtClean="0"/>
           </a:p>
         </p:txBody>
       </p:sp>
@@ -9643,7 +9639,7 @@
 </p:sld>
 </file>
 
-<file path=ppt/slides/slide2.xml><?xml version="1.0" encoding="utf-8"?>
+<file path=ppt/slides/slide15.xml><?xml version="1.0" encoding="utf-8"?>
 <p:sld xmlns:a="http://schemas.openxmlformats.org/drawingml/2006/main" xmlns:r="http://schemas.openxmlformats.org/officeDocument/2006/relationships" xmlns:p="http://schemas.openxmlformats.org/presentationml/2006/main">
   <p:cSld>
     <p:spTree>
@@ -9660,73 +9656,20 @@
           <a:chExt cx="0" cy="0"/>
         </a:xfrm>
       </p:grpSpPr>
-      <p:sp>
-        <p:nvSpPr>
-          <p:cNvPr id="106" name="TextBox 105"/>
-          <p:cNvSpPr txBox="1"/>
-          <p:nvPr/>
-        </p:nvSpPr>
-        <p:spPr>
-          <a:xfrm>
-            <a:off x="2854330" y="609600"/>
-            <a:ext cx="2708270" cy="422310"/>
-          </a:xfrm>
-          <a:prstGeom prst="rect">
-            <a:avLst/>
-          </a:prstGeom>
-          <a:noFill/>
-        </p:spPr>
-        <p:txBody>
-          <a:bodyPr wrap="none" lIns="82945" tIns="41473" rIns="82945" bIns="41473" rtlCol="0">
-            <a:spAutoFit/>
-          </a:bodyPr>
-          <a:lstStyle/>
-          <a:p>
-            <a:r>
-              <a:rPr lang="en-US" sz="2200" b="1" dirty="0" smtClean="0"/>
-              <a:t>SYSTEM DESIGN</a:t>
-            </a:r>
-            <a:endParaRPr lang="tr-TR" sz="2200" b="1" dirty="0"/>
-          </a:p>
-        </p:txBody>
-      </p:sp>
       <p:grpSp>
         <p:nvGrpSpPr>
-          <p:cNvPr id="107" name="Group 106"/>
+          <p:cNvPr id="38" name="Group 37"/>
           <p:cNvGrpSpPr/>
           <p:nvPr/>
         </p:nvGrpSpPr>
         <p:grpSpPr>
           <a:xfrm>
-            <a:off x="195983" y="1166501"/>
-            <a:ext cx="8661457" cy="5310499"/>
-            <a:chOff x="195983" y="1166501"/>
-            <a:chExt cx="8661457" cy="5310499"/>
+            <a:off x="195983" y="1028479"/>
+            <a:ext cx="5941438" cy="2873383"/>
+            <a:chOff x="195983" y="1028479"/>
+            <a:chExt cx="5941438" cy="2873383"/>
           </a:xfrm>
         </p:grpSpPr>
-        <p:sp>
-          <p:nvSpPr>
-            <p:cNvPr id="43" name="TextShape 2"/>
-            <p:cNvSpPr txBox="1"/>
-            <p:nvPr/>
-          </p:nvSpPr>
-          <p:spPr>
-            <a:xfrm>
-              <a:off x="457172" y="2038305"/>
-              <a:ext cx="8228763" cy="3977484"/>
-            </a:xfrm>
-            <a:prstGeom prst="rect">
-              <a:avLst/>
-            </a:prstGeom>
-          </p:spPr>
-          <p:txBody>
-            <a:bodyPr lIns="0" tIns="0" rIns="0" bIns="0"/>
-            <a:lstStyle/>
-            <a:p>
-              <a:endParaRPr/>
-            </a:p>
-          </p:txBody>
-        </p:sp>
         <p:sp>
           <p:nvSpPr>
             <p:cNvPr id="4" name="TextBox 3"/>
@@ -9735,8 +9678,8 @@
           </p:nvSpPr>
           <p:spPr>
             <a:xfrm>
-              <a:off x="2290319" y="1652717"/>
-              <a:ext cx="898560" cy="591587"/>
+              <a:off x="2290319" y="1738176"/>
+              <a:ext cx="1008358" cy="422310"/>
             </a:xfrm>
             <a:prstGeom prst="rect">
               <a:avLst/>
@@ -9985,13 +9928,13 @@
         </p:sp>
         <p:cxnSp>
           <p:nvCxnSpPr>
-            <p:cNvPr id="11" name="Straight Connector 10"/>
+            <p:cNvPr id="10" name="Straight Connector 9"/>
             <p:cNvCxnSpPr/>
             <p:nvPr/>
           </p:nvCxnSpPr>
           <p:spPr>
             <a:xfrm rot="5400000" flipH="1" flipV="1">
-              <a:off x="4640370" y="2203410"/>
+              <a:off x="4640370" y="2220662"/>
               <a:ext cx="553018" cy="1440"/>
             </a:xfrm>
             <a:prstGeom prst="line">
@@ -10016,13 +9959,13 @@
         </p:cxnSp>
         <p:cxnSp>
           <p:nvCxnSpPr>
-            <p:cNvPr id="13" name="Straight Arrow Connector 12"/>
+            <p:cNvPr id="11" name="Straight Arrow Connector 10"/>
             <p:cNvCxnSpPr/>
             <p:nvPr/>
           </p:nvCxnSpPr>
           <p:spPr>
             <a:xfrm rot="10800000">
-              <a:off x="4709519" y="1926900"/>
+              <a:off x="4709519" y="1944152"/>
               <a:ext cx="207360" cy="1441"/>
             </a:xfrm>
             <a:prstGeom prst="straightConnector1">
@@ -10049,7 +9992,7 @@
         </p:cxnSp>
         <p:cxnSp>
           <p:nvCxnSpPr>
-            <p:cNvPr id="15" name="Straight Arrow Connector 14"/>
+            <p:cNvPr id="12" name="Straight Arrow Connector 11"/>
             <p:cNvCxnSpPr>
               <a:stCxn id="5" idx="1"/>
               <a:endCxn id="4" idx="3"/>
@@ -10058,8 +10001,8 @@
           </p:nvCxnSpPr>
           <p:spPr>
             <a:xfrm rot="10800000" flipV="1">
-              <a:off x="3188879" y="1947009"/>
-              <a:ext cx="527040" cy="1501"/>
+              <a:off x="3298677" y="1947009"/>
+              <a:ext cx="417242" cy="2321"/>
             </a:xfrm>
             <a:prstGeom prst="straightConnector1">
               <a:avLst/>
@@ -10085,7 +10028,7 @@
         </p:cxnSp>
         <p:cxnSp>
           <p:nvCxnSpPr>
-            <p:cNvPr id="20" name="Straight Connector 19"/>
+            <p:cNvPr id="13" name="Straight Connector 12"/>
             <p:cNvCxnSpPr/>
             <p:nvPr/>
           </p:nvCxnSpPr>
@@ -10116,7 +10059,7 @@
         </p:cxnSp>
         <p:cxnSp>
           <p:nvCxnSpPr>
-            <p:cNvPr id="22" name="Straight Arrow Connector 21"/>
+            <p:cNvPr id="14" name="Straight Arrow Connector 13"/>
             <p:cNvCxnSpPr/>
             <p:nvPr/>
           </p:nvCxnSpPr>
@@ -10149,13 +10092,13 @@
         </p:cxnSp>
         <p:cxnSp>
           <p:nvCxnSpPr>
-            <p:cNvPr id="26" name="Straight Connector 25"/>
+            <p:cNvPr id="15" name="Straight Connector 14"/>
             <p:cNvCxnSpPr/>
             <p:nvPr/>
           </p:nvCxnSpPr>
           <p:spPr>
             <a:xfrm flipV="1">
-              <a:off x="4916879" y="2549046"/>
+              <a:off x="4916879" y="2566298"/>
               <a:ext cx="138240" cy="71152"/>
             </a:xfrm>
             <a:prstGeom prst="line">
@@ -10180,13 +10123,13 @@
         </p:cxnSp>
         <p:cxnSp>
           <p:nvCxnSpPr>
-            <p:cNvPr id="29" name="Straight Connector 28"/>
+            <p:cNvPr id="16" name="Straight Connector 15"/>
             <p:cNvCxnSpPr/>
             <p:nvPr/>
           </p:nvCxnSpPr>
           <p:spPr>
             <a:xfrm rot="5400000">
-              <a:off x="4536679" y="2998373"/>
+              <a:off x="4536679" y="3015625"/>
               <a:ext cx="760400" cy="1440"/>
             </a:xfrm>
             <a:prstGeom prst="line">
@@ -10211,16 +10154,16 @@
         </p:cxnSp>
         <p:cxnSp>
           <p:nvCxnSpPr>
-            <p:cNvPr id="31" name="Straight Connector 30"/>
+            <p:cNvPr id="17" name="Straight Connector 16"/>
             <p:cNvCxnSpPr>
               <a:stCxn id="7" idx="3"/>
             </p:cNvCxnSpPr>
             <p:nvPr/>
           </p:nvCxnSpPr>
           <p:spPr>
-            <a:xfrm flipV="1">
-              <a:off x="3672719" y="3378574"/>
-              <a:ext cx="1244160" cy="26978"/>
+            <a:xfrm>
+              <a:off x="3672719" y="3405552"/>
+              <a:ext cx="1244338" cy="1882"/>
             </a:xfrm>
             <a:prstGeom prst="line">
               <a:avLst/>
@@ -10242,60 +10185,16 @@
             </a:fontRef>
           </p:style>
         </p:cxnSp>
-        <p:sp>
-          <p:nvSpPr>
-            <p:cNvPr id="35" name="TextBox 34"/>
-            <p:cNvSpPr txBox="1"/>
-            <p:nvPr/>
-          </p:nvSpPr>
-          <p:spPr>
-            <a:xfrm>
-              <a:off x="6299279" y="3067500"/>
-              <a:ext cx="967680" cy="606976"/>
-            </a:xfrm>
-            <a:prstGeom prst="rect">
-              <a:avLst/>
-            </a:prstGeom>
-            <a:noFill/>
-            <a:ln w="15875">
-              <a:solidFill>
-                <a:schemeClr val="accent1">
-                  <a:shade val="95000"/>
-                  <a:satMod val="105000"/>
-                </a:schemeClr>
-              </a:solidFill>
-            </a:ln>
-          </p:spPr>
-          <p:txBody>
-            <a:bodyPr wrap="square" lIns="82945" tIns="41473" rIns="82945" bIns="41473" rtlCol="0">
-              <a:spAutoFit/>
-            </a:bodyPr>
-            <a:lstStyle/>
-            <a:p>
-              <a:pPr algn="ctr"/>
-              <a:r>
-                <a:rPr lang="en-US" sz="1100" dirty="0" smtClean="0"/>
-                <a:t>Formation Control</a:t>
-              </a:r>
-            </a:p>
-            <a:p>
-              <a:pPr algn="ctr"/>
-              <a:endParaRPr lang="tr-TR" sz="1100" dirty="0"/>
-            </a:p>
-          </p:txBody>
-        </p:sp>
         <p:cxnSp>
           <p:nvCxnSpPr>
-            <p:cNvPr id="37" name="Straight Arrow Connector 36"/>
-            <p:cNvCxnSpPr>
-              <a:endCxn id="35" idx="1"/>
-            </p:cNvCxnSpPr>
+            <p:cNvPr id="18" name="Straight Arrow Connector 17"/>
+            <p:cNvCxnSpPr/>
             <p:nvPr/>
           </p:nvCxnSpPr>
           <p:spPr>
-            <a:xfrm flipV="1">
-              <a:off x="4916879" y="3370988"/>
-              <a:ext cx="1382400" cy="7585"/>
+            <a:xfrm>
+              <a:off x="2152079" y="3516827"/>
+              <a:ext cx="552960" cy="1441"/>
             </a:xfrm>
             <a:prstGeom prst="straightConnector1">
               <a:avLst/>
@@ -10321,14 +10220,14 @@
         </p:cxnSp>
         <p:sp>
           <p:nvSpPr>
-            <p:cNvPr id="41" name="TextBox 40"/>
+            <p:cNvPr id="19" name="TextBox 18"/>
             <p:cNvSpPr txBox="1"/>
             <p:nvPr/>
           </p:nvSpPr>
           <p:spPr>
             <a:xfrm>
-              <a:off x="5625083" y="4346355"/>
-              <a:ext cx="768637" cy="406921"/>
+              <a:off x="1232784" y="1629653"/>
+              <a:ext cx="1045957" cy="191478"/>
             </a:xfrm>
             <a:prstGeom prst="rect">
               <a:avLst/>
@@ -10343,30 +10242,23 @@
             <a:p>
               <a:pPr algn="ctr"/>
               <a:r>
-                <a:rPr lang="en-US" sz="1000" dirty="0" smtClean="0"/>
-                <a:t>Formation</a:t>
+                <a:rPr lang="en-US" sz="700" b="1" dirty="0" smtClean="0"/>
+                <a:t>Ultrasonic Sensors</a:t>
               </a:r>
-            </a:p>
-            <a:p>
-              <a:pPr algn="ctr"/>
-              <a:r>
-                <a:rPr lang="en-US" sz="1000" dirty="0" smtClean="0"/>
-                <a:t>Shape</a:t>
-              </a:r>
-              <a:endParaRPr lang="tr-TR" sz="1000" dirty="0"/>
+              <a:endParaRPr lang="tr-TR" sz="700" b="1" dirty="0"/>
             </a:p>
           </p:txBody>
         </p:sp>
         <p:cxnSp>
           <p:nvCxnSpPr>
-            <p:cNvPr id="45" name="Straight Arrow Connector 44"/>
+            <p:cNvPr id="20" name="Straight Arrow Connector 19"/>
             <p:cNvCxnSpPr/>
             <p:nvPr/>
           </p:nvCxnSpPr>
           <p:spPr>
-            <a:xfrm rot="16200000" flipV="1">
-              <a:off x="6342435" y="4113051"/>
-              <a:ext cx="872732" cy="8640"/>
+            <a:xfrm>
+              <a:off x="1460879" y="1788646"/>
+              <a:ext cx="829440" cy="1441"/>
             </a:xfrm>
             <a:prstGeom prst="straightConnector1">
               <a:avLst/>
@@ -10390,16 +10282,46 @@
             </a:fontRef>
           </p:style>
         </p:cxnSp>
+        <p:sp>
+          <p:nvSpPr>
+            <p:cNvPr id="21" name="TextBox 20"/>
+            <p:cNvSpPr txBox="1"/>
+            <p:nvPr/>
+          </p:nvSpPr>
+          <p:spPr>
+            <a:xfrm>
+              <a:off x="2695108" y="1028479"/>
+              <a:ext cx="2073600" cy="283811"/>
+            </a:xfrm>
+            <a:prstGeom prst="rect">
+              <a:avLst/>
+            </a:prstGeom>
+            <a:noFill/>
+          </p:spPr>
+          <p:txBody>
+            <a:bodyPr wrap="square" lIns="82945" tIns="41473" rIns="82945" bIns="41473" rtlCol="0">
+              <a:spAutoFit/>
+            </a:bodyPr>
+            <a:lstStyle/>
+            <a:p>
+              <a:r>
+                <a:rPr lang="en-US" sz="1300" dirty="0" smtClean="0"/>
+                <a:t>LOCAL POSITIONING</a:t>
+              </a:r>
+              <a:endParaRPr lang="tr-TR" sz="1300" dirty="0"/>
+            </a:p>
+          </p:txBody>
+        </p:sp>
         <p:cxnSp>
           <p:nvCxnSpPr>
-            <p:cNvPr id="48" name="Straight Connector 47"/>
+            <p:cNvPr id="22" name="Straight Connector 21"/>
             <p:cNvCxnSpPr/>
             <p:nvPr/>
           </p:nvCxnSpPr>
           <p:spPr>
             <a:xfrm>
-              <a:off x="6230159" y="4553736"/>
-              <a:ext cx="552960" cy="1441"/>
+              <a:off x="2113472" y="2130725"/>
+              <a:ext cx="181154" cy="1588"/>
             </a:xfrm>
             <a:prstGeom prst="line">
               <a:avLst/>
@@ -10421,218 +10343,9 @@
             </a:fontRef>
           </p:style>
         </p:cxnSp>
-        <p:sp>
-          <p:nvSpPr>
-            <p:cNvPr id="49" name="TextBox 48"/>
-            <p:cNvSpPr txBox="1"/>
-            <p:nvPr/>
-          </p:nvSpPr>
-          <p:spPr>
-            <a:xfrm>
-              <a:off x="7681679" y="3067500"/>
-              <a:ext cx="967680" cy="591587"/>
-            </a:xfrm>
-            <a:prstGeom prst="rect">
-              <a:avLst/>
-            </a:prstGeom>
-            <a:noFill/>
-            <a:ln w="15875">
-              <a:solidFill>
-                <a:schemeClr val="accent1">
-                  <a:shade val="95000"/>
-                  <a:satMod val="105000"/>
-                </a:schemeClr>
-              </a:solidFill>
-            </a:ln>
-          </p:spPr>
-          <p:txBody>
-            <a:bodyPr wrap="square" lIns="82945" tIns="41473" rIns="82945" bIns="41473" rtlCol="0">
-              <a:spAutoFit/>
-            </a:bodyPr>
-            <a:lstStyle/>
-            <a:p>
-              <a:pPr algn="ctr"/>
-              <a:r>
-                <a:rPr lang="en-US" sz="1100" dirty="0" smtClean="0"/>
-                <a:t>Agent </a:t>
-              </a:r>
-            </a:p>
-            <a:p>
-              <a:pPr algn="ctr"/>
-              <a:r>
-                <a:rPr lang="en-US" sz="1100" dirty="0" smtClean="0"/>
-                <a:t>Dynamics</a:t>
-              </a:r>
-            </a:p>
-            <a:p>
-              <a:pPr algn="ctr"/>
-              <a:endParaRPr lang="tr-TR" sz="1100" dirty="0"/>
-            </a:p>
-          </p:txBody>
-        </p:sp>
         <p:cxnSp>
           <p:nvCxnSpPr>
-            <p:cNvPr id="51" name="Straight Arrow Connector 50"/>
-            <p:cNvCxnSpPr>
-              <a:stCxn id="35" idx="3"/>
-              <a:endCxn id="49" idx="1"/>
-            </p:cNvCxnSpPr>
-            <p:nvPr/>
-          </p:nvCxnSpPr>
-          <p:spPr>
-            <a:xfrm flipV="1">
-              <a:off x="7266959" y="3363294"/>
-              <a:ext cx="414720" cy="7694"/>
-            </a:xfrm>
-            <a:prstGeom prst="straightConnector1">
-              <a:avLst/>
-            </a:prstGeom>
-            <a:ln w="15875">
-              <a:tailEnd type="arrow"/>
-            </a:ln>
-          </p:spPr>
-          <p:style>
-            <a:lnRef idx="1">
-              <a:schemeClr val="accent1"/>
-            </a:lnRef>
-            <a:fillRef idx="0">
-              <a:schemeClr val="accent1"/>
-            </a:fillRef>
-            <a:effectRef idx="0">
-              <a:schemeClr val="accent1"/>
-            </a:effectRef>
-            <a:fontRef idx="minor">
-              <a:schemeClr val="tx1"/>
-            </a:fontRef>
-          </p:style>
-        </p:cxnSp>
-        <p:cxnSp>
-          <p:nvCxnSpPr>
-            <p:cNvPr id="61" name="Straight Connector 60"/>
-            <p:cNvCxnSpPr/>
-            <p:nvPr/>
-          </p:nvCxnSpPr>
-          <p:spPr>
-            <a:xfrm rot="10800000">
-              <a:off x="8649359" y="3355532"/>
-              <a:ext cx="207360" cy="1441"/>
-            </a:xfrm>
-            <a:prstGeom prst="line">
-              <a:avLst/>
-            </a:prstGeom>
-            <a:ln w="15875"/>
-          </p:spPr>
-          <p:style>
-            <a:lnRef idx="1">
-              <a:schemeClr val="accent1"/>
-            </a:lnRef>
-            <a:fillRef idx="0">
-              <a:schemeClr val="accent1"/>
-            </a:fillRef>
-            <a:effectRef idx="0">
-              <a:schemeClr val="accent1"/>
-            </a:effectRef>
-            <a:fontRef idx="minor">
-              <a:schemeClr val="tx1"/>
-            </a:fontRef>
-          </p:style>
-        </p:cxnSp>
-        <p:cxnSp>
-          <p:nvCxnSpPr>
-            <p:cNvPr id="63" name="Straight Connector 62"/>
-            <p:cNvCxnSpPr/>
-            <p:nvPr/>
-          </p:nvCxnSpPr>
-          <p:spPr>
-            <a:xfrm rot="5400000">
-              <a:off x="8061756" y="4152078"/>
-              <a:ext cx="1589927" cy="1440"/>
-            </a:xfrm>
-            <a:prstGeom prst="line">
-              <a:avLst/>
-            </a:prstGeom>
-            <a:ln w="15875"/>
-          </p:spPr>
-          <p:style>
-            <a:lnRef idx="1">
-              <a:schemeClr val="accent1"/>
-            </a:lnRef>
-            <a:fillRef idx="0">
-              <a:schemeClr val="accent1"/>
-            </a:fillRef>
-            <a:effectRef idx="0">
-              <a:schemeClr val="accent1"/>
-            </a:effectRef>
-            <a:fontRef idx="minor">
-              <a:schemeClr val="tx1"/>
-            </a:fontRef>
-          </p:style>
-        </p:cxnSp>
-        <p:cxnSp>
-          <p:nvCxnSpPr>
-            <p:cNvPr id="65" name="Straight Connector 64"/>
-            <p:cNvCxnSpPr/>
-            <p:nvPr/>
-          </p:nvCxnSpPr>
-          <p:spPr>
-            <a:xfrm rot="10800000" flipV="1">
-              <a:off x="216719" y="4949202"/>
-              <a:ext cx="8640000" cy="19298"/>
-            </a:xfrm>
-            <a:prstGeom prst="line">
-              <a:avLst/>
-            </a:prstGeom>
-            <a:ln w="15875"/>
-          </p:spPr>
-          <p:style>
-            <a:lnRef idx="1">
-              <a:schemeClr val="accent1"/>
-            </a:lnRef>
-            <a:fillRef idx="0">
-              <a:schemeClr val="accent1"/>
-            </a:fillRef>
-            <a:effectRef idx="0">
-              <a:schemeClr val="accent1"/>
-            </a:effectRef>
-            <a:fontRef idx="minor">
-              <a:schemeClr val="tx1"/>
-            </a:fontRef>
-          </p:style>
-        </p:cxnSp>
-        <p:cxnSp>
-          <p:nvCxnSpPr>
-            <p:cNvPr id="67" name="Straight Connector 66"/>
-            <p:cNvCxnSpPr/>
-            <p:nvPr/>
-          </p:nvCxnSpPr>
-          <p:spPr>
-            <a:xfrm rot="5400000" flipH="1" flipV="1">
-              <a:off x="-577524" y="4172816"/>
-              <a:ext cx="1589927" cy="1440"/>
-            </a:xfrm>
-            <a:prstGeom prst="line">
-              <a:avLst/>
-            </a:prstGeom>
-            <a:ln w="15875"/>
-          </p:spPr>
-          <p:style>
-            <a:lnRef idx="1">
-              <a:schemeClr val="accent1"/>
-            </a:lnRef>
-            <a:fillRef idx="0">
-              <a:schemeClr val="accent1"/>
-            </a:fillRef>
-            <a:effectRef idx="0">
-              <a:schemeClr val="accent1"/>
-            </a:effectRef>
-            <a:fontRef idx="minor">
-              <a:schemeClr val="tx1"/>
-            </a:fontRef>
-          </p:style>
-        </p:cxnSp>
-        <p:cxnSp>
-          <p:nvCxnSpPr>
-            <p:cNvPr id="69" name="Straight Arrow Connector 68"/>
+            <p:cNvPr id="23" name="Straight Arrow Connector 22"/>
             <p:cNvCxnSpPr/>
             <p:nvPr/>
           </p:nvCxnSpPr>
@@ -10665,7 +10378,7 @@
         </p:cxnSp>
         <p:cxnSp>
           <p:nvCxnSpPr>
-            <p:cNvPr id="73" name="Straight Arrow Connector 72"/>
+            <p:cNvPr id="24" name="Straight Arrow Connector 23"/>
             <p:cNvCxnSpPr/>
             <p:nvPr/>
           </p:nvCxnSpPr>
@@ -10696,42 +10409,9 @@
             </a:fontRef>
           </p:style>
         </p:cxnSp>
-        <p:cxnSp>
-          <p:nvCxnSpPr>
-            <p:cNvPr id="85" name="Straight Arrow Connector 84"/>
-            <p:cNvCxnSpPr/>
-            <p:nvPr/>
-          </p:nvCxnSpPr>
-          <p:spPr>
-            <a:xfrm>
-              <a:off x="2152079" y="3516827"/>
-              <a:ext cx="552960" cy="1441"/>
-            </a:xfrm>
-            <a:prstGeom prst="straightConnector1">
-              <a:avLst/>
-            </a:prstGeom>
-            <a:ln w="15875">
-              <a:tailEnd type="arrow"/>
-            </a:ln>
-          </p:spPr>
-          <p:style>
-            <a:lnRef idx="1">
-              <a:schemeClr val="accent1"/>
-            </a:lnRef>
-            <a:fillRef idx="0">
-              <a:schemeClr val="accent1"/>
-            </a:fillRef>
-            <a:effectRef idx="0">
-              <a:schemeClr val="accent1"/>
-            </a:effectRef>
-            <a:fontRef idx="minor">
-              <a:schemeClr val="tx1"/>
-            </a:fontRef>
-          </p:style>
-        </p:cxnSp>
         <p:sp>
           <p:nvSpPr>
-            <p:cNvPr id="86" name="TextBox 85"/>
+            <p:cNvPr id="25" name="TextBox 24"/>
             <p:cNvSpPr txBox="1"/>
             <p:nvPr/>
           </p:nvSpPr>
@@ -10762,7 +10442,7 @@
         </p:sp>
         <p:sp>
           <p:nvSpPr>
-            <p:cNvPr id="87" name="TextBox 86"/>
+            <p:cNvPr id="26" name="TextBox 25"/>
             <p:cNvSpPr txBox="1"/>
             <p:nvPr/>
           </p:nvSpPr>
@@ -10793,7 +10473,7 @@
         </p:sp>
         <p:cxnSp>
           <p:nvCxnSpPr>
-            <p:cNvPr id="91" name="Straight Arrow Connector 90"/>
+            <p:cNvPr id="27" name="Straight Arrow Connector 26"/>
             <p:cNvCxnSpPr/>
             <p:nvPr/>
           </p:nvCxnSpPr>
@@ -10826,7 +10506,7 @@
         </p:cxnSp>
         <p:sp>
           <p:nvSpPr>
-            <p:cNvPr id="93" name="TextBox 92"/>
+            <p:cNvPr id="28" name="TextBox 27"/>
             <p:cNvSpPr txBox="1"/>
             <p:nvPr/>
           </p:nvSpPr>
@@ -10855,89 +10535,22 @@
             </a:p>
           </p:txBody>
         </p:sp>
-        <p:sp>
-          <p:nvSpPr>
-            <p:cNvPr id="95" name="TextBox 94"/>
-            <p:cNvSpPr txBox="1"/>
-            <p:nvPr/>
-          </p:nvSpPr>
-          <p:spPr>
-            <a:xfrm>
-              <a:off x="1232784" y="1629653"/>
-              <a:ext cx="1045957" cy="191478"/>
-            </a:xfrm>
-            <a:prstGeom prst="rect">
-              <a:avLst/>
-            </a:prstGeom>
-            <a:noFill/>
-          </p:spPr>
-          <p:txBody>
-            <a:bodyPr wrap="none" lIns="82945" tIns="41473" rIns="82945" bIns="41473" rtlCol="0">
-              <a:spAutoFit/>
-            </a:bodyPr>
-            <a:lstStyle/>
-            <a:p>
-              <a:pPr algn="ctr"/>
-              <a:r>
-                <a:rPr lang="en-US" sz="700" b="1" dirty="0" smtClean="0"/>
-                <a:t>Ultrasonic Sensors</a:t>
-              </a:r>
-              <a:endParaRPr lang="tr-TR" sz="700" b="1" dirty="0"/>
-            </a:p>
-          </p:txBody>
-        </p:sp>
         <p:cxnSp>
           <p:nvCxnSpPr>
-            <p:cNvPr id="99" name="Straight Arrow Connector 98"/>
+            <p:cNvPr id="36" name="Straight Arrow Connector 35"/>
             <p:cNvCxnSpPr/>
             <p:nvPr/>
           </p:nvCxnSpPr>
           <p:spPr>
             <a:xfrm>
-              <a:off x="1460879" y="1788646"/>
-              <a:ext cx="829440" cy="1441"/>
+              <a:off x="4908430" y="3407434"/>
+              <a:ext cx="560717" cy="1588"/>
             </a:xfrm>
             <a:prstGeom prst="straightConnector1">
               <a:avLst/>
             </a:prstGeom>
-            <a:ln w="15875">
+            <a:ln w="19050">
               <a:tailEnd type="arrow"/>
-            </a:ln>
-          </p:spPr>
-          <p:style>
-            <a:lnRef idx="1">
-              <a:schemeClr val="accent1"/>
-            </a:lnRef>
-            <a:fillRef idx="0">
-              <a:schemeClr val="accent1"/>
-            </a:fillRef>
-            <a:effectRef idx="0">
-              <a:schemeClr val="accent1"/>
-            </a:effectRef>
-            <a:fontRef idx="minor">
-              <a:schemeClr val="tx1"/>
-            </a:fontRef>
-          </p:style>
-        </p:cxnSp>
-        <p:cxnSp>
-          <p:nvCxnSpPr>
-            <p:cNvPr id="102" name="Straight Connector 101"/>
-            <p:cNvCxnSpPr/>
-            <p:nvPr/>
-          </p:nvCxnSpPr>
-          <p:spPr>
-            <a:xfrm rot="16200000" flipH="1">
-              <a:off x="3568836" y="3205758"/>
-              <a:ext cx="3871126" cy="69120"/>
-            </a:xfrm>
-            <a:prstGeom prst="line">
-              <a:avLst/>
-            </a:prstGeom>
-            <a:ln w="22225">
-              <a:solidFill>
-                <a:srgbClr val="FF0000"/>
-              </a:solidFill>
-              <a:prstDash val="dashDot"/>
             </a:ln>
           </p:spPr>
           <p:style>
@@ -10957,1199 +10570,158 @@
         </p:cxnSp>
         <p:sp>
           <p:nvSpPr>
-            <p:cNvPr id="103" name="TextBox 102"/>
-            <p:cNvSpPr txBox="1"/>
+            <p:cNvPr id="37" name="Rectangle 36"/>
+            <p:cNvSpPr/>
             <p:nvPr/>
           </p:nvSpPr>
           <p:spPr>
             <a:xfrm>
-              <a:off x="1875599" y="1166501"/>
-              <a:ext cx="2073600" cy="283811"/>
+              <a:off x="4474786" y="3425489"/>
+              <a:ext cx="1662635" cy="430887"/>
             </a:xfrm>
             <a:prstGeom prst="rect">
               <a:avLst/>
             </a:prstGeom>
-            <a:noFill/>
           </p:spPr>
           <p:txBody>
-            <a:bodyPr wrap="square" lIns="82945" tIns="41473" rIns="82945" bIns="41473" rtlCol="0">
+            <a:bodyPr wrap="none">
               <a:spAutoFit/>
             </a:bodyPr>
             <a:lstStyle/>
             <a:p>
+              <a:pPr algn="ctr"/>
               <a:r>
-                <a:rPr lang="en-US" sz="1300" dirty="0" smtClean="0"/>
-                <a:t>LOCAL POSITIONING</a:t>
+                <a:rPr lang="tr-TR" sz="1100" dirty="0" smtClean="0"/>
+                <a:t>True Position&amp;Velocity </a:t>
               </a:r>
-              <a:endParaRPr lang="tr-TR" sz="1300" dirty="0"/>
+            </a:p>
+            <a:p>
+              <a:pPr algn="ctr"/>
+              <a:r>
+                <a:rPr lang="tr-TR" sz="1100" dirty="0" smtClean="0"/>
+                <a:t>Information</a:t>
+              </a:r>
+              <a:endParaRPr lang="tr-TR" sz="1100" dirty="0"/>
             </a:p>
           </p:txBody>
         </p:sp>
-        <p:sp>
-          <p:nvSpPr>
-            <p:cNvPr id="104" name="TextBox 103"/>
-            <p:cNvSpPr txBox="1"/>
-            <p:nvPr/>
-          </p:nvSpPr>
-          <p:spPr>
-            <a:xfrm>
-              <a:off x="6299279" y="1166501"/>
-              <a:ext cx="2211840" cy="283811"/>
-            </a:xfrm>
-            <a:prstGeom prst="rect">
-              <a:avLst/>
-            </a:prstGeom>
-            <a:noFill/>
-          </p:spPr>
-          <p:txBody>
-            <a:bodyPr wrap="square" lIns="82945" tIns="41473" rIns="82945" bIns="41473" rtlCol="0">
-              <a:spAutoFit/>
-            </a:bodyPr>
-            <a:lstStyle/>
-            <a:p>
-              <a:r>
-                <a:rPr lang="en-US" sz="1300" dirty="0" smtClean="0"/>
-                <a:t>FORMATION CONTROL</a:t>
-              </a:r>
-              <a:endParaRPr lang="tr-TR" sz="1300" dirty="0"/>
-            </a:p>
-          </p:txBody>
-        </p:sp>
+      </p:grpSp>
+    </p:spTree>
+  </p:cSld>
+  <p:clrMapOvr>
+    <a:masterClrMapping/>
+  </p:clrMapOvr>
+</p:sld>
+</file>
+
+<file path=ppt/slides/slide2.xml><?xml version="1.0" encoding="utf-8"?>
+<p:sld xmlns:a="http://schemas.openxmlformats.org/drawingml/2006/main" xmlns:r="http://schemas.openxmlformats.org/officeDocument/2006/relationships" xmlns:p="http://schemas.openxmlformats.org/presentationml/2006/main">
+  <p:cSld>
+    <p:spTree>
+      <p:nvGrpSpPr>
+        <p:cNvPr id="1" name=""/>
+        <p:cNvGrpSpPr/>
+        <p:nvPr/>
+      </p:nvGrpSpPr>
+      <p:grpSpPr>
+        <a:xfrm>
+          <a:off x="0" y="0"/>
+          <a:ext cx="0" cy="0"/>
+          <a:chOff x="0" y="0"/>
+          <a:chExt cx="0" cy="0"/>
+        </a:xfrm>
+      </p:grpSpPr>
+      <p:sp>
+        <p:nvSpPr>
+          <p:cNvPr id="106" name="TextBox 105"/>
+          <p:cNvSpPr txBox="1"/>
+          <p:nvPr/>
+        </p:nvSpPr>
+        <p:spPr>
+          <a:xfrm>
+            <a:off x="2854330" y="609600"/>
+            <a:ext cx="2708270" cy="422310"/>
+          </a:xfrm>
+          <a:prstGeom prst="rect">
+            <a:avLst/>
+          </a:prstGeom>
+          <a:noFill/>
+        </p:spPr>
+        <p:txBody>
+          <a:bodyPr wrap="none" lIns="82945" tIns="41473" rIns="82945" bIns="41473" rtlCol="0">
+            <a:spAutoFit/>
+          </a:bodyPr>
+          <a:lstStyle/>
+          <a:p>
+            <a:r>
+              <a:rPr lang="en-US" sz="2200" b="1" dirty="0" smtClean="0"/>
+              <a:t>SYSTEM DESIGN</a:t>
+            </a:r>
+            <a:endParaRPr lang="tr-TR" sz="2200" b="1" dirty="0"/>
+          </a:p>
+        </p:txBody>
+      </p:sp>
+      <p:sp>
+        <p:nvSpPr>
+          <p:cNvPr id="43" name="TextShape 2"/>
+          <p:cNvSpPr txBox="1"/>
+          <p:nvPr/>
+        </p:nvSpPr>
+        <p:spPr>
+          <a:xfrm>
+            <a:off x="457172" y="2038305"/>
+            <a:ext cx="8228763" cy="3977484"/>
+          </a:xfrm>
+          <a:prstGeom prst="rect">
+            <a:avLst/>
+          </a:prstGeom>
+        </p:spPr>
+        <p:txBody>
+          <a:bodyPr lIns="0" tIns="0" rIns="0" bIns="0"/>
+          <a:lstStyle/>
+          <a:p>
+            <a:endParaRPr/>
+          </a:p>
+        </p:txBody>
+      </p:sp>
+      <p:grpSp>
+        <p:nvGrpSpPr>
+          <p:cNvPr id="2" name="Group 75"/>
+          <p:cNvGrpSpPr/>
+          <p:nvPr/>
+        </p:nvGrpSpPr>
+        <p:grpSpPr>
+          <a:xfrm>
+            <a:off x="1114560" y="5314136"/>
+            <a:ext cx="6775200" cy="1162864"/>
+            <a:chOff x="468312" y="5380037"/>
+            <a:chExt cx="7469187" cy="1281842"/>
+          </a:xfrm>
+        </p:grpSpPr>
         <p:grpSp>
           <p:nvGrpSpPr>
-            <p:cNvPr id="2" name="Group 75"/>
+            <p:cNvPr id="3" name="Group 41"/>
             <p:cNvGrpSpPr/>
             <p:nvPr/>
           </p:nvGrpSpPr>
           <p:grpSpPr>
             <a:xfrm>
-              <a:off x="1114560" y="5314136"/>
-              <a:ext cx="6775200" cy="1162864"/>
-              <a:chOff x="468312" y="5380037"/>
-              <a:chExt cx="7469187" cy="1281842"/>
+              <a:off x="6488112" y="5456237"/>
+              <a:ext cx="1449387" cy="1060833"/>
+              <a:chOff x="1914525" y="4770437"/>
+              <a:chExt cx="2592387" cy="1746633"/>
             </a:xfrm>
           </p:grpSpPr>
-          <p:grpSp>
-            <p:nvGrpSpPr>
-              <p:cNvPr id="3" name="Group 41"/>
-              <p:cNvGrpSpPr/>
-              <p:nvPr/>
-            </p:nvGrpSpPr>
-            <p:grpSpPr>
-              <a:xfrm>
-                <a:off x="6488112" y="5456237"/>
-                <a:ext cx="1449387" cy="1060833"/>
-                <a:chOff x="1914525" y="4770437"/>
-                <a:chExt cx="2592387" cy="1746633"/>
-              </a:xfrm>
-            </p:grpSpPr>
-            <p:sp>
-              <p:nvSpPr>
-                <p:cNvPr id="44" name="Freeform 43"/>
-                <p:cNvSpPr/>
-                <p:nvPr/>
-              </p:nvSpPr>
-              <p:spPr>
-                <a:xfrm>
-                  <a:off x="1914525" y="4770437"/>
-                  <a:ext cx="2592387" cy="1746633"/>
-                </a:xfrm>
-                <a:custGeom>
-                  <a:avLst/>
-                  <a:gdLst>
-                    <a:gd name="connsiteX0" fmla="*/ 800100 w 1724025"/>
-                    <a:gd name="connsiteY0" fmla="*/ 7937 h 1238632"/>
-                    <a:gd name="connsiteX1" fmla="*/ 790575 w 1724025"/>
-                    <a:gd name="connsiteY1" fmla="*/ 55562 h 1238632"/>
-                    <a:gd name="connsiteX2" fmla="*/ 809625 w 1724025"/>
-                    <a:gd name="connsiteY2" fmla="*/ 169862 h 1238632"/>
-                    <a:gd name="connsiteX3" fmla="*/ 828675 w 1724025"/>
-                    <a:gd name="connsiteY3" fmla="*/ 198437 h 1238632"/>
-                    <a:gd name="connsiteX4" fmla="*/ 1019175 w 1724025"/>
-                    <a:gd name="connsiteY4" fmla="*/ 188912 h 1238632"/>
-                    <a:gd name="connsiteX5" fmla="*/ 1047750 w 1724025"/>
-                    <a:gd name="connsiteY5" fmla="*/ 169862 h 1238632"/>
-                    <a:gd name="connsiteX6" fmla="*/ 1076325 w 1724025"/>
-                    <a:gd name="connsiteY6" fmla="*/ 160337 h 1238632"/>
-                    <a:gd name="connsiteX7" fmla="*/ 1085850 w 1724025"/>
-                    <a:gd name="connsiteY7" fmla="*/ 131762 h 1238632"/>
-                    <a:gd name="connsiteX8" fmla="*/ 1114425 w 1724025"/>
-                    <a:gd name="connsiteY8" fmla="*/ 122237 h 1238632"/>
-                    <a:gd name="connsiteX9" fmla="*/ 1143000 w 1724025"/>
-                    <a:gd name="connsiteY9" fmla="*/ 103187 h 1238632"/>
-                    <a:gd name="connsiteX10" fmla="*/ 1200150 w 1724025"/>
-                    <a:gd name="connsiteY10" fmla="*/ 84137 h 1238632"/>
-                    <a:gd name="connsiteX11" fmla="*/ 1276350 w 1724025"/>
-                    <a:gd name="connsiteY11" fmla="*/ 93662 h 1238632"/>
-                    <a:gd name="connsiteX12" fmla="*/ 1333500 w 1724025"/>
-                    <a:gd name="connsiteY12" fmla="*/ 112712 h 1238632"/>
-                    <a:gd name="connsiteX13" fmla="*/ 1343025 w 1724025"/>
-                    <a:gd name="connsiteY13" fmla="*/ 141287 h 1238632"/>
-                    <a:gd name="connsiteX14" fmla="*/ 1362075 w 1724025"/>
-                    <a:gd name="connsiteY14" fmla="*/ 169862 h 1238632"/>
-                    <a:gd name="connsiteX15" fmla="*/ 1381125 w 1724025"/>
-                    <a:gd name="connsiteY15" fmla="*/ 227012 h 1238632"/>
-                    <a:gd name="connsiteX16" fmla="*/ 1362075 w 1724025"/>
-                    <a:gd name="connsiteY16" fmla="*/ 341312 h 1238632"/>
-                    <a:gd name="connsiteX17" fmla="*/ 1343025 w 1724025"/>
-                    <a:gd name="connsiteY17" fmla="*/ 369887 h 1238632"/>
-                    <a:gd name="connsiteX18" fmla="*/ 1352550 w 1724025"/>
-                    <a:gd name="connsiteY18" fmla="*/ 474662 h 1238632"/>
-                    <a:gd name="connsiteX19" fmla="*/ 1409700 w 1724025"/>
-                    <a:gd name="connsiteY19" fmla="*/ 512762 h 1238632"/>
-                    <a:gd name="connsiteX20" fmla="*/ 1466850 w 1724025"/>
-                    <a:gd name="connsiteY20" fmla="*/ 541337 h 1238632"/>
-                    <a:gd name="connsiteX21" fmla="*/ 1504950 w 1724025"/>
-                    <a:gd name="connsiteY21" fmla="*/ 550862 h 1238632"/>
-                    <a:gd name="connsiteX22" fmla="*/ 1533525 w 1724025"/>
-                    <a:gd name="connsiteY22" fmla="*/ 560387 h 1238632"/>
-                    <a:gd name="connsiteX23" fmla="*/ 1638300 w 1724025"/>
-                    <a:gd name="connsiteY23" fmla="*/ 598487 h 1238632"/>
-                    <a:gd name="connsiteX24" fmla="*/ 1666875 w 1724025"/>
-                    <a:gd name="connsiteY24" fmla="*/ 608012 h 1238632"/>
-                    <a:gd name="connsiteX25" fmla="*/ 1685925 w 1724025"/>
-                    <a:gd name="connsiteY25" fmla="*/ 636587 h 1238632"/>
-                    <a:gd name="connsiteX26" fmla="*/ 1704975 w 1724025"/>
-                    <a:gd name="connsiteY26" fmla="*/ 693737 h 1238632"/>
-                    <a:gd name="connsiteX27" fmla="*/ 1724025 w 1724025"/>
-                    <a:gd name="connsiteY27" fmla="*/ 779462 h 1238632"/>
-                    <a:gd name="connsiteX28" fmla="*/ 1695450 w 1724025"/>
-                    <a:gd name="connsiteY28" fmla="*/ 855662 h 1238632"/>
-                    <a:gd name="connsiteX29" fmla="*/ 1666875 w 1724025"/>
-                    <a:gd name="connsiteY29" fmla="*/ 865187 h 1238632"/>
-                    <a:gd name="connsiteX30" fmla="*/ 1638300 w 1724025"/>
-                    <a:gd name="connsiteY30" fmla="*/ 884237 h 1238632"/>
-                    <a:gd name="connsiteX31" fmla="*/ 1400175 w 1724025"/>
-                    <a:gd name="connsiteY31" fmla="*/ 893762 h 1238632"/>
-                    <a:gd name="connsiteX32" fmla="*/ 1333500 w 1724025"/>
-                    <a:gd name="connsiteY32" fmla="*/ 912812 h 1238632"/>
-                    <a:gd name="connsiteX33" fmla="*/ 1276350 w 1724025"/>
-                    <a:gd name="connsiteY33" fmla="*/ 931862 h 1238632"/>
-                    <a:gd name="connsiteX34" fmla="*/ 1219200 w 1724025"/>
-                    <a:gd name="connsiteY34" fmla="*/ 969962 h 1238632"/>
-                    <a:gd name="connsiteX35" fmla="*/ 1162050 w 1724025"/>
-                    <a:gd name="connsiteY35" fmla="*/ 1008062 h 1238632"/>
-                    <a:gd name="connsiteX36" fmla="*/ 1133475 w 1724025"/>
-                    <a:gd name="connsiteY36" fmla="*/ 1027112 h 1238632"/>
-                    <a:gd name="connsiteX37" fmla="*/ 1057275 w 1724025"/>
-                    <a:gd name="connsiteY37" fmla="*/ 1141412 h 1238632"/>
-                    <a:gd name="connsiteX38" fmla="*/ 1038225 w 1724025"/>
-                    <a:gd name="connsiteY38" fmla="*/ 1169987 h 1238632"/>
-                    <a:gd name="connsiteX39" fmla="*/ 942975 w 1724025"/>
-                    <a:gd name="connsiteY39" fmla="*/ 1208087 h 1238632"/>
-                    <a:gd name="connsiteX40" fmla="*/ 895350 w 1724025"/>
-                    <a:gd name="connsiteY40" fmla="*/ 1217612 h 1238632"/>
-                    <a:gd name="connsiteX41" fmla="*/ 781050 w 1724025"/>
-                    <a:gd name="connsiteY41" fmla="*/ 1236662 h 1238632"/>
-                    <a:gd name="connsiteX42" fmla="*/ 571500 w 1724025"/>
-                    <a:gd name="connsiteY42" fmla="*/ 1227137 h 1238632"/>
-                    <a:gd name="connsiteX43" fmla="*/ 552450 w 1724025"/>
-                    <a:gd name="connsiteY43" fmla="*/ 1198562 h 1238632"/>
-                    <a:gd name="connsiteX44" fmla="*/ 542925 w 1724025"/>
-                    <a:gd name="connsiteY44" fmla="*/ 969962 h 1238632"/>
-                    <a:gd name="connsiteX45" fmla="*/ 523875 w 1724025"/>
-                    <a:gd name="connsiteY45" fmla="*/ 855662 h 1238632"/>
-                    <a:gd name="connsiteX46" fmla="*/ 495300 w 1724025"/>
-                    <a:gd name="connsiteY46" fmla="*/ 798512 h 1238632"/>
-                    <a:gd name="connsiteX47" fmla="*/ 438150 w 1724025"/>
-                    <a:gd name="connsiteY47" fmla="*/ 760412 h 1238632"/>
-                    <a:gd name="connsiteX48" fmla="*/ 342900 w 1724025"/>
-                    <a:gd name="connsiteY48" fmla="*/ 731837 h 1238632"/>
-                    <a:gd name="connsiteX49" fmla="*/ 257175 w 1724025"/>
-                    <a:gd name="connsiteY49" fmla="*/ 712787 h 1238632"/>
-                    <a:gd name="connsiteX50" fmla="*/ 228600 w 1724025"/>
-                    <a:gd name="connsiteY50" fmla="*/ 703262 h 1238632"/>
-                    <a:gd name="connsiteX51" fmla="*/ 142875 w 1724025"/>
-                    <a:gd name="connsiteY51" fmla="*/ 684212 h 1238632"/>
-                    <a:gd name="connsiteX52" fmla="*/ 104775 w 1724025"/>
-                    <a:gd name="connsiteY52" fmla="*/ 655637 h 1238632"/>
-                    <a:gd name="connsiteX53" fmla="*/ 57150 w 1724025"/>
-                    <a:gd name="connsiteY53" fmla="*/ 608012 h 1238632"/>
-                    <a:gd name="connsiteX54" fmla="*/ 28575 w 1724025"/>
-                    <a:gd name="connsiteY54" fmla="*/ 550862 h 1238632"/>
-                    <a:gd name="connsiteX55" fmla="*/ 9525 w 1724025"/>
-                    <a:gd name="connsiteY55" fmla="*/ 484187 h 1238632"/>
-                    <a:gd name="connsiteX56" fmla="*/ 0 w 1724025"/>
-                    <a:gd name="connsiteY56" fmla="*/ 455612 h 1238632"/>
-                    <a:gd name="connsiteX57" fmla="*/ 9525 w 1724025"/>
-                    <a:gd name="connsiteY57" fmla="*/ 360362 h 1238632"/>
-                    <a:gd name="connsiteX58" fmla="*/ 47625 w 1724025"/>
-                    <a:gd name="connsiteY58" fmla="*/ 303212 h 1238632"/>
-                    <a:gd name="connsiteX59" fmla="*/ 76200 w 1724025"/>
-                    <a:gd name="connsiteY59" fmla="*/ 274637 h 1238632"/>
-                    <a:gd name="connsiteX60" fmla="*/ 171450 w 1724025"/>
-                    <a:gd name="connsiteY60" fmla="*/ 217487 h 1238632"/>
-                    <a:gd name="connsiteX61" fmla="*/ 200025 w 1724025"/>
-                    <a:gd name="connsiteY61" fmla="*/ 207962 h 1238632"/>
-                    <a:gd name="connsiteX62" fmla="*/ 333375 w 1724025"/>
-                    <a:gd name="connsiteY62" fmla="*/ 188912 h 1238632"/>
-                    <a:gd name="connsiteX63" fmla="*/ 495300 w 1724025"/>
-                    <a:gd name="connsiteY63" fmla="*/ 179387 h 1238632"/>
-                    <a:gd name="connsiteX64" fmla="*/ 523875 w 1724025"/>
-                    <a:gd name="connsiteY64" fmla="*/ 169862 h 1238632"/>
-                    <a:gd name="connsiteX65" fmla="*/ 590550 w 1724025"/>
-                    <a:gd name="connsiteY65" fmla="*/ 93662 h 1238632"/>
-                    <a:gd name="connsiteX66" fmla="*/ 609600 w 1724025"/>
-                    <a:gd name="connsiteY66" fmla="*/ 65087 h 1238632"/>
-                    <a:gd name="connsiteX67" fmla="*/ 628650 w 1724025"/>
-                    <a:gd name="connsiteY67" fmla="*/ 36512 h 1238632"/>
-                    <a:gd name="connsiteX68" fmla="*/ 685800 w 1724025"/>
-                    <a:gd name="connsiteY68" fmla="*/ 7937 h 1238632"/>
-                    <a:gd name="connsiteX69" fmla="*/ 800100 w 1724025"/>
-                    <a:gd name="connsiteY69" fmla="*/ 7937 h 1238632"/>
-                  </a:gdLst>
-                  <a:ahLst/>
-                  <a:cxnLst>
-                    <a:cxn ang="0">
-                      <a:pos x="connsiteX0" y="connsiteY0"/>
-                    </a:cxn>
-                    <a:cxn ang="0">
-                      <a:pos x="connsiteX1" y="connsiteY1"/>
-                    </a:cxn>
-                    <a:cxn ang="0">
-                      <a:pos x="connsiteX2" y="connsiteY2"/>
-                    </a:cxn>
-                    <a:cxn ang="0">
-                      <a:pos x="connsiteX3" y="connsiteY3"/>
-                    </a:cxn>
-                    <a:cxn ang="0">
-                      <a:pos x="connsiteX4" y="connsiteY4"/>
-                    </a:cxn>
-                    <a:cxn ang="0">
-                      <a:pos x="connsiteX5" y="connsiteY5"/>
-                    </a:cxn>
-                    <a:cxn ang="0">
-                      <a:pos x="connsiteX6" y="connsiteY6"/>
-                    </a:cxn>
-                    <a:cxn ang="0">
-                      <a:pos x="connsiteX7" y="connsiteY7"/>
-                    </a:cxn>
-                    <a:cxn ang="0">
-                      <a:pos x="connsiteX8" y="connsiteY8"/>
-                    </a:cxn>
-                    <a:cxn ang="0">
-                      <a:pos x="connsiteX9" y="connsiteY9"/>
-                    </a:cxn>
-                    <a:cxn ang="0">
-                      <a:pos x="connsiteX10" y="connsiteY10"/>
-                    </a:cxn>
-                    <a:cxn ang="0">
-                      <a:pos x="connsiteX11" y="connsiteY11"/>
-                    </a:cxn>
-                    <a:cxn ang="0">
-                      <a:pos x="connsiteX12" y="connsiteY12"/>
-                    </a:cxn>
-                    <a:cxn ang="0">
-                      <a:pos x="connsiteX13" y="connsiteY13"/>
-                    </a:cxn>
-                    <a:cxn ang="0">
-                      <a:pos x="connsiteX14" y="connsiteY14"/>
-                    </a:cxn>
-                    <a:cxn ang="0">
-                      <a:pos x="connsiteX15" y="connsiteY15"/>
-                    </a:cxn>
-                    <a:cxn ang="0">
-                      <a:pos x="connsiteX16" y="connsiteY16"/>
-                    </a:cxn>
-                    <a:cxn ang="0">
-                      <a:pos x="connsiteX17" y="connsiteY17"/>
-                    </a:cxn>
-                    <a:cxn ang="0">
-                      <a:pos x="connsiteX18" y="connsiteY18"/>
-                    </a:cxn>
-                    <a:cxn ang="0">
-                      <a:pos x="connsiteX19" y="connsiteY19"/>
-                    </a:cxn>
-                    <a:cxn ang="0">
-                      <a:pos x="connsiteX20" y="connsiteY20"/>
-                    </a:cxn>
-                    <a:cxn ang="0">
-                      <a:pos x="connsiteX21" y="connsiteY21"/>
-                    </a:cxn>
-                    <a:cxn ang="0">
-                      <a:pos x="connsiteX22" y="connsiteY22"/>
-                    </a:cxn>
-                    <a:cxn ang="0">
-                      <a:pos x="connsiteX23" y="connsiteY23"/>
-                    </a:cxn>
-                    <a:cxn ang="0">
-                      <a:pos x="connsiteX24" y="connsiteY24"/>
-                    </a:cxn>
-                    <a:cxn ang="0">
-                      <a:pos x="connsiteX25" y="connsiteY25"/>
-                    </a:cxn>
-                    <a:cxn ang="0">
-                      <a:pos x="connsiteX26" y="connsiteY26"/>
-                    </a:cxn>
-                    <a:cxn ang="0">
-                      <a:pos x="connsiteX27" y="connsiteY27"/>
-                    </a:cxn>
-                    <a:cxn ang="0">
-                      <a:pos x="connsiteX28" y="connsiteY28"/>
-                    </a:cxn>
-                    <a:cxn ang="0">
-                      <a:pos x="connsiteX29" y="connsiteY29"/>
-                    </a:cxn>
-                    <a:cxn ang="0">
-                      <a:pos x="connsiteX30" y="connsiteY30"/>
-                    </a:cxn>
-                    <a:cxn ang="0">
-                      <a:pos x="connsiteX31" y="connsiteY31"/>
-                    </a:cxn>
-                    <a:cxn ang="0">
-                      <a:pos x="connsiteX32" y="connsiteY32"/>
-                    </a:cxn>
-                    <a:cxn ang="0">
-                      <a:pos x="connsiteX33" y="connsiteY33"/>
-                    </a:cxn>
-                    <a:cxn ang="0">
-                      <a:pos x="connsiteX34" y="connsiteY34"/>
-                    </a:cxn>
-                    <a:cxn ang="0">
-                      <a:pos x="connsiteX35" y="connsiteY35"/>
-                    </a:cxn>
-                    <a:cxn ang="0">
-                      <a:pos x="connsiteX36" y="connsiteY36"/>
-                    </a:cxn>
-                    <a:cxn ang="0">
-                      <a:pos x="connsiteX37" y="connsiteY37"/>
-                    </a:cxn>
-                    <a:cxn ang="0">
-                      <a:pos x="connsiteX38" y="connsiteY38"/>
-                    </a:cxn>
-                    <a:cxn ang="0">
-                      <a:pos x="connsiteX39" y="connsiteY39"/>
-                    </a:cxn>
-                    <a:cxn ang="0">
-                      <a:pos x="connsiteX40" y="connsiteY40"/>
-                    </a:cxn>
-                    <a:cxn ang="0">
-                      <a:pos x="connsiteX41" y="connsiteY41"/>
-                    </a:cxn>
-                    <a:cxn ang="0">
-                      <a:pos x="connsiteX42" y="connsiteY42"/>
-                    </a:cxn>
-                    <a:cxn ang="0">
-                      <a:pos x="connsiteX43" y="connsiteY43"/>
-                    </a:cxn>
-                    <a:cxn ang="0">
-                      <a:pos x="connsiteX44" y="connsiteY44"/>
-                    </a:cxn>
-                    <a:cxn ang="0">
-                      <a:pos x="connsiteX45" y="connsiteY45"/>
-                    </a:cxn>
-                    <a:cxn ang="0">
-                      <a:pos x="connsiteX46" y="connsiteY46"/>
-                    </a:cxn>
-                    <a:cxn ang="0">
-                      <a:pos x="connsiteX47" y="connsiteY47"/>
-                    </a:cxn>
-                    <a:cxn ang="0">
-                      <a:pos x="connsiteX48" y="connsiteY48"/>
-                    </a:cxn>
-                    <a:cxn ang="0">
-                      <a:pos x="connsiteX49" y="connsiteY49"/>
-                    </a:cxn>
-                    <a:cxn ang="0">
-                      <a:pos x="connsiteX50" y="connsiteY50"/>
-                    </a:cxn>
-                    <a:cxn ang="0">
-                      <a:pos x="connsiteX51" y="connsiteY51"/>
-                    </a:cxn>
-                    <a:cxn ang="0">
-                      <a:pos x="connsiteX52" y="connsiteY52"/>
-                    </a:cxn>
-                    <a:cxn ang="0">
-                      <a:pos x="connsiteX53" y="connsiteY53"/>
-                    </a:cxn>
-                    <a:cxn ang="0">
-                      <a:pos x="connsiteX54" y="connsiteY54"/>
-                    </a:cxn>
-                    <a:cxn ang="0">
-                      <a:pos x="connsiteX55" y="connsiteY55"/>
-                    </a:cxn>
-                    <a:cxn ang="0">
-                      <a:pos x="connsiteX56" y="connsiteY56"/>
-                    </a:cxn>
-                    <a:cxn ang="0">
-                      <a:pos x="connsiteX57" y="connsiteY57"/>
-                    </a:cxn>
-                    <a:cxn ang="0">
-                      <a:pos x="connsiteX58" y="connsiteY58"/>
-                    </a:cxn>
-                    <a:cxn ang="0">
-                      <a:pos x="connsiteX59" y="connsiteY59"/>
-                    </a:cxn>
-                    <a:cxn ang="0">
-                      <a:pos x="connsiteX60" y="connsiteY60"/>
-                    </a:cxn>
-                    <a:cxn ang="0">
-                      <a:pos x="connsiteX61" y="connsiteY61"/>
-                    </a:cxn>
-                    <a:cxn ang="0">
-                      <a:pos x="connsiteX62" y="connsiteY62"/>
-                    </a:cxn>
-                    <a:cxn ang="0">
-                      <a:pos x="connsiteX63" y="connsiteY63"/>
-                    </a:cxn>
-                    <a:cxn ang="0">
-                      <a:pos x="connsiteX64" y="connsiteY64"/>
-                    </a:cxn>
-                    <a:cxn ang="0">
-                      <a:pos x="connsiteX65" y="connsiteY65"/>
-                    </a:cxn>
-                    <a:cxn ang="0">
-                      <a:pos x="connsiteX66" y="connsiteY66"/>
-                    </a:cxn>
-                    <a:cxn ang="0">
-                      <a:pos x="connsiteX67" y="connsiteY67"/>
-                    </a:cxn>
-                    <a:cxn ang="0">
-                      <a:pos x="connsiteX68" y="connsiteY68"/>
-                    </a:cxn>
-                    <a:cxn ang="0">
-                      <a:pos x="connsiteX69" y="connsiteY69"/>
-                    </a:cxn>
-                  </a:cxnLst>
-                  <a:rect l="l" t="t" r="r" b="b"/>
-                  <a:pathLst>
-                    <a:path w="1724025" h="1238632">
-                      <a:moveTo>
-                        <a:pt x="800100" y="7937"/>
-                      </a:moveTo>
-                      <a:cubicBezTo>
-                        <a:pt x="817562" y="15874"/>
-                        <a:pt x="790575" y="39373"/>
-                        <a:pt x="790575" y="55562"/>
-                      </a:cubicBezTo>
-                      <a:cubicBezTo>
-                        <a:pt x="790575" y="76688"/>
-                        <a:pt x="794722" y="140055"/>
-                        <a:pt x="809625" y="169862"/>
-                      </a:cubicBezTo>
-                      <a:cubicBezTo>
-                        <a:pt x="814745" y="180101"/>
-                        <a:pt x="822325" y="188912"/>
-                        <a:pt x="828675" y="198437"/>
-                      </a:cubicBezTo>
-                      <a:cubicBezTo>
-                        <a:pt x="892175" y="195262"/>
-                        <a:pt x="956130" y="197135"/>
-                        <a:pt x="1019175" y="188912"/>
-                      </a:cubicBezTo>
-                      <a:cubicBezTo>
-                        <a:pt x="1030526" y="187431"/>
-                        <a:pt x="1037511" y="174982"/>
-                        <a:pt x="1047750" y="169862"/>
-                      </a:cubicBezTo>
-                      <a:cubicBezTo>
-                        <a:pt x="1056730" y="165372"/>
-                        <a:pt x="1066800" y="163512"/>
-                        <a:pt x="1076325" y="160337"/>
-                      </a:cubicBezTo>
-                      <a:cubicBezTo>
-                        <a:pt x="1079500" y="150812"/>
-                        <a:pt x="1078750" y="138862"/>
-                        <a:pt x="1085850" y="131762"/>
-                      </a:cubicBezTo>
-                      <a:cubicBezTo>
-                        <a:pt x="1092950" y="124662"/>
-                        <a:pt x="1105445" y="126727"/>
-                        <a:pt x="1114425" y="122237"/>
-                      </a:cubicBezTo>
-                      <a:cubicBezTo>
-                        <a:pt x="1124664" y="117117"/>
-                        <a:pt x="1132539" y="107836"/>
-                        <a:pt x="1143000" y="103187"/>
-                      </a:cubicBezTo>
-                      <a:cubicBezTo>
-                        <a:pt x="1161350" y="95032"/>
-                        <a:pt x="1200150" y="84137"/>
-                        <a:pt x="1200150" y="84137"/>
-                      </a:cubicBezTo>
-                      <a:cubicBezTo>
-                        <a:pt x="1225550" y="87312"/>
-                        <a:pt x="1251321" y="88299"/>
-                        <a:pt x="1276350" y="93662"/>
-                      </a:cubicBezTo>
-                      <a:cubicBezTo>
-                        <a:pt x="1295985" y="97869"/>
-                        <a:pt x="1333500" y="112712"/>
-                        <a:pt x="1333500" y="112712"/>
-                      </a:cubicBezTo>
-                      <a:cubicBezTo>
-                        <a:pt x="1336675" y="122237"/>
-                        <a:pt x="1338535" y="132307"/>
-                        <a:pt x="1343025" y="141287"/>
-                      </a:cubicBezTo>
-                      <a:cubicBezTo>
-                        <a:pt x="1348145" y="151526"/>
-                        <a:pt x="1357426" y="159401"/>
-                        <a:pt x="1362075" y="169862"/>
-                      </a:cubicBezTo>
-                      <a:cubicBezTo>
-                        <a:pt x="1370230" y="188212"/>
-                        <a:pt x="1381125" y="227012"/>
-                        <a:pt x="1381125" y="227012"/>
-                      </a:cubicBezTo>
-                      <a:cubicBezTo>
-                        <a:pt x="1378107" y="254174"/>
-                        <a:pt x="1378032" y="309397"/>
-                        <a:pt x="1362075" y="341312"/>
-                      </a:cubicBezTo>
-                      <a:cubicBezTo>
-                        <a:pt x="1356955" y="351551"/>
-                        <a:pt x="1349375" y="360362"/>
-                        <a:pt x="1343025" y="369887"/>
-                      </a:cubicBezTo>
-                      <a:cubicBezTo>
-                        <a:pt x="1346200" y="404812"/>
-                        <a:pt x="1337720" y="442883"/>
-                        <a:pt x="1352550" y="474662"/>
-                      </a:cubicBezTo>
-                      <a:cubicBezTo>
-                        <a:pt x="1362232" y="495409"/>
-                        <a:pt x="1387980" y="505522"/>
-                        <a:pt x="1409700" y="512762"/>
-                      </a:cubicBezTo>
-                      <a:cubicBezTo>
-                        <a:pt x="1530107" y="552898"/>
-                        <a:pt x="1337599" y="485944"/>
-                        <a:pt x="1466850" y="541337"/>
-                      </a:cubicBezTo>
-                      <a:cubicBezTo>
-                        <a:pt x="1478882" y="546494"/>
-                        <a:pt x="1492363" y="547266"/>
-                        <a:pt x="1504950" y="550862"/>
-                      </a:cubicBezTo>
-                      <a:cubicBezTo>
-                        <a:pt x="1514604" y="553620"/>
-                        <a:pt x="1524124" y="556862"/>
-                        <a:pt x="1533525" y="560387"/>
-                      </a:cubicBezTo>
-                      <a:cubicBezTo>
-                        <a:pt x="1639556" y="600149"/>
-                        <a:pt x="1518232" y="558464"/>
-                        <a:pt x="1638300" y="598487"/>
-                      </a:cubicBezTo>
-                      <a:lnTo>
-                        <a:pt x="1666875" y="608012"/>
-                      </a:lnTo>
-                      <a:cubicBezTo>
-                        <a:pt x="1673225" y="617537"/>
-                        <a:pt x="1681276" y="626126"/>
-                        <a:pt x="1685925" y="636587"/>
-                      </a:cubicBezTo>
-                      <a:cubicBezTo>
-                        <a:pt x="1694080" y="654937"/>
-                        <a:pt x="1698625" y="674687"/>
-                        <a:pt x="1704975" y="693737"/>
-                      </a:cubicBezTo>
-                      <a:cubicBezTo>
-                        <a:pt x="1720607" y="740634"/>
-                        <a:pt x="1712849" y="712408"/>
-                        <a:pt x="1724025" y="779462"/>
-                      </a:cubicBezTo>
-                      <a:cubicBezTo>
-                        <a:pt x="1718862" y="805278"/>
-                        <a:pt x="1718809" y="836975"/>
-                        <a:pt x="1695450" y="855662"/>
-                      </a:cubicBezTo>
-                      <a:cubicBezTo>
-                        <a:pt x="1687610" y="861934"/>
-                        <a:pt x="1675855" y="860697"/>
-                        <a:pt x="1666875" y="865187"/>
-                      </a:cubicBezTo>
-                      <a:cubicBezTo>
-                        <a:pt x="1656636" y="870307"/>
-                        <a:pt x="1649682" y="883017"/>
-                        <a:pt x="1638300" y="884237"/>
-                      </a:cubicBezTo>
-                      <a:cubicBezTo>
-                        <a:pt x="1559314" y="892700"/>
-                        <a:pt x="1479550" y="890587"/>
-                        <a:pt x="1400175" y="893762"/>
-                      </a:cubicBezTo>
-                      <a:cubicBezTo>
-                        <a:pt x="1304143" y="925773"/>
-                        <a:pt x="1453101" y="876932"/>
-                        <a:pt x="1333500" y="912812"/>
-                      </a:cubicBezTo>
-                      <a:cubicBezTo>
-                        <a:pt x="1314266" y="918582"/>
-                        <a:pt x="1293058" y="920723"/>
-                        <a:pt x="1276350" y="931862"/>
-                      </a:cubicBezTo>
-                      <a:lnTo>
-                        <a:pt x="1219200" y="969962"/>
-                      </a:lnTo>
-                      <a:lnTo>
-                        <a:pt x="1162050" y="1008062"/>
-                      </a:lnTo>
-                      <a:lnTo>
-                        <a:pt x="1133475" y="1027112"/>
-                      </a:lnTo>
-                      <a:lnTo>
-                        <a:pt x="1057275" y="1141412"/>
-                      </a:lnTo>
-                      <a:cubicBezTo>
-                        <a:pt x="1050925" y="1150937"/>
-                        <a:pt x="1048464" y="1164867"/>
-                        <a:pt x="1038225" y="1169987"/>
-                      </a:cubicBezTo>
-                      <a:cubicBezTo>
-                        <a:pt x="1004358" y="1186920"/>
-                        <a:pt x="982209" y="1200240"/>
-                        <a:pt x="942975" y="1208087"/>
-                      </a:cubicBezTo>
-                      <a:cubicBezTo>
-                        <a:pt x="927100" y="1211262"/>
-                        <a:pt x="911293" y="1214799"/>
-                        <a:pt x="895350" y="1217612"/>
-                      </a:cubicBezTo>
-                      <a:lnTo>
-                        <a:pt x="781050" y="1236662"/>
-                      </a:lnTo>
-                      <a:cubicBezTo>
-                        <a:pt x="711200" y="1233487"/>
-                        <a:pt x="640471" y="1238632"/>
-                        <a:pt x="571500" y="1227137"/>
-                      </a:cubicBezTo>
-                      <a:cubicBezTo>
-                        <a:pt x="560208" y="1225255"/>
-                        <a:pt x="553714" y="1209940"/>
-                        <a:pt x="552450" y="1198562"/>
-                      </a:cubicBezTo>
-                      <a:cubicBezTo>
-                        <a:pt x="544028" y="1122762"/>
-                        <a:pt x="547835" y="1046070"/>
-                        <a:pt x="542925" y="969962"/>
-                      </a:cubicBezTo>
-                      <a:cubicBezTo>
-                        <a:pt x="541522" y="948223"/>
-                        <a:pt x="530295" y="881341"/>
-                        <a:pt x="523875" y="855662"/>
-                      </a:cubicBezTo>
-                      <a:cubicBezTo>
-                        <a:pt x="519255" y="837182"/>
-                        <a:pt x="510199" y="811549"/>
-                        <a:pt x="495300" y="798512"/>
-                      </a:cubicBezTo>
-                      <a:cubicBezTo>
-                        <a:pt x="478070" y="783435"/>
-                        <a:pt x="459870" y="767652"/>
-                        <a:pt x="438150" y="760412"/>
-                      </a:cubicBezTo>
-                      <a:cubicBezTo>
-                        <a:pt x="302337" y="715141"/>
-                        <a:pt x="443667" y="760627"/>
-                        <a:pt x="342900" y="731837"/>
-                      </a:cubicBezTo>
-                      <a:cubicBezTo>
-                        <a:pt x="230329" y="699674"/>
-                        <a:pt x="450556" y="755761"/>
-                        <a:pt x="257175" y="712787"/>
-                      </a:cubicBezTo>
-                      <a:cubicBezTo>
-                        <a:pt x="247374" y="710609"/>
-                        <a:pt x="238401" y="705440"/>
-                        <a:pt x="228600" y="703262"/>
-                      </a:cubicBezTo>
-                      <a:cubicBezTo>
-                        <a:pt x="128020" y="680911"/>
-                        <a:pt x="207201" y="705654"/>
-                        <a:pt x="142875" y="684212"/>
-                      </a:cubicBezTo>
-                      <a:cubicBezTo>
-                        <a:pt x="130175" y="674687"/>
-                        <a:pt x="116000" y="666862"/>
-                        <a:pt x="104775" y="655637"/>
-                      </a:cubicBezTo>
-                      <a:cubicBezTo>
-                        <a:pt x="41275" y="592137"/>
-                        <a:pt x="133350" y="658812"/>
-                        <a:pt x="57150" y="608012"/>
-                      </a:cubicBezTo>
-                      <a:cubicBezTo>
-                        <a:pt x="33209" y="536188"/>
-                        <a:pt x="65504" y="624720"/>
-                        <a:pt x="28575" y="550862"/>
-                      </a:cubicBezTo>
-                      <a:cubicBezTo>
-                        <a:pt x="20962" y="535637"/>
-                        <a:pt x="13594" y="498429"/>
-                        <a:pt x="9525" y="484187"/>
-                      </a:cubicBezTo>
-                      <a:cubicBezTo>
-                        <a:pt x="6767" y="474533"/>
-                        <a:pt x="3175" y="465137"/>
-                        <a:pt x="0" y="455612"/>
-                      </a:cubicBezTo>
-                      <a:cubicBezTo>
-                        <a:pt x="3175" y="423862"/>
-                        <a:pt x="8" y="390818"/>
-                        <a:pt x="9525" y="360362"/>
-                      </a:cubicBezTo>
-                      <a:cubicBezTo>
-                        <a:pt x="16354" y="338509"/>
-                        <a:pt x="31436" y="319401"/>
-                        <a:pt x="47625" y="303212"/>
-                      </a:cubicBezTo>
-                      <a:cubicBezTo>
-                        <a:pt x="57150" y="293687"/>
-                        <a:pt x="65567" y="282907"/>
-                        <a:pt x="76200" y="274637"/>
-                      </a:cubicBezTo>
-                      <a:cubicBezTo>
-                        <a:pt x="103901" y="253092"/>
-                        <a:pt x="138462" y="231625"/>
-                        <a:pt x="171450" y="217487"/>
-                      </a:cubicBezTo>
-                      <a:cubicBezTo>
-                        <a:pt x="180678" y="213532"/>
-                        <a:pt x="190224" y="210140"/>
-                        <a:pt x="200025" y="207962"/>
-                      </a:cubicBezTo>
-                      <a:cubicBezTo>
-                        <a:pt x="227472" y="201863"/>
-                        <a:pt x="310847" y="190714"/>
-                        <a:pt x="333375" y="188912"/>
-                      </a:cubicBezTo>
-                      <a:cubicBezTo>
-                        <a:pt x="387271" y="184600"/>
-                        <a:pt x="441325" y="182562"/>
-                        <a:pt x="495300" y="179387"/>
-                      </a:cubicBezTo>
-                      <a:cubicBezTo>
-                        <a:pt x="504825" y="176212"/>
-                        <a:pt x="514895" y="174352"/>
-                        <a:pt x="523875" y="169862"/>
-                      </a:cubicBezTo>
-                      <a:cubicBezTo>
-                        <a:pt x="563563" y="150018"/>
-                        <a:pt x="561975" y="136525"/>
-                        <a:pt x="590550" y="93662"/>
-                      </a:cubicBezTo>
-                      <a:lnTo>
-                        <a:pt x="609600" y="65087"/>
-                      </a:lnTo>
-                      <a:cubicBezTo>
-                        <a:pt x="615950" y="55562"/>
-                        <a:pt x="617790" y="40132"/>
-                        <a:pt x="628650" y="36512"/>
-                      </a:cubicBezTo>
-                      <a:cubicBezTo>
-                        <a:pt x="668085" y="23367"/>
-                        <a:pt x="648871" y="32556"/>
-                        <a:pt x="685800" y="7937"/>
-                      </a:cubicBezTo>
-                      <a:cubicBezTo>
-                        <a:pt x="784209" y="17778"/>
-                        <a:pt x="782638" y="0"/>
-                        <a:pt x="800100" y="7937"/>
-                      </a:cubicBezTo>
-                      <a:close/>
-                    </a:path>
-                  </a:pathLst>
-                </a:custGeom>
-                <a:noFill/>
-              </p:spPr>
-              <p:style>
-                <a:lnRef idx="2">
-                  <a:schemeClr val="accent1">
-                    <a:shade val="50000"/>
-                  </a:schemeClr>
-                </a:lnRef>
-                <a:fillRef idx="1">
-                  <a:schemeClr val="accent1"/>
-                </a:fillRef>
-                <a:effectRef idx="0">
-                  <a:schemeClr val="accent1"/>
-                </a:effectRef>
-                <a:fontRef idx="minor">
-                  <a:schemeClr val="lt1"/>
-                </a:fontRef>
-              </p:style>
-              <p:txBody>
-                <a:bodyPr rtlCol="0" anchor="ctr"/>
-                <a:lstStyle/>
-                <a:p>
-                  <a:pPr algn="ctr"/>
-                  <a:endParaRPr lang="tr-TR"/>
-                </a:p>
-              </p:txBody>
-            </p:sp>
-            <p:sp>
-              <p:nvSpPr>
-                <p:cNvPr id="46" name="Oval 45"/>
-                <p:cNvSpPr/>
-                <p:nvPr/>
-              </p:nvSpPr>
-              <p:spPr>
-                <a:xfrm>
-                  <a:off x="2143125" y="5227637"/>
-                  <a:ext cx="228600" cy="228600"/>
-                </a:xfrm>
-                <a:prstGeom prst="ellipse">
-                  <a:avLst/>
-                </a:prstGeom>
-              </p:spPr>
-              <p:style>
-                <a:lnRef idx="2">
-                  <a:schemeClr val="accent1">
-                    <a:shade val="50000"/>
-                  </a:schemeClr>
-                </a:lnRef>
-                <a:fillRef idx="1">
-                  <a:schemeClr val="accent1"/>
-                </a:fillRef>
-                <a:effectRef idx="0">
-                  <a:schemeClr val="accent1"/>
-                </a:effectRef>
-                <a:fontRef idx="minor">
-                  <a:schemeClr val="lt1"/>
-                </a:fontRef>
-              </p:style>
-              <p:txBody>
-                <a:bodyPr rtlCol="0" anchor="ctr"/>
-                <a:lstStyle/>
-                <a:p>
-                  <a:pPr algn="ctr"/>
-                  <a:endParaRPr lang="tr-TR"/>
-                </a:p>
-              </p:txBody>
-            </p:sp>
-            <p:sp>
-              <p:nvSpPr>
-                <p:cNvPr id="47" name="Oval 46"/>
-                <p:cNvSpPr/>
-                <p:nvPr/>
-              </p:nvSpPr>
-              <p:spPr>
-                <a:xfrm>
-                  <a:off x="2600325" y="5456237"/>
-                  <a:ext cx="381000" cy="381000"/>
-                </a:xfrm>
-                <a:prstGeom prst="ellipse">
-                  <a:avLst/>
-                </a:prstGeom>
-              </p:spPr>
-              <p:style>
-                <a:lnRef idx="2">
-                  <a:schemeClr val="accent1">
-                    <a:shade val="50000"/>
-                  </a:schemeClr>
-                </a:lnRef>
-                <a:fillRef idx="1">
-                  <a:schemeClr val="accent1"/>
-                </a:fillRef>
-                <a:effectRef idx="0">
-                  <a:schemeClr val="accent1"/>
-                </a:effectRef>
-                <a:fontRef idx="minor">
-                  <a:schemeClr val="lt1"/>
-                </a:fontRef>
-              </p:style>
-              <p:txBody>
-                <a:bodyPr rtlCol="0" anchor="ctr"/>
-                <a:lstStyle/>
-                <a:p>
-                  <a:pPr algn="ctr"/>
-                  <a:endParaRPr lang="tr-TR"/>
-                </a:p>
-              </p:txBody>
-            </p:sp>
-            <p:sp>
-              <p:nvSpPr>
-                <p:cNvPr id="50" name="Oval 49"/>
-                <p:cNvSpPr/>
-                <p:nvPr/>
-              </p:nvSpPr>
-              <p:spPr>
-                <a:xfrm>
-                  <a:off x="3667125" y="4999037"/>
-                  <a:ext cx="228600" cy="228600"/>
-                </a:xfrm>
-                <a:prstGeom prst="ellipse">
-                  <a:avLst/>
-                </a:prstGeom>
-              </p:spPr>
-              <p:style>
-                <a:lnRef idx="2">
-                  <a:schemeClr val="accent1">
-                    <a:shade val="50000"/>
-                  </a:schemeClr>
-                </a:lnRef>
-                <a:fillRef idx="1">
-                  <a:schemeClr val="accent1"/>
-                </a:fillRef>
-                <a:effectRef idx="0">
-                  <a:schemeClr val="accent1"/>
-                </a:effectRef>
-                <a:fontRef idx="minor">
-                  <a:schemeClr val="lt1"/>
-                </a:fontRef>
-              </p:style>
-              <p:txBody>
-                <a:bodyPr rtlCol="0" anchor="ctr"/>
-                <a:lstStyle/>
-                <a:p>
-                  <a:pPr algn="ctr"/>
-                  <a:endParaRPr lang="tr-TR"/>
-                </a:p>
-              </p:txBody>
-            </p:sp>
-            <p:sp>
-              <p:nvSpPr>
-                <p:cNvPr id="52" name="Oval 51"/>
-                <p:cNvSpPr/>
-                <p:nvPr/>
-              </p:nvSpPr>
-              <p:spPr>
-                <a:xfrm>
-                  <a:off x="3514725" y="5837237"/>
-                  <a:ext cx="228600" cy="228600"/>
-                </a:xfrm>
-                <a:prstGeom prst="ellipse">
-                  <a:avLst/>
-                </a:prstGeom>
-              </p:spPr>
-              <p:style>
-                <a:lnRef idx="2">
-                  <a:schemeClr val="accent1">
-                    <a:shade val="50000"/>
-                  </a:schemeClr>
-                </a:lnRef>
-                <a:fillRef idx="1">
-                  <a:schemeClr val="accent1"/>
-                </a:fillRef>
-                <a:effectRef idx="0">
-                  <a:schemeClr val="accent1"/>
-                </a:effectRef>
-                <a:fontRef idx="minor">
-                  <a:schemeClr val="lt1"/>
-                </a:fontRef>
-              </p:style>
-              <p:txBody>
-                <a:bodyPr rtlCol="0" anchor="ctr"/>
-                <a:lstStyle/>
-                <a:p>
-                  <a:pPr algn="ctr"/>
-                  <a:endParaRPr lang="tr-TR"/>
-                </a:p>
-              </p:txBody>
-            </p:sp>
-            <p:sp>
-              <p:nvSpPr>
-                <p:cNvPr id="53" name="Oval 52"/>
-                <p:cNvSpPr/>
-                <p:nvPr/>
-              </p:nvSpPr>
-              <p:spPr>
-                <a:xfrm>
-                  <a:off x="2981325" y="6065837"/>
-                  <a:ext cx="304800" cy="304800"/>
-                </a:xfrm>
-                <a:prstGeom prst="ellipse">
-                  <a:avLst/>
-                </a:prstGeom>
-              </p:spPr>
-              <p:style>
-                <a:lnRef idx="2">
-                  <a:schemeClr val="accent1">
-                    <a:shade val="50000"/>
-                  </a:schemeClr>
-                </a:lnRef>
-                <a:fillRef idx="1">
-                  <a:schemeClr val="accent1"/>
-                </a:fillRef>
-                <a:effectRef idx="0">
-                  <a:schemeClr val="accent1"/>
-                </a:effectRef>
-                <a:fontRef idx="minor">
-                  <a:schemeClr val="lt1"/>
-                </a:fontRef>
-              </p:style>
-              <p:txBody>
-                <a:bodyPr rtlCol="0" anchor="ctr"/>
-                <a:lstStyle/>
-                <a:p>
-                  <a:pPr algn="ctr"/>
-                  <a:endParaRPr lang="tr-TR"/>
-                </a:p>
-              </p:txBody>
-            </p:sp>
-            <p:sp>
-              <p:nvSpPr>
-                <p:cNvPr id="54" name="Isosceles Triangle 53"/>
-                <p:cNvSpPr/>
-                <p:nvPr/>
-              </p:nvSpPr>
-              <p:spPr>
-                <a:xfrm>
-                  <a:off x="2600325" y="5151437"/>
-                  <a:ext cx="228600" cy="228600"/>
-                </a:xfrm>
-                <a:prstGeom prst="triangle">
-                  <a:avLst/>
-                </a:prstGeom>
-              </p:spPr>
-              <p:style>
-                <a:lnRef idx="2">
-                  <a:schemeClr val="accent1">
-                    <a:shade val="50000"/>
-                  </a:schemeClr>
-                </a:lnRef>
-                <a:fillRef idx="1">
-                  <a:schemeClr val="accent1"/>
-                </a:fillRef>
-                <a:effectRef idx="0">
-                  <a:schemeClr val="accent1"/>
-                </a:effectRef>
-                <a:fontRef idx="minor">
-                  <a:schemeClr val="lt1"/>
-                </a:fontRef>
-              </p:style>
-              <p:txBody>
-                <a:bodyPr rtlCol="0" anchor="ctr"/>
-                <a:lstStyle/>
-                <a:p>
-                  <a:pPr algn="ctr"/>
-                  <a:endParaRPr lang="tr-TR"/>
-                </a:p>
-              </p:txBody>
-            </p:sp>
-            <p:sp>
-              <p:nvSpPr>
-                <p:cNvPr id="55" name="Isosceles Triangle 54"/>
-                <p:cNvSpPr/>
-                <p:nvPr/>
-              </p:nvSpPr>
-              <p:spPr>
-                <a:xfrm>
-                  <a:off x="3209925" y="5151437"/>
-                  <a:ext cx="228600" cy="228600"/>
-                </a:xfrm>
-                <a:prstGeom prst="triangle">
-                  <a:avLst/>
-                </a:prstGeom>
-              </p:spPr>
-              <p:style>
-                <a:lnRef idx="2">
-                  <a:schemeClr val="accent1">
-                    <a:shade val="50000"/>
-                  </a:schemeClr>
-                </a:lnRef>
-                <a:fillRef idx="1">
-                  <a:schemeClr val="accent1"/>
-                </a:fillRef>
-                <a:effectRef idx="0">
-                  <a:schemeClr val="accent1"/>
-                </a:effectRef>
-                <a:fontRef idx="minor">
-                  <a:schemeClr val="lt1"/>
-                </a:fontRef>
-              </p:style>
-              <p:txBody>
-                <a:bodyPr rtlCol="0" anchor="ctr"/>
-                <a:lstStyle/>
-                <a:p>
-                  <a:pPr algn="ctr"/>
-                  <a:endParaRPr lang="tr-TR"/>
-                </a:p>
-              </p:txBody>
-            </p:sp>
-            <p:sp>
-              <p:nvSpPr>
-                <p:cNvPr id="56" name="Rectangle 55"/>
-                <p:cNvSpPr/>
-                <p:nvPr/>
-              </p:nvSpPr>
-              <p:spPr>
-                <a:xfrm>
-                  <a:off x="3895725" y="5684837"/>
-                  <a:ext cx="381000" cy="228600"/>
-                </a:xfrm>
-                <a:prstGeom prst="rect">
-                  <a:avLst/>
-                </a:prstGeom>
-              </p:spPr>
-              <p:style>
-                <a:lnRef idx="2">
-                  <a:schemeClr val="accent1">
-                    <a:shade val="50000"/>
-                  </a:schemeClr>
-                </a:lnRef>
-                <a:fillRef idx="1">
-                  <a:schemeClr val="accent1"/>
-                </a:fillRef>
-                <a:effectRef idx="0">
-                  <a:schemeClr val="accent1"/>
-                </a:effectRef>
-                <a:fontRef idx="minor">
-                  <a:schemeClr val="lt1"/>
-                </a:fontRef>
-              </p:style>
-              <p:txBody>
-                <a:bodyPr rtlCol="0" anchor="ctr"/>
-                <a:lstStyle/>
-                <a:p>
-                  <a:pPr algn="ctr"/>
-                  <a:endParaRPr lang="tr-TR"/>
-                </a:p>
-              </p:txBody>
-            </p:sp>
-            <p:sp>
-              <p:nvSpPr>
-                <p:cNvPr id="57" name="Rectangle 56"/>
-                <p:cNvSpPr/>
-                <p:nvPr/>
-              </p:nvSpPr>
-              <p:spPr>
-                <a:xfrm>
-                  <a:off x="3286125" y="5532437"/>
-                  <a:ext cx="228600" cy="152400"/>
-                </a:xfrm>
-                <a:prstGeom prst="rect">
-                  <a:avLst/>
-                </a:prstGeom>
-              </p:spPr>
-              <p:style>
-                <a:lnRef idx="2">
-                  <a:schemeClr val="accent1">
-                    <a:shade val="50000"/>
-                  </a:schemeClr>
-                </a:lnRef>
-                <a:fillRef idx="1">
-                  <a:schemeClr val="accent1"/>
-                </a:fillRef>
-                <a:effectRef idx="0">
-                  <a:schemeClr val="accent1"/>
-                </a:effectRef>
-                <a:fontRef idx="minor">
-                  <a:schemeClr val="lt1"/>
-                </a:fontRef>
-              </p:style>
-              <p:txBody>
-                <a:bodyPr rtlCol="0" anchor="ctr"/>
-                <a:lstStyle/>
-                <a:p>
-                  <a:pPr algn="ctr"/>
-                  <a:endParaRPr lang="tr-TR"/>
-                </a:p>
-              </p:txBody>
-            </p:sp>
-          </p:grpSp>
           <p:sp>
             <p:nvSpPr>
-              <p:cNvPr id="59" name="Freeform 58"/>
+              <p:cNvPr id="44" name="Freeform 43"/>
               <p:cNvSpPr/>
               <p:nvPr/>
             </p:nvSpPr>
             <p:spPr>
               <a:xfrm>
-                <a:off x="2982912" y="5456237"/>
-                <a:ext cx="1449387" cy="1060833"/>
+                <a:off x="1914525" y="4770437"/>
+                <a:ext cx="2592387" cy="1746633"/>
               </a:xfrm>
               <a:custGeom>
                 <a:avLst/>
@@ -12878,14 +11450,14 @@
           </p:sp>
           <p:sp>
             <p:nvSpPr>
-              <p:cNvPr id="60" name="Oval 59"/>
+              <p:cNvPr id="46" name="Oval 45"/>
               <p:cNvSpPr/>
               <p:nvPr/>
             </p:nvSpPr>
             <p:spPr>
               <a:xfrm>
-                <a:off x="1001712" y="5380037"/>
-                <a:ext cx="127809" cy="138842"/>
+                <a:off x="2143125" y="5227637"/>
+                <a:ext cx="228600" cy="228600"/>
               </a:xfrm>
               <a:prstGeom prst="ellipse">
                 <a:avLst/>
@@ -12918,14 +11490,14 @@
           </p:sp>
           <p:sp>
             <p:nvSpPr>
-              <p:cNvPr id="62" name="Oval 61"/>
+              <p:cNvPr id="47" name="Oval 46"/>
               <p:cNvSpPr/>
               <p:nvPr/>
             </p:nvSpPr>
             <p:spPr>
               <a:xfrm>
-                <a:off x="1535112" y="5456237"/>
-                <a:ext cx="213015" cy="231404"/>
+                <a:off x="2600325" y="5456237"/>
+                <a:ext cx="381000" cy="381000"/>
               </a:xfrm>
               <a:prstGeom prst="ellipse">
                 <a:avLst/>
@@ -12958,14 +11530,14 @@
           </p:sp>
           <p:sp>
             <p:nvSpPr>
-              <p:cNvPr id="64" name="Oval 63"/>
+              <p:cNvPr id="50" name="Oval 49"/>
               <p:cNvSpPr/>
               <p:nvPr/>
             </p:nvSpPr>
             <p:spPr>
               <a:xfrm>
-                <a:off x="1839912" y="5989637"/>
-                <a:ext cx="127809" cy="138842"/>
+                <a:off x="3667125" y="4999037"/>
+                <a:ext cx="228600" cy="228600"/>
               </a:xfrm>
               <a:prstGeom prst="ellipse">
                 <a:avLst/>
@@ -12998,14 +11570,14 @@
           </p:sp>
           <p:sp>
             <p:nvSpPr>
-              <p:cNvPr id="66" name="Oval 65"/>
+              <p:cNvPr id="52" name="Oval 51"/>
               <p:cNvSpPr/>
               <p:nvPr/>
             </p:nvSpPr>
             <p:spPr>
               <a:xfrm>
-                <a:off x="2297112" y="6523037"/>
-                <a:ext cx="127809" cy="138842"/>
+                <a:off x="3514725" y="5837237"/>
+                <a:ext cx="228600" cy="228600"/>
               </a:xfrm>
               <a:prstGeom prst="ellipse">
                 <a:avLst/>
@@ -13038,14 +11610,14 @@
           </p:sp>
           <p:sp>
             <p:nvSpPr>
-              <p:cNvPr id="68" name="Oval 67"/>
+              <p:cNvPr id="53" name="Oval 52"/>
               <p:cNvSpPr/>
               <p:nvPr/>
             </p:nvSpPr>
             <p:spPr>
               <a:xfrm>
-                <a:off x="1763712" y="6446837"/>
-                <a:ext cx="170412" cy="185123"/>
+                <a:off x="2981325" y="6065837"/>
+                <a:ext cx="304800" cy="304800"/>
               </a:xfrm>
               <a:prstGeom prst="ellipse">
                 <a:avLst/>
@@ -13078,14 +11650,14 @@
           </p:sp>
           <p:sp>
             <p:nvSpPr>
-              <p:cNvPr id="70" name="Isosceles Triangle 69"/>
+              <p:cNvPr id="54" name="Isosceles Triangle 53"/>
               <p:cNvSpPr/>
               <p:nvPr/>
             </p:nvSpPr>
             <p:spPr>
               <a:xfrm>
-                <a:off x="1154112" y="6065837"/>
-                <a:ext cx="127809" cy="138842"/>
+                <a:off x="2600325" y="5151437"/>
+                <a:ext cx="228600" cy="228600"/>
               </a:xfrm>
               <a:prstGeom prst="triangle">
                 <a:avLst/>
@@ -13118,14 +11690,14 @@
           </p:sp>
           <p:sp>
             <p:nvSpPr>
-              <p:cNvPr id="71" name="Isosceles Triangle 70"/>
+              <p:cNvPr id="55" name="Isosceles Triangle 54"/>
               <p:cNvSpPr/>
               <p:nvPr/>
             </p:nvSpPr>
             <p:spPr>
               <a:xfrm>
-                <a:off x="2297112" y="5761037"/>
-                <a:ext cx="127809" cy="138842"/>
+                <a:off x="3209925" y="5151437"/>
+                <a:ext cx="228600" cy="228600"/>
               </a:xfrm>
               <a:prstGeom prst="triangle">
                 <a:avLst/>
@@ -13158,14 +11730,14 @@
           </p:sp>
           <p:sp>
             <p:nvSpPr>
-              <p:cNvPr id="72" name="Rectangle 71"/>
+              <p:cNvPr id="56" name="Rectangle 55"/>
               <p:cNvSpPr/>
               <p:nvPr/>
             </p:nvSpPr>
             <p:spPr>
               <a:xfrm>
-                <a:off x="925512" y="6446837"/>
-                <a:ext cx="213015" cy="138842"/>
+                <a:off x="3895725" y="5684837"/>
+                <a:ext cx="381000" cy="228600"/>
               </a:xfrm>
               <a:prstGeom prst="rect">
                 <a:avLst/>
@@ -13198,14 +11770,14 @@
           </p:sp>
           <p:sp>
             <p:nvSpPr>
-              <p:cNvPr id="74" name="Rectangle 73"/>
+              <p:cNvPr id="57" name="Rectangle 56"/>
               <p:cNvSpPr/>
               <p:nvPr/>
             </p:nvSpPr>
             <p:spPr>
               <a:xfrm>
-                <a:off x="468312" y="5761037"/>
-                <a:ext cx="127809" cy="92561"/>
+                <a:off x="3286125" y="5532437"/>
+                <a:ext cx="228600" cy="152400"/>
               </a:xfrm>
               <a:prstGeom prst="rect">
                 <a:avLst/>
@@ -13236,79 +11808,2463 @@
               </a:p>
             </p:txBody>
           </p:sp>
-          <p:sp>
-            <p:nvSpPr>
-              <p:cNvPr id="75" name="Right Arrow 74"/>
-              <p:cNvSpPr/>
-              <p:nvPr/>
-            </p:nvSpPr>
-            <p:spPr>
-              <a:xfrm>
-                <a:off x="5040312" y="5837237"/>
-                <a:ext cx="838200" cy="381000"/>
-              </a:xfrm>
-              <a:prstGeom prst="rightArrow">
-                <a:avLst/>
-              </a:prstGeom>
-            </p:spPr>
-            <p:style>
-              <a:lnRef idx="2">
-                <a:schemeClr val="accent1">
-                  <a:shade val="50000"/>
-                </a:schemeClr>
-              </a:lnRef>
-              <a:fillRef idx="1">
-                <a:schemeClr val="accent1"/>
-              </a:fillRef>
-              <a:effectRef idx="0">
-                <a:schemeClr val="accent1"/>
-              </a:effectRef>
-              <a:fontRef idx="minor">
-                <a:schemeClr val="lt1"/>
-              </a:fontRef>
-            </p:style>
-            <p:txBody>
-              <a:bodyPr rtlCol="0" anchor="ctr"/>
-              <a:lstStyle/>
-              <a:p>
-                <a:pPr algn="ctr"/>
-                <a:endParaRPr lang="tr-TR"/>
-              </a:p>
-            </p:txBody>
-          </p:sp>
         </p:grpSp>
-        <p:cxnSp>
-          <p:nvCxnSpPr>
-            <p:cNvPr id="105" name="Straight Connector 104"/>
-            <p:cNvCxnSpPr/>
+        <p:sp>
+          <p:nvSpPr>
+            <p:cNvPr id="59" name="Freeform 58"/>
+            <p:cNvSpPr/>
             <p:nvPr/>
-          </p:nvCxnSpPr>
+          </p:nvSpPr>
           <p:spPr>
             <a:xfrm>
-              <a:off x="2113472" y="2130725"/>
-              <a:ext cx="181154" cy="1588"/>
+              <a:off x="2982912" y="5456237"/>
+              <a:ext cx="1449387" cy="1060833"/>
             </a:xfrm>
-            <a:prstGeom prst="line">
+            <a:custGeom>
+              <a:avLst/>
+              <a:gdLst>
+                <a:gd name="connsiteX0" fmla="*/ 800100 w 1724025"/>
+                <a:gd name="connsiteY0" fmla="*/ 7937 h 1238632"/>
+                <a:gd name="connsiteX1" fmla="*/ 790575 w 1724025"/>
+                <a:gd name="connsiteY1" fmla="*/ 55562 h 1238632"/>
+                <a:gd name="connsiteX2" fmla="*/ 809625 w 1724025"/>
+                <a:gd name="connsiteY2" fmla="*/ 169862 h 1238632"/>
+                <a:gd name="connsiteX3" fmla="*/ 828675 w 1724025"/>
+                <a:gd name="connsiteY3" fmla="*/ 198437 h 1238632"/>
+                <a:gd name="connsiteX4" fmla="*/ 1019175 w 1724025"/>
+                <a:gd name="connsiteY4" fmla="*/ 188912 h 1238632"/>
+                <a:gd name="connsiteX5" fmla="*/ 1047750 w 1724025"/>
+                <a:gd name="connsiteY5" fmla="*/ 169862 h 1238632"/>
+                <a:gd name="connsiteX6" fmla="*/ 1076325 w 1724025"/>
+                <a:gd name="connsiteY6" fmla="*/ 160337 h 1238632"/>
+                <a:gd name="connsiteX7" fmla="*/ 1085850 w 1724025"/>
+                <a:gd name="connsiteY7" fmla="*/ 131762 h 1238632"/>
+                <a:gd name="connsiteX8" fmla="*/ 1114425 w 1724025"/>
+                <a:gd name="connsiteY8" fmla="*/ 122237 h 1238632"/>
+                <a:gd name="connsiteX9" fmla="*/ 1143000 w 1724025"/>
+                <a:gd name="connsiteY9" fmla="*/ 103187 h 1238632"/>
+                <a:gd name="connsiteX10" fmla="*/ 1200150 w 1724025"/>
+                <a:gd name="connsiteY10" fmla="*/ 84137 h 1238632"/>
+                <a:gd name="connsiteX11" fmla="*/ 1276350 w 1724025"/>
+                <a:gd name="connsiteY11" fmla="*/ 93662 h 1238632"/>
+                <a:gd name="connsiteX12" fmla="*/ 1333500 w 1724025"/>
+                <a:gd name="connsiteY12" fmla="*/ 112712 h 1238632"/>
+                <a:gd name="connsiteX13" fmla="*/ 1343025 w 1724025"/>
+                <a:gd name="connsiteY13" fmla="*/ 141287 h 1238632"/>
+                <a:gd name="connsiteX14" fmla="*/ 1362075 w 1724025"/>
+                <a:gd name="connsiteY14" fmla="*/ 169862 h 1238632"/>
+                <a:gd name="connsiteX15" fmla="*/ 1381125 w 1724025"/>
+                <a:gd name="connsiteY15" fmla="*/ 227012 h 1238632"/>
+                <a:gd name="connsiteX16" fmla="*/ 1362075 w 1724025"/>
+                <a:gd name="connsiteY16" fmla="*/ 341312 h 1238632"/>
+                <a:gd name="connsiteX17" fmla="*/ 1343025 w 1724025"/>
+                <a:gd name="connsiteY17" fmla="*/ 369887 h 1238632"/>
+                <a:gd name="connsiteX18" fmla="*/ 1352550 w 1724025"/>
+                <a:gd name="connsiteY18" fmla="*/ 474662 h 1238632"/>
+                <a:gd name="connsiteX19" fmla="*/ 1409700 w 1724025"/>
+                <a:gd name="connsiteY19" fmla="*/ 512762 h 1238632"/>
+                <a:gd name="connsiteX20" fmla="*/ 1466850 w 1724025"/>
+                <a:gd name="connsiteY20" fmla="*/ 541337 h 1238632"/>
+                <a:gd name="connsiteX21" fmla="*/ 1504950 w 1724025"/>
+                <a:gd name="connsiteY21" fmla="*/ 550862 h 1238632"/>
+                <a:gd name="connsiteX22" fmla="*/ 1533525 w 1724025"/>
+                <a:gd name="connsiteY22" fmla="*/ 560387 h 1238632"/>
+                <a:gd name="connsiteX23" fmla="*/ 1638300 w 1724025"/>
+                <a:gd name="connsiteY23" fmla="*/ 598487 h 1238632"/>
+                <a:gd name="connsiteX24" fmla="*/ 1666875 w 1724025"/>
+                <a:gd name="connsiteY24" fmla="*/ 608012 h 1238632"/>
+                <a:gd name="connsiteX25" fmla="*/ 1685925 w 1724025"/>
+                <a:gd name="connsiteY25" fmla="*/ 636587 h 1238632"/>
+                <a:gd name="connsiteX26" fmla="*/ 1704975 w 1724025"/>
+                <a:gd name="connsiteY26" fmla="*/ 693737 h 1238632"/>
+                <a:gd name="connsiteX27" fmla="*/ 1724025 w 1724025"/>
+                <a:gd name="connsiteY27" fmla="*/ 779462 h 1238632"/>
+                <a:gd name="connsiteX28" fmla="*/ 1695450 w 1724025"/>
+                <a:gd name="connsiteY28" fmla="*/ 855662 h 1238632"/>
+                <a:gd name="connsiteX29" fmla="*/ 1666875 w 1724025"/>
+                <a:gd name="connsiteY29" fmla="*/ 865187 h 1238632"/>
+                <a:gd name="connsiteX30" fmla="*/ 1638300 w 1724025"/>
+                <a:gd name="connsiteY30" fmla="*/ 884237 h 1238632"/>
+                <a:gd name="connsiteX31" fmla="*/ 1400175 w 1724025"/>
+                <a:gd name="connsiteY31" fmla="*/ 893762 h 1238632"/>
+                <a:gd name="connsiteX32" fmla="*/ 1333500 w 1724025"/>
+                <a:gd name="connsiteY32" fmla="*/ 912812 h 1238632"/>
+                <a:gd name="connsiteX33" fmla="*/ 1276350 w 1724025"/>
+                <a:gd name="connsiteY33" fmla="*/ 931862 h 1238632"/>
+                <a:gd name="connsiteX34" fmla="*/ 1219200 w 1724025"/>
+                <a:gd name="connsiteY34" fmla="*/ 969962 h 1238632"/>
+                <a:gd name="connsiteX35" fmla="*/ 1162050 w 1724025"/>
+                <a:gd name="connsiteY35" fmla="*/ 1008062 h 1238632"/>
+                <a:gd name="connsiteX36" fmla="*/ 1133475 w 1724025"/>
+                <a:gd name="connsiteY36" fmla="*/ 1027112 h 1238632"/>
+                <a:gd name="connsiteX37" fmla="*/ 1057275 w 1724025"/>
+                <a:gd name="connsiteY37" fmla="*/ 1141412 h 1238632"/>
+                <a:gd name="connsiteX38" fmla="*/ 1038225 w 1724025"/>
+                <a:gd name="connsiteY38" fmla="*/ 1169987 h 1238632"/>
+                <a:gd name="connsiteX39" fmla="*/ 942975 w 1724025"/>
+                <a:gd name="connsiteY39" fmla="*/ 1208087 h 1238632"/>
+                <a:gd name="connsiteX40" fmla="*/ 895350 w 1724025"/>
+                <a:gd name="connsiteY40" fmla="*/ 1217612 h 1238632"/>
+                <a:gd name="connsiteX41" fmla="*/ 781050 w 1724025"/>
+                <a:gd name="connsiteY41" fmla="*/ 1236662 h 1238632"/>
+                <a:gd name="connsiteX42" fmla="*/ 571500 w 1724025"/>
+                <a:gd name="connsiteY42" fmla="*/ 1227137 h 1238632"/>
+                <a:gd name="connsiteX43" fmla="*/ 552450 w 1724025"/>
+                <a:gd name="connsiteY43" fmla="*/ 1198562 h 1238632"/>
+                <a:gd name="connsiteX44" fmla="*/ 542925 w 1724025"/>
+                <a:gd name="connsiteY44" fmla="*/ 969962 h 1238632"/>
+                <a:gd name="connsiteX45" fmla="*/ 523875 w 1724025"/>
+                <a:gd name="connsiteY45" fmla="*/ 855662 h 1238632"/>
+                <a:gd name="connsiteX46" fmla="*/ 495300 w 1724025"/>
+                <a:gd name="connsiteY46" fmla="*/ 798512 h 1238632"/>
+                <a:gd name="connsiteX47" fmla="*/ 438150 w 1724025"/>
+                <a:gd name="connsiteY47" fmla="*/ 760412 h 1238632"/>
+                <a:gd name="connsiteX48" fmla="*/ 342900 w 1724025"/>
+                <a:gd name="connsiteY48" fmla="*/ 731837 h 1238632"/>
+                <a:gd name="connsiteX49" fmla="*/ 257175 w 1724025"/>
+                <a:gd name="connsiteY49" fmla="*/ 712787 h 1238632"/>
+                <a:gd name="connsiteX50" fmla="*/ 228600 w 1724025"/>
+                <a:gd name="connsiteY50" fmla="*/ 703262 h 1238632"/>
+                <a:gd name="connsiteX51" fmla="*/ 142875 w 1724025"/>
+                <a:gd name="connsiteY51" fmla="*/ 684212 h 1238632"/>
+                <a:gd name="connsiteX52" fmla="*/ 104775 w 1724025"/>
+                <a:gd name="connsiteY52" fmla="*/ 655637 h 1238632"/>
+                <a:gd name="connsiteX53" fmla="*/ 57150 w 1724025"/>
+                <a:gd name="connsiteY53" fmla="*/ 608012 h 1238632"/>
+                <a:gd name="connsiteX54" fmla="*/ 28575 w 1724025"/>
+                <a:gd name="connsiteY54" fmla="*/ 550862 h 1238632"/>
+                <a:gd name="connsiteX55" fmla="*/ 9525 w 1724025"/>
+                <a:gd name="connsiteY55" fmla="*/ 484187 h 1238632"/>
+                <a:gd name="connsiteX56" fmla="*/ 0 w 1724025"/>
+                <a:gd name="connsiteY56" fmla="*/ 455612 h 1238632"/>
+                <a:gd name="connsiteX57" fmla="*/ 9525 w 1724025"/>
+                <a:gd name="connsiteY57" fmla="*/ 360362 h 1238632"/>
+                <a:gd name="connsiteX58" fmla="*/ 47625 w 1724025"/>
+                <a:gd name="connsiteY58" fmla="*/ 303212 h 1238632"/>
+                <a:gd name="connsiteX59" fmla="*/ 76200 w 1724025"/>
+                <a:gd name="connsiteY59" fmla="*/ 274637 h 1238632"/>
+                <a:gd name="connsiteX60" fmla="*/ 171450 w 1724025"/>
+                <a:gd name="connsiteY60" fmla="*/ 217487 h 1238632"/>
+                <a:gd name="connsiteX61" fmla="*/ 200025 w 1724025"/>
+                <a:gd name="connsiteY61" fmla="*/ 207962 h 1238632"/>
+                <a:gd name="connsiteX62" fmla="*/ 333375 w 1724025"/>
+                <a:gd name="connsiteY62" fmla="*/ 188912 h 1238632"/>
+                <a:gd name="connsiteX63" fmla="*/ 495300 w 1724025"/>
+                <a:gd name="connsiteY63" fmla="*/ 179387 h 1238632"/>
+                <a:gd name="connsiteX64" fmla="*/ 523875 w 1724025"/>
+                <a:gd name="connsiteY64" fmla="*/ 169862 h 1238632"/>
+                <a:gd name="connsiteX65" fmla="*/ 590550 w 1724025"/>
+                <a:gd name="connsiteY65" fmla="*/ 93662 h 1238632"/>
+                <a:gd name="connsiteX66" fmla="*/ 609600 w 1724025"/>
+                <a:gd name="connsiteY66" fmla="*/ 65087 h 1238632"/>
+                <a:gd name="connsiteX67" fmla="*/ 628650 w 1724025"/>
+                <a:gd name="connsiteY67" fmla="*/ 36512 h 1238632"/>
+                <a:gd name="connsiteX68" fmla="*/ 685800 w 1724025"/>
+                <a:gd name="connsiteY68" fmla="*/ 7937 h 1238632"/>
+                <a:gd name="connsiteX69" fmla="*/ 800100 w 1724025"/>
+                <a:gd name="connsiteY69" fmla="*/ 7937 h 1238632"/>
+              </a:gdLst>
+              <a:ahLst/>
+              <a:cxnLst>
+                <a:cxn ang="0">
+                  <a:pos x="connsiteX0" y="connsiteY0"/>
+                </a:cxn>
+                <a:cxn ang="0">
+                  <a:pos x="connsiteX1" y="connsiteY1"/>
+                </a:cxn>
+                <a:cxn ang="0">
+                  <a:pos x="connsiteX2" y="connsiteY2"/>
+                </a:cxn>
+                <a:cxn ang="0">
+                  <a:pos x="connsiteX3" y="connsiteY3"/>
+                </a:cxn>
+                <a:cxn ang="0">
+                  <a:pos x="connsiteX4" y="connsiteY4"/>
+                </a:cxn>
+                <a:cxn ang="0">
+                  <a:pos x="connsiteX5" y="connsiteY5"/>
+                </a:cxn>
+                <a:cxn ang="0">
+                  <a:pos x="connsiteX6" y="connsiteY6"/>
+                </a:cxn>
+                <a:cxn ang="0">
+                  <a:pos x="connsiteX7" y="connsiteY7"/>
+                </a:cxn>
+                <a:cxn ang="0">
+                  <a:pos x="connsiteX8" y="connsiteY8"/>
+                </a:cxn>
+                <a:cxn ang="0">
+                  <a:pos x="connsiteX9" y="connsiteY9"/>
+                </a:cxn>
+                <a:cxn ang="0">
+                  <a:pos x="connsiteX10" y="connsiteY10"/>
+                </a:cxn>
+                <a:cxn ang="0">
+                  <a:pos x="connsiteX11" y="connsiteY11"/>
+                </a:cxn>
+                <a:cxn ang="0">
+                  <a:pos x="connsiteX12" y="connsiteY12"/>
+                </a:cxn>
+                <a:cxn ang="0">
+                  <a:pos x="connsiteX13" y="connsiteY13"/>
+                </a:cxn>
+                <a:cxn ang="0">
+                  <a:pos x="connsiteX14" y="connsiteY14"/>
+                </a:cxn>
+                <a:cxn ang="0">
+                  <a:pos x="connsiteX15" y="connsiteY15"/>
+                </a:cxn>
+                <a:cxn ang="0">
+                  <a:pos x="connsiteX16" y="connsiteY16"/>
+                </a:cxn>
+                <a:cxn ang="0">
+                  <a:pos x="connsiteX17" y="connsiteY17"/>
+                </a:cxn>
+                <a:cxn ang="0">
+                  <a:pos x="connsiteX18" y="connsiteY18"/>
+                </a:cxn>
+                <a:cxn ang="0">
+                  <a:pos x="connsiteX19" y="connsiteY19"/>
+                </a:cxn>
+                <a:cxn ang="0">
+                  <a:pos x="connsiteX20" y="connsiteY20"/>
+                </a:cxn>
+                <a:cxn ang="0">
+                  <a:pos x="connsiteX21" y="connsiteY21"/>
+                </a:cxn>
+                <a:cxn ang="0">
+                  <a:pos x="connsiteX22" y="connsiteY22"/>
+                </a:cxn>
+                <a:cxn ang="0">
+                  <a:pos x="connsiteX23" y="connsiteY23"/>
+                </a:cxn>
+                <a:cxn ang="0">
+                  <a:pos x="connsiteX24" y="connsiteY24"/>
+                </a:cxn>
+                <a:cxn ang="0">
+                  <a:pos x="connsiteX25" y="connsiteY25"/>
+                </a:cxn>
+                <a:cxn ang="0">
+                  <a:pos x="connsiteX26" y="connsiteY26"/>
+                </a:cxn>
+                <a:cxn ang="0">
+                  <a:pos x="connsiteX27" y="connsiteY27"/>
+                </a:cxn>
+                <a:cxn ang="0">
+                  <a:pos x="connsiteX28" y="connsiteY28"/>
+                </a:cxn>
+                <a:cxn ang="0">
+                  <a:pos x="connsiteX29" y="connsiteY29"/>
+                </a:cxn>
+                <a:cxn ang="0">
+                  <a:pos x="connsiteX30" y="connsiteY30"/>
+                </a:cxn>
+                <a:cxn ang="0">
+                  <a:pos x="connsiteX31" y="connsiteY31"/>
+                </a:cxn>
+                <a:cxn ang="0">
+                  <a:pos x="connsiteX32" y="connsiteY32"/>
+                </a:cxn>
+                <a:cxn ang="0">
+                  <a:pos x="connsiteX33" y="connsiteY33"/>
+                </a:cxn>
+                <a:cxn ang="0">
+                  <a:pos x="connsiteX34" y="connsiteY34"/>
+                </a:cxn>
+                <a:cxn ang="0">
+                  <a:pos x="connsiteX35" y="connsiteY35"/>
+                </a:cxn>
+                <a:cxn ang="0">
+                  <a:pos x="connsiteX36" y="connsiteY36"/>
+                </a:cxn>
+                <a:cxn ang="0">
+                  <a:pos x="connsiteX37" y="connsiteY37"/>
+                </a:cxn>
+                <a:cxn ang="0">
+                  <a:pos x="connsiteX38" y="connsiteY38"/>
+                </a:cxn>
+                <a:cxn ang="0">
+                  <a:pos x="connsiteX39" y="connsiteY39"/>
+                </a:cxn>
+                <a:cxn ang="0">
+                  <a:pos x="connsiteX40" y="connsiteY40"/>
+                </a:cxn>
+                <a:cxn ang="0">
+                  <a:pos x="connsiteX41" y="connsiteY41"/>
+                </a:cxn>
+                <a:cxn ang="0">
+                  <a:pos x="connsiteX42" y="connsiteY42"/>
+                </a:cxn>
+                <a:cxn ang="0">
+                  <a:pos x="connsiteX43" y="connsiteY43"/>
+                </a:cxn>
+                <a:cxn ang="0">
+                  <a:pos x="connsiteX44" y="connsiteY44"/>
+                </a:cxn>
+                <a:cxn ang="0">
+                  <a:pos x="connsiteX45" y="connsiteY45"/>
+                </a:cxn>
+                <a:cxn ang="0">
+                  <a:pos x="connsiteX46" y="connsiteY46"/>
+                </a:cxn>
+                <a:cxn ang="0">
+                  <a:pos x="connsiteX47" y="connsiteY47"/>
+                </a:cxn>
+                <a:cxn ang="0">
+                  <a:pos x="connsiteX48" y="connsiteY48"/>
+                </a:cxn>
+                <a:cxn ang="0">
+                  <a:pos x="connsiteX49" y="connsiteY49"/>
+                </a:cxn>
+                <a:cxn ang="0">
+                  <a:pos x="connsiteX50" y="connsiteY50"/>
+                </a:cxn>
+                <a:cxn ang="0">
+                  <a:pos x="connsiteX51" y="connsiteY51"/>
+                </a:cxn>
+                <a:cxn ang="0">
+                  <a:pos x="connsiteX52" y="connsiteY52"/>
+                </a:cxn>
+                <a:cxn ang="0">
+                  <a:pos x="connsiteX53" y="connsiteY53"/>
+                </a:cxn>
+                <a:cxn ang="0">
+                  <a:pos x="connsiteX54" y="connsiteY54"/>
+                </a:cxn>
+                <a:cxn ang="0">
+                  <a:pos x="connsiteX55" y="connsiteY55"/>
+                </a:cxn>
+                <a:cxn ang="0">
+                  <a:pos x="connsiteX56" y="connsiteY56"/>
+                </a:cxn>
+                <a:cxn ang="0">
+                  <a:pos x="connsiteX57" y="connsiteY57"/>
+                </a:cxn>
+                <a:cxn ang="0">
+                  <a:pos x="connsiteX58" y="connsiteY58"/>
+                </a:cxn>
+                <a:cxn ang="0">
+                  <a:pos x="connsiteX59" y="connsiteY59"/>
+                </a:cxn>
+                <a:cxn ang="0">
+                  <a:pos x="connsiteX60" y="connsiteY60"/>
+                </a:cxn>
+                <a:cxn ang="0">
+                  <a:pos x="connsiteX61" y="connsiteY61"/>
+                </a:cxn>
+                <a:cxn ang="0">
+                  <a:pos x="connsiteX62" y="connsiteY62"/>
+                </a:cxn>
+                <a:cxn ang="0">
+                  <a:pos x="connsiteX63" y="connsiteY63"/>
+                </a:cxn>
+                <a:cxn ang="0">
+                  <a:pos x="connsiteX64" y="connsiteY64"/>
+                </a:cxn>
+                <a:cxn ang="0">
+                  <a:pos x="connsiteX65" y="connsiteY65"/>
+                </a:cxn>
+                <a:cxn ang="0">
+                  <a:pos x="connsiteX66" y="connsiteY66"/>
+                </a:cxn>
+                <a:cxn ang="0">
+                  <a:pos x="connsiteX67" y="connsiteY67"/>
+                </a:cxn>
+                <a:cxn ang="0">
+                  <a:pos x="connsiteX68" y="connsiteY68"/>
+                </a:cxn>
+                <a:cxn ang="0">
+                  <a:pos x="connsiteX69" y="connsiteY69"/>
+                </a:cxn>
+              </a:cxnLst>
+              <a:rect l="l" t="t" r="r" b="b"/>
+              <a:pathLst>
+                <a:path w="1724025" h="1238632">
+                  <a:moveTo>
+                    <a:pt x="800100" y="7937"/>
+                  </a:moveTo>
+                  <a:cubicBezTo>
+                    <a:pt x="817562" y="15874"/>
+                    <a:pt x="790575" y="39373"/>
+                    <a:pt x="790575" y="55562"/>
+                  </a:cubicBezTo>
+                  <a:cubicBezTo>
+                    <a:pt x="790575" y="76688"/>
+                    <a:pt x="794722" y="140055"/>
+                    <a:pt x="809625" y="169862"/>
+                  </a:cubicBezTo>
+                  <a:cubicBezTo>
+                    <a:pt x="814745" y="180101"/>
+                    <a:pt x="822325" y="188912"/>
+                    <a:pt x="828675" y="198437"/>
+                  </a:cubicBezTo>
+                  <a:cubicBezTo>
+                    <a:pt x="892175" y="195262"/>
+                    <a:pt x="956130" y="197135"/>
+                    <a:pt x="1019175" y="188912"/>
+                  </a:cubicBezTo>
+                  <a:cubicBezTo>
+                    <a:pt x="1030526" y="187431"/>
+                    <a:pt x="1037511" y="174982"/>
+                    <a:pt x="1047750" y="169862"/>
+                  </a:cubicBezTo>
+                  <a:cubicBezTo>
+                    <a:pt x="1056730" y="165372"/>
+                    <a:pt x="1066800" y="163512"/>
+                    <a:pt x="1076325" y="160337"/>
+                  </a:cubicBezTo>
+                  <a:cubicBezTo>
+                    <a:pt x="1079500" y="150812"/>
+                    <a:pt x="1078750" y="138862"/>
+                    <a:pt x="1085850" y="131762"/>
+                  </a:cubicBezTo>
+                  <a:cubicBezTo>
+                    <a:pt x="1092950" y="124662"/>
+                    <a:pt x="1105445" y="126727"/>
+                    <a:pt x="1114425" y="122237"/>
+                  </a:cubicBezTo>
+                  <a:cubicBezTo>
+                    <a:pt x="1124664" y="117117"/>
+                    <a:pt x="1132539" y="107836"/>
+                    <a:pt x="1143000" y="103187"/>
+                  </a:cubicBezTo>
+                  <a:cubicBezTo>
+                    <a:pt x="1161350" y="95032"/>
+                    <a:pt x="1200150" y="84137"/>
+                    <a:pt x="1200150" y="84137"/>
+                  </a:cubicBezTo>
+                  <a:cubicBezTo>
+                    <a:pt x="1225550" y="87312"/>
+                    <a:pt x="1251321" y="88299"/>
+                    <a:pt x="1276350" y="93662"/>
+                  </a:cubicBezTo>
+                  <a:cubicBezTo>
+                    <a:pt x="1295985" y="97869"/>
+                    <a:pt x="1333500" y="112712"/>
+                    <a:pt x="1333500" y="112712"/>
+                  </a:cubicBezTo>
+                  <a:cubicBezTo>
+                    <a:pt x="1336675" y="122237"/>
+                    <a:pt x="1338535" y="132307"/>
+                    <a:pt x="1343025" y="141287"/>
+                  </a:cubicBezTo>
+                  <a:cubicBezTo>
+                    <a:pt x="1348145" y="151526"/>
+                    <a:pt x="1357426" y="159401"/>
+                    <a:pt x="1362075" y="169862"/>
+                  </a:cubicBezTo>
+                  <a:cubicBezTo>
+                    <a:pt x="1370230" y="188212"/>
+                    <a:pt x="1381125" y="227012"/>
+                    <a:pt x="1381125" y="227012"/>
+                  </a:cubicBezTo>
+                  <a:cubicBezTo>
+                    <a:pt x="1378107" y="254174"/>
+                    <a:pt x="1378032" y="309397"/>
+                    <a:pt x="1362075" y="341312"/>
+                  </a:cubicBezTo>
+                  <a:cubicBezTo>
+                    <a:pt x="1356955" y="351551"/>
+                    <a:pt x="1349375" y="360362"/>
+                    <a:pt x="1343025" y="369887"/>
+                  </a:cubicBezTo>
+                  <a:cubicBezTo>
+                    <a:pt x="1346200" y="404812"/>
+                    <a:pt x="1337720" y="442883"/>
+                    <a:pt x="1352550" y="474662"/>
+                  </a:cubicBezTo>
+                  <a:cubicBezTo>
+                    <a:pt x="1362232" y="495409"/>
+                    <a:pt x="1387980" y="505522"/>
+                    <a:pt x="1409700" y="512762"/>
+                  </a:cubicBezTo>
+                  <a:cubicBezTo>
+                    <a:pt x="1530107" y="552898"/>
+                    <a:pt x="1337599" y="485944"/>
+                    <a:pt x="1466850" y="541337"/>
+                  </a:cubicBezTo>
+                  <a:cubicBezTo>
+                    <a:pt x="1478882" y="546494"/>
+                    <a:pt x="1492363" y="547266"/>
+                    <a:pt x="1504950" y="550862"/>
+                  </a:cubicBezTo>
+                  <a:cubicBezTo>
+                    <a:pt x="1514604" y="553620"/>
+                    <a:pt x="1524124" y="556862"/>
+                    <a:pt x="1533525" y="560387"/>
+                  </a:cubicBezTo>
+                  <a:cubicBezTo>
+                    <a:pt x="1639556" y="600149"/>
+                    <a:pt x="1518232" y="558464"/>
+                    <a:pt x="1638300" y="598487"/>
+                  </a:cubicBezTo>
+                  <a:lnTo>
+                    <a:pt x="1666875" y="608012"/>
+                  </a:lnTo>
+                  <a:cubicBezTo>
+                    <a:pt x="1673225" y="617537"/>
+                    <a:pt x="1681276" y="626126"/>
+                    <a:pt x="1685925" y="636587"/>
+                  </a:cubicBezTo>
+                  <a:cubicBezTo>
+                    <a:pt x="1694080" y="654937"/>
+                    <a:pt x="1698625" y="674687"/>
+                    <a:pt x="1704975" y="693737"/>
+                  </a:cubicBezTo>
+                  <a:cubicBezTo>
+                    <a:pt x="1720607" y="740634"/>
+                    <a:pt x="1712849" y="712408"/>
+                    <a:pt x="1724025" y="779462"/>
+                  </a:cubicBezTo>
+                  <a:cubicBezTo>
+                    <a:pt x="1718862" y="805278"/>
+                    <a:pt x="1718809" y="836975"/>
+                    <a:pt x="1695450" y="855662"/>
+                  </a:cubicBezTo>
+                  <a:cubicBezTo>
+                    <a:pt x="1687610" y="861934"/>
+                    <a:pt x="1675855" y="860697"/>
+                    <a:pt x="1666875" y="865187"/>
+                  </a:cubicBezTo>
+                  <a:cubicBezTo>
+                    <a:pt x="1656636" y="870307"/>
+                    <a:pt x="1649682" y="883017"/>
+                    <a:pt x="1638300" y="884237"/>
+                  </a:cubicBezTo>
+                  <a:cubicBezTo>
+                    <a:pt x="1559314" y="892700"/>
+                    <a:pt x="1479550" y="890587"/>
+                    <a:pt x="1400175" y="893762"/>
+                  </a:cubicBezTo>
+                  <a:cubicBezTo>
+                    <a:pt x="1304143" y="925773"/>
+                    <a:pt x="1453101" y="876932"/>
+                    <a:pt x="1333500" y="912812"/>
+                  </a:cubicBezTo>
+                  <a:cubicBezTo>
+                    <a:pt x="1314266" y="918582"/>
+                    <a:pt x="1293058" y="920723"/>
+                    <a:pt x="1276350" y="931862"/>
+                  </a:cubicBezTo>
+                  <a:lnTo>
+                    <a:pt x="1219200" y="969962"/>
+                  </a:lnTo>
+                  <a:lnTo>
+                    <a:pt x="1162050" y="1008062"/>
+                  </a:lnTo>
+                  <a:lnTo>
+                    <a:pt x="1133475" y="1027112"/>
+                  </a:lnTo>
+                  <a:lnTo>
+                    <a:pt x="1057275" y="1141412"/>
+                  </a:lnTo>
+                  <a:cubicBezTo>
+                    <a:pt x="1050925" y="1150937"/>
+                    <a:pt x="1048464" y="1164867"/>
+                    <a:pt x="1038225" y="1169987"/>
+                  </a:cubicBezTo>
+                  <a:cubicBezTo>
+                    <a:pt x="1004358" y="1186920"/>
+                    <a:pt x="982209" y="1200240"/>
+                    <a:pt x="942975" y="1208087"/>
+                  </a:cubicBezTo>
+                  <a:cubicBezTo>
+                    <a:pt x="927100" y="1211262"/>
+                    <a:pt x="911293" y="1214799"/>
+                    <a:pt x="895350" y="1217612"/>
+                  </a:cubicBezTo>
+                  <a:lnTo>
+                    <a:pt x="781050" y="1236662"/>
+                  </a:lnTo>
+                  <a:cubicBezTo>
+                    <a:pt x="711200" y="1233487"/>
+                    <a:pt x="640471" y="1238632"/>
+                    <a:pt x="571500" y="1227137"/>
+                  </a:cubicBezTo>
+                  <a:cubicBezTo>
+                    <a:pt x="560208" y="1225255"/>
+                    <a:pt x="553714" y="1209940"/>
+                    <a:pt x="552450" y="1198562"/>
+                  </a:cubicBezTo>
+                  <a:cubicBezTo>
+                    <a:pt x="544028" y="1122762"/>
+                    <a:pt x="547835" y="1046070"/>
+                    <a:pt x="542925" y="969962"/>
+                  </a:cubicBezTo>
+                  <a:cubicBezTo>
+                    <a:pt x="541522" y="948223"/>
+                    <a:pt x="530295" y="881341"/>
+                    <a:pt x="523875" y="855662"/>
+                  </a:cubicBezTo>
+                  <a:cubicBezTo>
+                    <a:pt x="519255" y="837182"/>
+                    <a:pt x="510199" y="811549"/>
+                    <a:pt x="495300" y="798512"/>
+                  </a:cubicBezTo>
+                  <a:cubicBezTo>
+                    <a:pt x="478070" y="783435"/>
+                    <a:pt x="459870" y="767652"/>
+                    <a:pt x="438150" y="760412"/>
+                  </a:cubicBezTo>
+                  <a:cubicBezTo>
+                    <a:pt x="302337" y="715141"/>
+                    <a:pt x="443667" y="760627"/>
+                    <a:pt x="342900" y="731837"/>
+                  </a:cubicBezTo>
+                  <a:cubicBezTo>
+                    <a:pt x="230329" y="699674"/>
+                    <a:pt x="450556" y="755761"/>
+                    <a:pt x="257175" y="712787"/>
+                  </a:cubicBezTo>
+                  <a:cubicBezTo>
+                    <a:pt x="247374" y="710609"/>
+                    <a:pt x="238401" y="705440"/>
+                    <a:pt x="228600" y="703262"/>
+                  </a:cubicBezTo>
+                  <a:cubicBezTo>
+                    <a:pt x="128020" y="680911"/>
+                    <a:pt x="207201" y="705654"/>
+                    <a:pt x="142875" y="684212"/>
+                  </a:cubicBezTo>
+                  <a:cubicBezTo>
+                    <a:pt x="130175" y="674687"/>
+                    <a:pt x="116000" y="666862"/>
+                    <a:pt x="104775" y="655637"/>
+                  </a:cubicBezTo>
+                  <a:cubicBezTo>
+                    <a:pt x="41275" y="592137"/>
+                    <a:pt x="133350" y="658812"/>
+                    <a:pt x="57150" y="608012"/>
+                  </a:cubicBezTo>
+                  <a:cubicBezTo>
+                    <a:pt x="33209" y="536188"/>
+                    <a:pt x="65504" y="624720"/>
+                    <a:pt x="28575" y="550862"/>
+                  </a:cubicBezTo>
+                  <a:cubicBezTo>
+                    <a:pt x="20962" y="535637"/>
+                    <a:pt x="13594" y="498429"/>
+                    <a:pt x="9525" y="484187"/>
+                  </a:cubicBezTo>
+                  <a:cubicBezTo>
+                    <a:pt x="6767" y="474533"/>
+                    <a:pt x="3175" y="465137"/>
+                    <a:pt x="0" y="455612"/>
+                  </a:cubicBezTo>
+                  <a:cubicBezTo>
+                    <a:pt x="3175" y="423862"/>
+                    <a:pt x="8" y="390818"/>
+                    <a:pt x="9525" y="360362"/>
+                  </a:cubicBezTo>
+                  <a:cubicBezTo>
+                    <a:pt x="16354" y="338509"/>
+                    <a:pt x="31436" y="319401"/>
+                    <a:pt x="47625" y="303212"/>
+                  </a:cubicBezTo>
+                  <a:cubicBezTo>
+                    <a:pt x="57150" y="293687"/>
+                    <a:pt x="65567" y="282907"/>
+                    <a:pt x="76200" y="274637"/>
+                  </a:cubicBezTo>
+                  <a:cubicBezTo>
+                    <a:pt x="103901" y="253092"/>
+                    <a:pt x="138462" y="231625"/>
+                    <a:pt x="171450" y="217487"/>
+                  </a:cubicBezTo>
+                  <a:cubicBezTo>
+                    <a:pt x="180678" y="213532"/>
+                    <a:pt x="190224" y="210140"/>
+                    <a:pt x="200025" y="207962"/>
+                  </a:cubicBezTo>
+                  <a:cubicBezTo>
+                    <a:pt x="227472" y="201863"/>
+                    <a:pt x="310847" y="190714"/>
+                    <a:pt x="333375" y="188912"/>
+                  </a:cubicBezTo>
+                  <a:cubicBezTo>
+                    <a:pt x="387271" y="184600"/>
+                    <a:pt x="441325" y="182562"/>
+                    <a:pt x="495300" y="179387"/>
+                  </a:cubicBezTo>
+                  <a:cubicBezTo>
+                    <a:pt x="504825" y="176212"/>
+                    <a:pt x="514895" y="174352"/>
+                    <a:pt x="523875" y="169862"/>
+                  </a:cubicBezTo>
+                  <a:cubicBezTo>
+                    <a:pt x="563563" y="150018"/>
+                    <a:pt x="561975" y="136525"/>
+                    <a:pt x="590550" y="93662"/>
+                  </a:cubicBezTo>
+                  <a:lnTo>
+                    <a:pt x="609600" y="65087"/>
+                  </a:lnTo>
+                  <a:cubicBezTo>
+                    <a:pt x="615950" y="55562"/>
+                    <a:pt x="617790" y="40132"/>
+                    <a:pt x="628650" y="36512"/>
+                  </a:cubicBezTo>
+                  <a:cubicBezTo>
+                    <a:pt x="668085" y="23367"/>
+                    <a:pt x="648871" y="32556"/>
+                    <a:pt x="685800" y="7937"/>
+                  </a:cubicBezTo>
+                  <a:cubicBezTo>
+                    <a:pt x="784209" y="17778"/>
+                    <a:pt x="782638" y="0"/>
+                    <a:pt x="800100" y="7937"/>
+                  </a:cubicBezTo>
+                  <a:close/>
+                </a:path>
+              </a:pathLst>
+            </a:custGeom>
+            <a:noFill/>
+          </p:spPr>
+          <p:style>
+            <a:lnRef idx="2">
+              <a:schemeClr val="accent1">
+                <a:shade val="50000"/>
+              </a:schemeClr>
+            </a:lnRef>
+            <a:fillRef idx="1">
+              <a:schemeClr val="accent1"/>
+            </a:fillRef>
+            <a:effectRef idx="0">
+              <a:schemeClr val="accent1"/>
+            </a:effectRef>
+            <a:fontRef idx="minor">
+              <a:schemeClr val="lt1"/>
+            </a:fontRef>
+          </p:style>
+          <p:txBody>
+            <a:bodyPr rtlCol="0" anchor="ctr"/>
+            <a:lstStyle/>
+            <a:p>
+              <a:pPr algn="ctr"/>
+              <a:endParaRPr lang="tr-TR"/>
+            </a:p>
+          </p:txBody>
+        </p:sp>
+        <p:sp>
+          <p:nvSpPr>
+            <p:cNvPr id="60" name="Oval 59"/>
+            <p:cNvSpPr/>
+            <p:nvPr/>
+          </p:nvSpPr>
+          <p:spPr>
+            <a:xfrm>
+              <a:off x="1001712" y="5380037"/>
+              <a:ext cx="127809" cy="138842"/>
+            </a:xfrm>
+            <a:prstGeom prst="ellipse">
               <a:avLst/>
             </a:prstGeom>
-            <a:ln w="15875"/>
           </p:spPr>
           <p:style>
-            <a:lnRef idx="1">
-              <a:schemeClr val="accent1"/>
+            <a:lnRef idx="2">
+              <a:schemeClr val="accent1">
+                <a:shade val="50000"/>
+              </a:schemeClr>
             </a:lnRef>
-            <a:fillRef idx="0">
+            <a:fillRef idx="1">
               <a:schemeClr val="accent1"/>
             </a:fillRef>
             <a:effectRef idx="0">
               <a:schemeClr val="accent1"/>
             </a:effectRef>
             <a:fontRef idx="minor">
-              <a:schemeClr val="tx1"/>
+              <a:schemeClr val="lt1"/>
             </a:fontRef>
           </p:style>
-        </p:cxnSp>
+          <p:txBody>
+            <a:bodyPr rtlCol="0" anchor="ctr"/>
+            <a:lstStyle/>
+            <a:p>
+              <a:pPr algn="ctr"/>
+              <a:endParaRPr lang="tr-TR"/>
+            </a:p>
+          </p:txBody>
+        </p:sp>
+        <p:sp>
+          <p:nvSpPr>
+            <p:cNvPr id="62" name="Oval 61"/>
+            <p:cNvSpPr/>
+            <p:nvPr/>
+          </p:nvSpPr>
+          <p:spPr>
+            <a:xfrm>
+              <a:off x="1535112" y="5456237"/>
+              <a:ext cx="213015" cy="231404"/>
+            </a:xfrm>
+            <a:prstGeom prst="ellipse">
+              <a:avLst/>
+            </a:prstGeom>
+          </p:spPr>
+          <p:style>
+            <a:lnRef idx="2">
+              <a:schemeClr val="accent1">
+                <a:shade val="50000"/>
+              </a:schemeClr>
+            </a:lnRef>
+            <a:fillRef idx="1">
+              <a:schemeClr val="accent1"/>
+            </a:fillRef>
+            <a:effectRef idx="0">
+              <a:schemeClr val="accent1"/>
+            </a:effectRef>
+            <a:fontRef idx="minor">
+              <a:schemeClr val="lt1"/>
+            </a:fontRef>
+          </p:style>
+          <p:txBody>
+            <a:bodyPr rtlCol="0" anchor="ctr"/>
+            <a:lstStyle/>
+            <a:p>
+              <a:pPr algn="ctr"/>
+              <a:endParaRPr lang="tr-TR"/>
+            </a:p>
+          </p:txBody>
+        </p:sp>
+        <p:sp>
+          <p:nvSpPr>
+            <p:cNvPr id="64" name="Oval 63"/>
+            <p:cNvSpPr/>
+            <p:nvPr/>
+          </p:nvSpPr>
+          <p:spPr>
+            <a:xfrm>
+              <a:off x="1839912" y="5989637"/>
+              <a:ext cx="127809" cy="138842"/>
+            </a:xfrm>
+            <a:prstGeom prst="ellipse">
+              <a:avLst/>
+            </a:prstGeom>
+          </p:spPr>
+          <p:style>
+            <a:lnRef idx="2">
+              <a:schemeClr val="accent1">
+                <a:shade val="50000"/>
+              </a:schemeClr>
+            </a:lnRef>
+            <a:fillRef idx="1">
+              <a:schemeClr val="accent1"/>
+            </a:fillRef>
+            <a:effectRef idx="0">
+              <a:schemeClr val="accent1"/>
+            </a:effectRef>
+            <a:fontRef idx="minor">
+              <a:schemeClr val="lt1"/>
+            </a:fontRef>
+          </p:style>
+          <p:txBody>
+            <a:bodyPr rtlCol="0" anchor="ctr"/>
+            <a:lstStyle/>
+            <a:p>
+              <a:pPr algn="ctr"/>
+              <a:endParaRPr lang="tr-TR"/>
+            </a:p>
+          </p:txBody>
+        </p:sp>
+        <p:sp>
+          <p:nvSpPr>
+            <p:cNvPr id="66" name="Oval 65"/>
+            <p:cNvSpPr/>
+            <p:nvPr/>
+          </p:nvSpPr>
+          <p:spPr>
+            <a:xfrm>
+              <a:off x="2297112" y="6523037"/>
+              <a:ext cx="127809" cy="138842"/>
+            </a:xfrm>
+            <a:prstGeom prst="ellipse">
+              <a:avLst/>
+            </a:prstGeom>
+          </p:spPr>
+          <p:style>
+            <a:lnRef idx="2">
+              <a:schemeClr val="accent1">
+                <a:shade val="50000"/>
+              </a:schemeClr>
+            </a:lnRef>
+            <a:fillRef idx="1">
+              <a:schemeClr val="accent1"/>
+            </a:fillRef>
+            <a:effectRef idx="0">
+              <a:schemeClr val="accent1"/>
+            </a:effectRef>
+            <a:fontRef idx="minor">
+              <a:schemeClr val="lt1"/>
+            </a:fontRef>
+          </p:style>
+          <p:txBody>
+            <a:bodyPr rtlCol="0" anchor="ctr"/>
+            <a:lstStyle/>
+            <a:p>
+              <a:pPr algn="ctr"/>
+              <a:endParaRPr lang="tr-TR"/>
+            </a:p>
+          </p:txBody>
+        </p:sp>
+        <p:sp>
+          <p:nvSpPr>
+            <p:cNvPr id="68" name="Oval 67"/>
+            <p:cNvSpPr/>
+            <p:nvPr/>
+          </p:nvSpPr>
+          <p:spPr>
+            <a:xfrm>
+              <a:off x="1763712" y="6446837"/>
+              <a:ext cx="170412" cy="185123"/>
+            </a:xfrm>
+            <a:prstGeom prst="ellipse">
+              <a:avLst/>
+            </a:prstGeom>
+          </p:spPr>
+          <p:style>
+            <a:lnRef idx="2">
+              <a:schemeClr val="accent1">
+                <a:shade val="50000"/>
+              </a:schemeClr>
+            </a:lnRef>
+            <a:fillRef idx="1">
+              <a:schemeClr val="accent1"/>
+            </a:fillRef>
+            <a:effectRef idx="0">
+              <a:schemeClr val="accent1"/>
+            </a:effectRef>
+            <a:fontRef idx="minor">
+              <a:schemeClr val="lt1"/>
+            </a:fontRef>
+          </p:style>
+          <p:txBody>
+            <a:bodyPr rtlCol="0" anchor="ctr"/>
+            <a:lstStyle/>
+            <a:p>
+              <a:pPr algn="ctr"/>
+              <a:endParaRPr lang="tr-TR"/>
+            </a:p>
+          </p:txBody>
+        </p:sp>
+        <p:sp>
+          <p:nvSpPr>
+            <p:cNvPr id="70" name="Isosceles Triangle 69"/>
+            <p:cNvSpPr/>
+            <p:nvPr/>
+          </p:nvSpPr>
+          <p:spPr>
+            <a:xfrm>
+              <a:off x="1154112" y="6065837"/>
+              <a:ext cx="127809" cy="138842"/>
+            </a:xfrm>
+            <a:prstGeom prst="triangle">
+              <a:avLst/>
+            </a:prstGeom>
+          </p:spPr>
+          <p:style>
+            <a:lnRef idx="2">
+              <a:schemeClr val="accent1">
+                <a:shade val="50000"/>
+              </a:schemeClr>
+            </a:lnRef>
+            <a:fillRef idx="1">
+              <a:schemeClr val="accent1"/>
+            </a:fillRef>
+            <a:effectRef idx="0">
+              <a:schemeClr val="accent1"/>
+            </a:effectRef>
+            <a:fontRef idx="minor">
+              <a:schemeClr val="lt1"/>
+            </a:fontRef>
+          </p:style>
+          <p:txBody>
+            <a:bodyPr rtlCol="0" anchor="ctr"/>
+            <a:lstStyle/>
+            <a:p>
+              <a:pPr algn="ctr"/>
+              <a:endParaRPr lang="tr-TR"/>
+            </a:p>
+          </p:txBody>
+        </p:sp>
+        <p:sp>
+          <p:nvSpPr>
+            <p:cNvPr id="71" name="Isosceles Triangle 70"/>
+            <p:cNvSpPr/>
+            <p:nvPr/>
+          </p:nvSpPr>
+          <p:spPr>
+            <a:xfrm>
+              <a:off x="2297112" y="5761037"/>
+              <a:ext cx="127809" cy="138842"/>
+            </a:xfrm>
+            <a:prstGeom prst="triangle">
+              <a:avLst/>
+            </a:prstGeom>
+          </p:spPr>
+          <p:style>
+            <a:lnRef idx="2">
+              <a:schemeClr val="accent1">
+                <a:shade val="50000"/>
+              </a:schemeClr>
+            </a:lnRef>
+            <a:fillRef idx="1">
+              <a:schemeClr val="accent1"/>
+            </a:fillRef>
+            <a:effectRef idx="0">
+              <a:schemeClr val="accent1"/>
+            </a:effectRef>
+            <a:fontRef idx="minor">
+              <a:schemeClr val="lt1"/>
+            </a:fontRef>
+          </p:style>
+          <p:txBody>
+            <a:bodyPr rtlCol="0" anchor="ctr"/>
+            <a:lstStyle/>
+            <a:p>
+              <a:pPr algn="ctr"/>
+              <a:endParaRPr lang="tr-TR"/>
+            </a:p>
+          </p:txBody>
+        </p:sp>
+        <p:sp>
+          <p:nvSpPr>
+            <p:cNvPr id="72" name="Rectangle 71"/>
+            <p:cNvSpPr/>
+            <p:nvPr/>
+          </p:nvSpPr>
+          <p:spPr>
+            <a:xfrm>
+              <a:off x="925512" y="6446837"/>
+              <a:ext cx="213015" cy="138842"/>
+            </a:xfrm>
+            <a:prstGeom prst="rect">
+              <a:avLst/>
+            </a:prstGeom>
+          </p:spPr>
+          <p:style>
+            <a:lnRef idx="2">
+              <a:schemeClr val="accent1">
+                <a:shade val="50000"/>
+              </a:schemeClr>
+            </a:lnRef>
+            <a:fillRef idx="1">
+              <a:schemeClr val="accent1"/>
+            </a:fillRef>
+            <a:effectRef idx="0">
+              <a:schemeClr val="accent1"/>
+            </a:effectRef>
+            <a:fontRef idx="minor">
+              <a:schemeClr val="lt1"/>
+            </a:fontRef>
+          </p:style>
+          <p:txBody>
+            <a:bodyPr rtlCol="0" anchor="ctr"/>
+            <a:lstStyle/>
+            <a:p>
+              <a:pPr algn="ctr"/>
+              <a:endParaRPr lang="tr-TR"/>
+            </a:p>
+          </p:txBody>
+        </p:sp>
+        <p:sp>
+          <p:nvSpPr>
+            <p:cNvPr id="74" name="Rectangle 73"/>
+            <p:cNvSpPr/>
+            <p:nvPr/>
+          </p:nvSpPr>
+          <p:spPr>
+            <a:xfrm>
+              <a:off x="468312" y="5761037"/>
+              <a:ext cx="127809" cy="92561"/>
+            </a:xfrm>
+            <a:prstGeom prst="rect">
+              <a:avLst/>
+            </a:prstGeom>
+          </p:spPr>
+          <p:style>
+            <a:lnRef idx="2">
+              <a:schemeClr val="accent1">
+                <a:shade val="50000"/>
+              </a:schemeClr>
+            </a:lnRef>
+            <a:fillRef idx="1">
+              <a:schemeClr val="accent1"/>
+            </a:fillRef>
+            <a:effectRef idx="0">
+              <a:schemeClr val="accent1"/>
+            </a:effectRef>
+            <a:fontRef idx="minor">
+              <a:schemeClr val="lt1"/>
+            </a:fontRef>
+          </p:style>
+          <p:txBody>
+            <a:bodyPr rtlCol="0" anchor="ctr"/>
+            <a:lstStyle/>
+            <a:p>
+              <a:pPr algn="ctr"/>
+              <a:endParaRPr lang="tr-TR"/>
+            </a:p>
+          </p:txBody>
+        </p:sp>
+        <p:sp>
+          <p:nvSpPr>
+            <p:cNvPr id="75" name="Right Arrow 74"/>
+            <p:cNvSpPr/>
+            <p:nvPr/>
+          </p:nvSpPr>
+          <p:spPr>
+            <a:xfrm>
+              <a:off x="5040312" y="5837237"/>
+              <a:ext cx="838200" cy="381000"/>
+            </a:xfrm>
+            <a:prstGeom prst="rightArrow">
+              <a:avLst/>
+            </a:prstGeom>
+          </p:spPr>
+          <p:style>
+            <a:lnRef idx="2">
+              <a:schemeClr val="accent1">
+                <a:shade val="50000"/>
+              </a:schemeClr>
+            </a:lnRef>
+            <a:fillRef idx="1">
+              <a:schemeClr val="accent1"/>
+            </a:fillRef>
+            <a:effectRef idx="0">
+              <a:schemeClr val="accent1"/>
+            </a:effectRef>
+            <a:fontRef idx="minor">
+              <a:schemeClr val="lt1"/>
+            </a:fontRef>
+          </p:style>
+          <p:txBody>
+            <a:bodyPr rtlCol="0" anchor="ctr"/>
+            <a:lstStyle/>
+            <a:p>
+              <a:pPr algn="ctr"/>
+              <a:endParaRPr lang="tr-TR"/>
+            </a:p>
+          </p:txBody>
+        </p:sp>
       </p:grpSp>
+      <p:sp>
+        <p:nvSpPr>
+          <p:cNvPr id="4" name="TextBox 3"/>
+          <p:cNvSpPr txBox="1"/>
+          <p:nvPr/>
+        </p:nvSpPr>
+        <p:spPr>
+          <a:xfrm>
+            <a:off x="2290319" y="1738176"/>
+            <a:ext cx="1008358" cy="422310"/>
+          </a:xfrm>
+          <a:prstGeom prst="rect">
+            <a:avLst/>
+          </a:prstGeom>
+          <a:noFill/>
+          <a:ln w="15875">
+            <a:solidFill>
+              <a:schemeClr val="accent1">
+                <a:shade val="95000"/>
+                <a:satMod val="105000"/>
+              </a:schemeClr>
+            </a:solidFill>
+          </a:ln>
+        </p:spPr>
+        <p:txBody>
+          <a:bodyPr wrap="square" lIns="82945" tIns="41473" rIns="82945" bIns="41473" rtlCol="0">
+            <a:spAutoFit/>
+          </a:bodyPr>
+          <a:lstStyle/>
+          <a:p>
+            <a:pPr algn="ctr"/>
+            <a:r>
+              <a:rPr lang="en-US" sz="1100" dirty="0" smtClean="0"/>
+              <a:t>Local </a:t>
+            </a:r>
+            <a:r>
+              <a:rPr lang="en-US" sz="1100" dirty="0" err="1" smtClean="0"/>
+              <a:t>Trilateration</a:t>
+            </a:r>
+            <a:endParaRPr lang="tr-TR" sz="1100" dirty="0"/>
+          </a:p>
+        </p:txBody>
+      </p:sp>
+      <p:sp>
+        <p:nvSpPr>
+          <p:cNvPr id="5" name="TextBox 4"/>
+          <p:cNvSpPr txBox="1"/>
+          <p:nvPr/>
+        </p:nvSpPr>
+        <p:spPr>
+          <a:xfrm>
+            <a:off x="3715919" y="1728160"/>
+            <a:ext cx="967680" cy="437699"/>
+          </a:xfrm>
+          <a:prstGeom prst="rect">
+            <a:avLst/>
+          </a:prstGeom>
+          <a:noFill/>
+          <a:ln w="15875">
+            <a:solidFill>
+              <a:schemeClr val="accent1">
+                <a:shade val="95000"/>
+                <a:satMod val="105000"/>
+              </a:schemeClr>
+            </a:solidFill>
+          </a:ln>
+        </p:spPr>
+        <p:txBody>
+          <a:bodyPr wrap="square" lIns="82945" tIns="41473" rIns="82945" bIns="41473" rtlCol="0">
+            <a:spAutoFit/>
+          </a:bodyPr>
+          <a:lstStyle/>
+          <a:p>
+            <a:pPr algn="ctr"/>
+            <a:r>
+              <a:rPr lang="en-US" sz="1100" dirty="0" smtClean="0"/>
+              <a:t>Route Table</a:t>
+            </a:r>
+          </a:p>
+          <a:p>
+            <a:pPr algn="ctr"/>
+            <a:r>
+              <a:rPr lang="en-US" sz="1100" dirty="0" smtClean="0"/>
+              <a:t> Algorithms</a:t>
+            </a:r>
+            <a:endParaRPr lang="tr-TR" sz="1100" dirty="0"/>
+          </a:p>
+        </p:txBody>
+      </p:sp>
+      <p:sp>
+        <p:nvSpPr>
+          <p:cNvPr id="6" name="TextBox 5"/>
+          <p:cNvSpPr txBox="1"/>
+          <p:nvPr/>
+        </p:nvSpPr>
+        <p:spPr>
+          <a:xfrm>
+            <a:off x="1046159" y="3309446"/>
+            <a:ext cx="1105920" cy="591587"/>
+          </a:xfrm>
+          <a:prstGeom prst="rect">
+            <a:avLst/>
+          </a:prstGeom>
+          <a:noFill/>
+          <a:ln w="15875">
+            <a:solidFill>
+              <a:schemeClr val="accent1">
+                <a:shade val="95000"/>
+                <a:satMod val="105000"/>
+              </a:schemeClr>
+            </a:solidFill>
+          </a:ln>
+        </p:spPr>
+        <p:txBody>
+          <a:bodyPr wrap="square" lIns="82945" tIns="41473" rIns="82945" bIns="41473" rtlCol="0">
+            <a:spAutoFit/>
+          </a:bodyPr>
+          <a:lstStyle/>
+          <a:p>
+            <a:pPr algn="ctr"/>
+            <a:r>
+              <a:rPr lang="en-US" sz="1100" dirty="0" smtClean="0"/>
+              <a:t>State </a:t>
+            </a:r>
+            <a:r>
+              <a:rPr lang="en-US" sz="1100" dirty="0" err="1" smtClean="0"/>
+              <a:t>Propogation</a:t>
+            </a:r>
+            <a:endParaRPr lang="en-US" sz="1100" dirty="0" smtClean="0"/>
+          </a:p>
+          <a:p>
+            <a:pPr algn="ctr"/>
+            <a:endParaRPr lang="tr-TR" sz="1100" dirty="0"/>
+          </a:p>
+        </p:txBody>
+      </p:sp>
+      <p:sp>
+        <p:nvSpPr>
+          <p:cNvPr id="7" name="TextBox 6"/>
+          <p:cNvSpPr txBox="1"/>
+          <p:nvPr/>
+        </p:nvSpPr>
+        <p:spPr>
+          <a:xfrm>
+            <a:off x="2705039" y="3102064"/>
+            <a:ext cx="967680" cy="606976"/>
+          </a:xfrm>
+          <a:prstGeom prst="rect">
+            <a:avLst/>
+          </a:prstGeom>
+          <a:noFill/>
+          <a:ln w="15875">
+            <a:solidFill>
+              <a:schemeClr val="accent1">
+                <a:shade val="95000"/>
+                <a:satMod val="105000"/>
+              </a:schemeClr>
+            </a:solidFill>
+          </a:ln>
+        </p:spPr>
+        <p:txBody>
+          <a:bodyPr wrap="square" lIns="82945" tIns="41473" rIns="82945" bIns="41473" rtlCol="0">
+            <a:spAutoFit/>
+          </a:bodyPr>
+          <a:lstStyle/>
+          <a:p>
+            <a:pPr algn="ctr"/>
+            <a:r>
+              <a:rPr lang="en-US" sz="1100" dirty="0" smtClean="0"/>
+              <a:t>State Estimator</a:t>
+            </a:r>
+          </a:p>
+          <a:p>
+            <a:pPr algn="ctr"/>
+            <a:endParaRPr lang="tr-TR" sz="1100" dirty="0"/>
+          </a:p>
+        </p:txBody>
+      </p:sp>
+      <p:sp>
+        <p:nvSpPr>
+          <p:cNvPr id="8" name="TextBox 7"/>
+          <p:cNvSpPr txBox="1"/>
+          <p:nvPr/>
+        </p:nvSpPr>
+        <p:spPr>
+          <a:xfrm>
+            <a:off x="4709519" y="2341664"/>
+            <a:ext cx="414720" cy="437699"/>
+          </a:xfrm>
+          <a:prstGeom prst="rect">
+            <a:avLst/>
+          </a:prstGeom>
+          <a:noFill/>
+          <a:ln w="6350">
+            <a:solidFill>
+              <a:schemeClr val="accent1">
+                <a:shade val="95000"/>
+                <a:satMod val="105000"/>
+              </a:schemeClr>
+            </a:solidFill>
+            <a:prstDash val="dash"/>
+          </a:ln>
+        </p:spPr>
+        <p:txBody>
+          <a:bodyPr wrap="square" lIns="82945" tIns="41473" rIns="82945" bIns="41473" rtlCol="0">
+            <a:spAutoFit/>
+          </a:bodyPr>
+          <a:lstStyle/>
+          <a:p>
+            <a:pPr algn="ctr"/>
+            <a:endParaRPr lang="en-US" sz="1100" dirty="0" smtClean="0"/>
+          </a:p>
+          <a:p>
+            <a:pPr algn="ctr"/>
+            <a:endParaRPr lang="tr-TR" sz="1100" dirty="0"/>
+          </a:p>
+        </p:txBody>
+      </p:sp>
+      <p:sp>
+        <p:nvSpPr>
+          <p:cNvPr id="9" name="TextBox 8"/>
+          <p:cNvSpPr txBox="1"/>
+          <p:nvPr/>
+        </p:nvSpPr>
+        <p:spPr>
+          <a:xfrm>
+            <a:off x="3931920" y="2341664"/>
+            <a:ext cx="887259" cy="406921"/>
+          </a:xfrm>
+          <a:prstGeom prst="rect">
+            <a:avLst/>
+          </a:prstGeom>
+          <a:noFill/>
+        </p:spPr>
+        <p:txBody>
+          <a:bodyPr wrap="none" lIns="82945" tIns="41473" rIns="82945" bIns="41473" rtlCol="0">
+            <a:spAutoFit/>
+          </a:bodyPr>
+          <a:lstStyle/>
+          <a:p>
+            <a:pPr algn="ctr"/>
+            <a:r>
+              <a:rPr lang="en-US" sz="1000" dirty="0" smtClean="0"/>
+              <a:t>Localization </a:t>
+            </a:r>
+          </a:p>
+          <a:p>
+            <a:pPr algn="ctr"/>
+            <a:r>
+              <a:rPr lang="en-US" sz="1000" dirty="0" smtClean="0"/>
+              <a:t>Timer</a:t>
+            </a:r>
+            <a:endParaRPr lang="tr-TR" sz="1000" dirty="0"/>
+          </a:p>
+        </p:txBody>
+      </p:sp>
+      <p:cxnSp>
+        <p:nvCxnSpPr>
+          <p:cNvPr id="11" name="Straight Connector 10"/>
+          <p:cNvCxnSpPr/>
+          <p:nvPr/>
+        </p:nvCxnSpPr>
+        <p:spPr>
+          <a:xfrm rot="5400000" flipH="1" flipV="1">
+            <a:off x="4640370" y="2203410"/>
+            <a:ext cx="553018" cy="1440"/>
+          </a:xfrm>
+          <a:prstGeom prst="line">
+            <a:avLst/>
+          </a:prstGeom>
+          <a:ln w="15875"/>
+        </p:spPr>
+        <p:style>
+          <a:lnRef idx="1">
+            <a:schemeClr val="accent1"/>
+          </a:lnRef>
+          <a:fillRef idx="0">
+            <a:schemeClr val="accent1"/>
+          </a:fillRef>
+          <a:effectRef idx="0">
+            <a:schemeClr val="accent1"/>
+          </a:effectRef>
+          <a:fontRef idx="minor">
+            <a:schemeClr val="tx1"/>
+          </a:fontRef>
+        </p:style>
+      </p:cxnSp>
+      <p:cxnSp>
+        <p:nvCxnSpPr>
+          <p:cNvPr id="13" name="Straight Arrow Connector 12"/>
+          <p:cNvCxnSpPr/>
+          <p:nvPr/>
+        </p:nvCxnSpPr>
+        <p:spPr>
+          <a:xfrm rot="10800000">
+            <a:off x="4709519" y="1926900"/>
+            <a:ext cx="207360" cy="1441"/>
+          </a:xfrm>
+          <a:prstGeom prst="straightConnector1">
+            <a:avLst/>
+          </a:prstGeom>
+          <a:ln w="15875">
+            <a:tailEnd type="arrow"/>
+          </a:ln>
+        </p:spPr>
+        <p:style>
+          <a:lnRef idx="1">
+            <a:schemeClr val="accent1"/>
+          </a:lnRef>
+          <a:fillRef idx="0">
+            <a:schemeClr val="accent1"/>
+          </a:fillRef>
+          <a:effectRef idx="0">
+            <a:schemeClr val="accent1"/>
+          </a:effectRef>
+          <a:fontRef idx="minor">
+            <a:schemeClr val="tx1"/>
+          </a:fontRef>
+        </p:style>
+      </p:cxnSp>
+      <p:cxnSp>
+        <p:nvCxnSpPr>
+          <p:cNvPr id="15" name="Straight Arrow Connector 14"/>
+          <p:cNvCxnSpPr>
+            <a:stCxn id="5" idx="1"/>
+            <a:endCxn id="4" idx="3"/>
+          </p:cNvCxnSpPr>
+          <p:nvPr/>
+        </p:nvCxnSpPr>
+        <p:spPr>
+          <a:xfrm rot="10800000" flipV="1">
+            <a:off x="3298677" y="1947009"/>
+            <a:ext cx="417242" cy="2321"/>
+          </a:xfrm>
+          <a:prstGeom prst="straightConnector1">
+            <a:avLst/>
+          </a:prstGeom>
+          <a:ln w="15875">
+            <a:tailEnd type="arrow"/>
+          </a:ln>
+        </p:spPr>
+        <p:style>
+          <a:lnRef idx="1">
+            <a:schemeClr val="accent1"/>
+          </a:lnRef>
+          <a:fillRef idx="0">
+            <a:schemeClr val="accent1"/>
+          </a:fillRef>
+          <a:effectRef idx="0">
+            <a:schemeClr val="accent1"/>
+          </a:effectRef>
+          <a:fontRef idx="minor">
+            <a:schemeClr val="tx1"/>
+          </a:fontRef>
+        </p:style>
+      </p:cxnSp>
+      <p:cxnSp>
+        <p:nvCxnSpPr>
+          <p:cNvPr id="20" name="Straight Connector 19"/>
+          <p:cNvCxnSpPr/>
+          <p:nvPr/>
+        </p:nvCxnSpPr>
+        <p:spPr>
+          <a:xfrm rot="16200000" flipH="1">
+            <a:off x="1557405" y="2678164"/>
+            <a:ext cx="1112134" cy="1"/>
+          </a:xfrm>
+          <a:prstGeom prst="line">
+            <a:avLst/>
+          </a:prstGeom>
+          <a:ln w="15875"/>
+        </p:spPr>
+        <p:style>
+          <a:lnRef idx="1">
+            <a:schemeClr val="accent1"/>
+          </a:lnRef>
+          <a:fillRef idx="0">
+            <a:schemeClr val="accent1"/>
+          </a:fillRef>
+          <a:effectRef idx="0">
+            <a:schemeClr val="accent1"/>
+          </a:effectRef>
+          <a:fontRef idx="minor">
+            <a:schemeClr val="tx1"/>
+          </a:fontRef>
+        </p:style>
+      </p:cxnSp>
+      <p:cxnSp>
+        <p:nvCxnSpPr>
+          <p:cNvPr id="22" name="Straight Arrow Connector 21"/>
+          <p:cNvCxnSpPr/>
+          <p:nvPr/>
+        </p:nvCxnSpPr>
+        <p:spPr>
+          <a:xfrm>
+            <a:off x="2104845" y="3234906"/>
+            <a:ext cx="600194" cy="6854"/>
+          </a:xfrm>
+          <a:prstGeom prst="straightConnector1">
+            <a:avLst/>
+          </a:prstGeom>
+          <a:ln w="15875">
+            <a:tailEnd type="arrow"/>
+          </a:ln>
+        </p:spPr>
+        <p:style>
+          <a:lnRef idx="1">
+            <a:schemeClr val="accent1"/>
+          </a:lnRef>
+          <a:fillRef idx="0">
+            <a:schemeClr val="accent1"/>
+          </a:fillRef>
+          <a:effectRef idx="0">
+            <a:schemeClr val="accent1"/>
+          </a:effectRef>
+          <a:fontRef idx="minor">
+            <a:schemeClr val="tx1"/>
+          </a:fontRef>
+        </p:style>
+      </p:cxnSp>
+      <p:cxnSp>
+        <p:nvCxnSpPr>
+          <p:cNvPr id="26" name="Straight Connector 25"/>
+          <p:cNvCxnSpPr/>
+          <p:nvPr/>
+        </p:nvCxnSpPr>
+        <p:spPr>
+          <a:xfrm flipV="1">
+            <a:off x="4916879" y="2549046"/>
+            <a:ext cx="138240" cy="71152"/>
+          </a:xfrm>
+          <a:prstGeom prst="line">
+            <a:avLst/>
+          </a:prstGeom>
+          <a:ln w="15875"/>
+        </p:spPr>
+        <p:style>
+          <a:lnRef idx="1">
+            <a:schemeClr val="accent1"/>
+          </a:lnRef>
+          <a:fillRef idx="0">
+            <a:schemeClr val="accent1"/>
+          </a:fillRef>
+          <a:effectRef idx="0">
+            <a:schemeClr val="accent1"/>
+          </a:effectRef>
+          <a:fontRef idx="minor">
+            <a:schemeClr val="tx1"/>
+          </a:fontRef>
+        </p:style>
+      </p:cxnSp>
+      <p:cxnSp>
+        <p:nvCxnSpPr>
+          <p:cNvPr id="29" name="Straight Connector 28"/>
+          <p:cNvCxnSpPr/>
+          <p:nvPr/>
+        </p:nvCxnSpPr>
+        <p:spPr>
+          <a:xfrm rot="5400000">
+            <a:off x="4536679" y="2998373"/>
+            <a:ext cx="760400" cy="1440"/>
+          </a:xfrm>
+          <a:prstGeom prst="line">
+            <a:avLst/>
+          </a:prstGeom>
+          <a:ln w="15875"/>
+        </p:spPr>
+        <p:style>
+          <a:lnRef idx="1">
+            <a:schemeClr val="accent1"/>
+          </a:lnRef>
+          <a:fillRef idx="0">
+            <a:schemeClr val="accent1"/>
+          </a:fillRef>
+          <a:effectRef idx="0">
+            <a:schemeClr val="accent1"/>
+          </a:effectRef>
+          <a:fontRef idx="minor">
+            <a:schemeClr val="tx1"/>
+          </a:fontRef>
+        </p:style>
+      </p:cxnSp>
+      <p:cxnSp>
+        <p:nvCxnSpPr>
+          <p:cNvPr id="31" name="Straight Connector 30"/>
+          <p:cNvCxnSpPr>
+            <a:stCxn id="7" idx="3"/>
+          </p:cNvCxnSpPr>
+          <p:nvPr/>
+        </p:nvCxnSpPr>
+        <p:spPr>
+          <a:xfrm flipV="1">
+            <a:off x="3672719" y="3378574"/>
+            <a:ext cx="1244160" cy="26978"/>
+          </a:xfrm>
+          <a:prstGeom prst="line">
+            <a:avLst/>
+          </a:prstGeom>
+          <a:ln w="15875"/>
+        </p:spPr>
+        <p:style>
+          <a:lnRef idx="1">
+            <a:schemeClr val="accent1"/>
+          </a:lnRef>
+          <a:fillRef idx="0">
+            <a:schemeClr val="accent1"/>
+          </a:fillRef>
+          <a:effectRef idx="0">
+            <a:schemeClr val="accent1"/>
+          </a:effectRef>
+          <a:fontRef idx="minor">
+            <a:schemeClr val="tx1"/>
+          </a:fontRef>
+        </p:style>
+      </p:cxnSp>
+      <p:sp>
+        <p:nvSpPr>
+          <p:cNvPr id="35" name="TextBox 34"/>
+          <p:cNvSpPr txBox="1"/>
+          <p:nvPr/>
+        </p:nvSpPr>
+        <p:spPr>
+          <a:xfrm>
+            <a:off x="6299279" y="3067500"/>
+            <a:ext cx="967680" cy="606976"/>
+          </a:xfrm>
+          <a:prstGeom prst="rect">
+            <a:avLst/>
+          </a:prstGeom>
+          <a:noFill/>
+          <a:ln w="15875">
+            <a:solidFill>
+              <a:schemeClr val="accent1">
+                <a:shade val="95000"/>
+                <a:satMod val="105000"/>
+              </a:schemeClr>
+            </a:solidFill>
+          </a:ln>
+        </p:spPr>
+        <p:txBody>
+          <a:bodyPr wrap="square" lIns="82945" tIns="41473" rIns="82945" bIns="41473" rtlCol="0">
+            <a:spAutoFit/>
+          </a:bodyPr>
+          <a:lstStyle/>
+          <a:p>
+            <a:pPr algn="ctr"/>
+            <a:r>
+              <a:rPr lang="en-US" sz="1100" dirty="0" smtClean="0"/>
+              <a:t>Formation Control</a:t>
+            </a:r>
+          </a:p>
+          <a:p>
+            <a:pPr algn="ctr"/>
+            <a:endParaRPr lang="tr-TR" sz="1100" dirty="0"/>
+          </a:p>
+        </p:txBody>
+      </p:sp>
+      <p:cxnSp>
+        <p:nvCxnSpPr>
+          <p:cNvPr id="37" name="Straight Arrow Connector 36"/>
+          <p:cNvCxnSpPr>
+            <a:endCxn id="35" idx="1"/>
+          </p:cNvCxnSpPr>
+          <p:nvPr/>
+        </p:nvCxnSpPr>
+        <p:spPr>
+          <a:xfrm flipV="1">
+            <a:off x="4916879" y="3370988"/>
+            <a:ext cx="1382400" cy="7585"/>
+          </a:xfrm>
+          <a:prstGeom prst="straightConnector1">
+            <a:avLst/>
+          </a:prstGeom>
+          <a:ln w="15875">
+            <a:tailEnd type="arrow"/>
+          </a:ln>
+        </p:spPr>
+        <p:style>
+          <a:lnRef idx="1">
+            <a:schemeClr val="accent1"/>
+          </a:lnRef>
+          <a:fillRef idx="0">
+            <a:schemeClr val="accent1"/>
+          </a:fillRef>
+          <a:effectRef idx="0">
+            <a:schemeClr val="accent1"/>
+          </a:effectRef>
+          <a:fontRef idx="minor">
+            <a:schemeClr val="tx1"/>
+          </a:fontRef>
+        </p:style>
+      </p:cxnSp>
+      <p:sp>
+        <p:nvSpPr>
+          <p:cNvPr id="41" name="TextBox 40"/>
+          <p:cNvSpPr txBox="1"/>
+          <p:nvPr/>
+        </p:nvSpPr>
+        <p:spPr>
+          <a:xfrm>
+            <a:off x="5625083" y="4346355"/>
+            <a:ext cx="768637" cy="406921"/>
+          </a:xfrm>
+          <a:prstGeom prst="rect">
+            <a:avLst/>
+          </a:prstGeom>
+          <a:noFill/>
+        </p:spPr>
+        <p:txBody>
+          <a:bodyPr wrap="none" lIns="82945" tIns="41473" rIns="82945" bIns="41473" rtlCol="0">
+            <a:spAutoFit/>
+          </a:bodyPr>
+          <a:lstStyle/>
+          <a:p>
+            <a:pPr algn="ctr"/>
+            <a:r>
+              <a:rPr lang="en-US" sz="1000" dirty="0" smtClean="0"/>
+              <a:t>Formation</a:t>
+            </a:r>
+          </a:p>
+          <a:p>
+            <a:pPr algn="ctr"/>
+            <a:r>
+              <a:rPr lang="en-US" sz="1000" dirty="0" smtClean="0"/>
+              <a:t>Shape</a:t>
+            </a:r>
+            <a:endParaRPr lang="tr-TR" sz="1000" dirty="0"/>
+          </a:p>
+        </p:txBody>
+      </p:sp>
+      <p:cxnSp>
+        <p:nvCxnSpPr>
+          <p:cNvPr id="45" name="Straight Arrow Connector 44"/>
+          <p:cNvCxnSpPr/>
+          <p:nvPr/>
+        </p:nvCxnSpPr>
+        <p:spPr>
+          <a:xfrm rot="16200000" flipV="1">
+            <a:off x="6342435" y="4113051"/>
+            <a:ext cx="872732" cy="8640"/>
+          </a:xfrm>
+          <a:prstGeom prst="straightConnector1">
+            <a:avLst/>
+          </a:prstGeom>
+          <a:ln w="15875">
+            <a:tailEnd type="arrow"/>
+          </a:ln>
+        </p:spPr>
+        <p:style>
+          <a:lnRef idx="1">
+            <a:schemeClr val="accent1"/>
+          </a:lnRef>
+          <a:fillRef idx="0">
+            <a:schemeClr val="accent1"/>
+          </a:fillRef>
+          <a:effectRef idx="0">
+            <a:schemeClr val="accent1"/>
+          </a:effectRef>
+          <a:fontRef idx="minor">
+            <a:schemeClr val="tx1"/>
+          </a:fontRef>
+        </p:style>
+      </p:cxnSp>
+      <p:cxnSp>
+        <p:nvCxnSpPr>
+          <p:cNvPr id="48" name="Straight Connector 47"/>
+          <p:cNvCxnSpPr/>
+          <p:nvPr/>
+        </p:nvCxnSpPr>
+        <p:spPr>
+          <a:xfrm>
+            <a:off x="6230159" y="4553736"/>
+            <a:ext cx="552960" cy="1441"/>
+          </a:xfrm>
+          <a:prstGeom prst="line">
+            <a:avLst/>
+          </a:prstGeom>
+          <a:ln w="15875"/>
+        </p:spPr>
+        <p:style>
+          <a:lnRef idx="1">
+            <a:schemeClr val="accent1"/>
+          </a:lnRef>
+          <a:fillRef idx="0">
+            <a:schemeClr val="accent1"/>
+          </a:fillRef>
+          <a:effectRef idx="0">
+            <a:schemeClr val="accent1"/>
+          </a:effectRef>
+          <a:fontRef idx="minor">
+            <a:schemeClr val="tx1"/>
+          </a:fontRef>
+        </p:style>
+      </p:cxnSp>
+      <p:sp>
+        <p:nvSpPr>
+          <p:cNvPr id="49" name="TextBox 48"/>
+          <p:cNvSpPr txBox="1"/>
+          <p:nvPr/>
+        </p:nvSpPr>
+        <p:spPr>
+          <a:xfrm>
+            <a:off x="7681679" y="3067500"/>
+            <a:ext cx="967680" cy="591587"/>
+          </a:xfrm>
+          <a:prstGeom prst="rect">
+            <a:avLst/>
+          </a:prstGeom>
+          <a:noFill/>
+          <a:ln w="15875">
+            <a:solidFill>
+              <a:schemeClr val="accent1">
+                <a:shade val="95000"/>
+                <a:satMod val="105000"/>
+              </a:schemeClr>
+            </a:solidFill>
+          </a:ln>
+        </p:spPr>
+        <p:txBody>
+          <a:bodyPr wrap="square" lIns="82945" tIns="41473" rIns="82945" bIns="41473" rtlCol="0">
+            <a:spAutoFit/>
+          </a:bodyPr>
+          <a:lstStyle/>
+          <a:p>
+            <a:pPr algn="ctr"/>
+            <a:r>
+              <a:rPr lang="en-US" sz="1100" dirty="0" smtClean="0"/>
+              <a:t>Agent </a:t>
+            </a:r>
+          </a:p>
+          <a:p>
+            <a:pPr algn="ctr"/>
+            <a:r>
+              <a:rPr lang="en-US" sz="1100" dirty="0" smtClean="0"/>
+              <a:t>Dynamics</a:t>
+            </a:r>
+          </a:p>
+          <a:p>
+            <a:pPr algn="ctr"/>
+            <a:endParaRPr lang="tr-TR" sz="1100" dirty="0"/>
+          </a:p>
+        </p:txBody>
+      </p:sp>
+      <p:cxnSp>
+        <p:nvCxnSpPr>
+          <p:cNvPr id="51" name="Straight Arrow Connector 50"/>
+          <p:cNvCxnSpPr>
+            <a:stCxn id="35" idx="3"/>
+            <a:endCxn id="49" idx="1"/>
+          </p:cNvCxnSpPr>
+          <p:nvPr/>
+        </p:nvCxnSpPr>
+        <p:spPr>
+          <a:xfrm flipV="1">
+            <a:off x="7266959" y="3363294"/>
+            <a:ext cx="414720" cy="7694"/>
+          </a:xfrm>
+          <a:prstGeom prst="straightConnector1">
+            <a:avLst/>
+          </a:prstGeom>
+          <a:ln w="15875">
+            <a:tailEnd type="arrow"/>
+          </a:ln>
+        </p:spPr>
+        <p:style>
+          <a:lnRef idx="1">
+            <a:schemeClr val="accent1"/>
+          </a:lnRef>
+          <a:fillRef idx="0">
+            <a:schemeClr val="accent1"/>
+          </a:fillRef>
+          <a:effectRef idx="0">
+            <a:schemeClr val="accent1"/>
+          </a:effectRef>
+          <a:fontRef idx="minor">
+            <a:schemeClr val="tx1"/>
+          </a:fontRef>
+        </p:style>
+      </p:cxnSp>
+      <p:cxnSp>
+        <p:nvCxnSpPr>
+          <p:cNvPr id="61" name="Straight Connector 60"/>
+          <p:cNvCxnSpPr/>
+          <p:nvPr/>
+        </p:nvCxnSpPr>
+        <p:spPr>
+          <a:xfrm rot="10800000">
+            <a:off x="8649359" y="3355532"/>
+            <a:ext cx="207360" cy="1441"/>
+          </a:xfrm>
+          <a:prstGeom prst="line">
+            <a:avLst/>
+          </a:prstGeom>
+          <a:ln w="15875"/>
+        </p:spPr>
+        <p:style>
+          <a:lnRef idx="1">
+            <a:schemeClr val="accent1"/>
+          </a:lnRef>
+          <a:fillRef idx="0">
+            <a:schemeClr val="accent1"/>
+          </a:fillRef>
+          <a:effectRef idx="0">
+            <a:schemeClr val="accent1"/>
+          </a:effectRef>
+          <a:fontRef idx="minor">
+            <a:schemeClr val="tx1"/>
+          </a:fontRef>
+        </p:style>
+      </p:cxnSp>
+      <p:cxnSp>
+        <p:nvCxnSpPr>
+          <p:cNvPr id="63" name="Straight Connector 62"/>
+          <p:cNvCxnSpPr/>
+          <p:nvPr/>
+        </p:nvCxnSpPr>
+        <p:spPr>
+          <a:xfrm rot="5400000">
+            <a:off x="8061756" y="4152078"/>
+            <a:ext cx="1589927" cy="1440"/>
+          </a:xfrm>
+          <a:prstGeom prst="line">
+            <a:avLst/>
+          </a:prstGeom>
+          <a:ln w="15875"/>
+        </p:spPr>
+        <p:style>
+          <a:lnRef idx="1">
+            <a:schemeClr val="accent1"/>
+          </a:lnRef>
+          <a:fillRef idx="0">
+            <a:schemeClr val="accent1"/>
+          </a:fillRef>
+          <a:effectRef idx="0">
+            <a:schemeClr val="accent1"/>
+          </a:effectRef>
+          <a:fontRef idx="minor">
+            <a:schemeClr val="tx1"/>
+          </a:fontRef>
+        </p:style>
+      </p:cxnSp>
+      <p:cxnSp>
+        <p:nvCxnSpPr>
+          <p:cNvPr id="65" name="Straight Connector 64"/>
+          <p:cNvCxnSpPr/>
+          <p:nvPr/>
+        </p:nvCxnSpPr>
+        <p:spPr>
+          <a:xfrm rot="10800000" flipV="1">
+            <a:off x="216719" y="4949202"/>
+            <a:ext cx="8640000" cy="19298"/>
+          </a:xfrm>
+          <a:prstGeom prst="line">
+            <a:avLst/>
+          </a:prstGeom>
+          <a:ln w="15875"/>
+        </p:spPr>
+        <p:style>
+          <a:lnRef idx="1">
+            <a:schemeClr val="accent1"/>
+          </a:lnRef>
+          <a:fillRef idx="0">
+            <a:schemeClr val="accent1"/>
+          </a:fillRef>
+          <a:effectRef idx="0">
+            <a:schemeClr val="accent1"/>
+          </a:effectRef>
+          <a:fontRef idx="minor">
+            <a:schemeClr val="tx1"/>
+          </a:fontRef>
+        </p:style>
+      </p:cxnSp>
+      <p:cxnSp>
+        <p:nvCxnSpPr>
+          <p:cNvPr id="67" name="Straight Connector 66"/>
+          <p:cNvCxnSpPr/>
+          <p:nvPr/>
+        </p:nvCxnSpPr>
+        <p:spPr>
+          <a:xfrm rot="5400000" flipH="1" flipV="1">
+            <a:off x="-577524" y="4172816"/>
+            <a:ext cx="1589927" cy="1440"/>
+          </a:xfrm>
+          <a:prstGeom prst="line">
+            <a:avLst/>
+          </a:prstGeom>
+          <a:ln w="15875"/>
+        </p:spPr>
+        <p:style>
+          <a:lnRef idx="1">
+            <a:schemeClr val="accent1"/>
+          </a:lnRef>
+          <a:fillRef idx="0">
+            <a:schemeClr val="accent1"/>
+          </a:fillRef>
+          <a:effectRef idx="0">
+            <a:schemeClr val="accent1"/>
+          </a:effectRef>
+          <a:fontRef idx="minor">
+            <a:schemeClr val="tx1"/>
+          </a:fontRef>
+        </p:style>
+      </p:cxnSp>
+      <p:cxnSp>
+        <p:nvCxnSpPr>
+          <p:cNvPr id="69" name="Straight Arrow Connector 68"/>
+          <p:cNvCxnSpPr/>
+          <p:nvPr/>
+        </p:nvCxnSpPr>
+        <p:spPr>
+          <a:xfrm>
+            <a:off x="216719" y="3378573"/>
+            <a:ext cx="829440" cy="1441"/>
+          </a:xfrm>
+          <a:prstGeom prst="straightConnector1">
+            <a:avLst/>
+          </a:prstGeom>
+          <a:ln w="15875">
+            <a:tailEnd type="arrow"/>
+          </a:ln>
+        </p:spPr>
+        <p:style>
+          <a:lnRef idx="1">
+            <a:schemeClr val="accent1"/>
+          </a:lnRef>
+          <a:fillRef idx="0">
+            <a:schemeClr val="accent1"/>
+          </a:fillRef>
+          <a:effectRef idx="0">
+            <a:schemeClr val="accent1"/>
+          </a:effectRef>
+          <a:fontRef idx="minor">
+            <a:schemeClr val="tx1"/>
+          </a:fontRef>
+        </p:style>
+      </p:cxnSp>
+      <p:cxnSp>
+        <p:nvCxnSpPr>
+          <p:cNvPr id="73" name="Straight Arrow Connector 72"/>
+          <p:cNvCxnSpPr/>
+          <p:nvPr/>
+        </p:nvCxnSpPr>
+        <p:spPr>
+          <a:xfrm>
+            <a:off x="216719" y="3862463"/>
+            <a:ext cx="829440" cy="1441"/>
+          </a:xfrm>
+          <a:prstGeom prst="straightConnector1">
+            <a:avLst/>
+          </a:prstGeom>
+          <a:ln w="15875">
+            <a:tailEnd type="arrow"/>
+          </a:ln>
+        </p:spPr>
+        <p:style>
+          <a:lnRef idx="1">
+            <a:schemeClr val="accent1"/>
+          </a:lnRef>
+          <a:fillRef idx="0">
+            <a:schemeClr val="accent1"/>
+          </a:fillRef>
+          <a:effectRef idx="0">
+            <a:schemeClr val="accent1"/>
+          </a:effectRef>
+          <a:fontRef idx="minor">
+            <a:schemeClr val="tx1"/>
+          </a:fontRef>
+        </p:style>
+      </p:cxnSp>
+      <p:cxnSp>
+        <p:nvCxnSpPr>
+          <p:cNvPr id="85" name="Straight Arrow Connector 84"/>
+          <p:cNvCxnSpPr/>
+          <p:nvPr/>
+        </p:nvCxnSpPr>
+        <p:spPr>
+          <a:xfrm>
+            <a:off x="2152079" y="3516827"/>
+            <a:ext cx="552960" cy="1441"/>
+          </a:xfrm>
+          <a:prstGeom prst="straightConnector1">
+            <a:avLst/>
+          </a:prstGeom>
+          <a:ln w="15875">
+            <a:tailEnd type="arrow"/>
+          </a:ln>
+        </p:spPr>
+        <p:style>
+          <a:lnRef idx="1">
+            <a:schemeClr val="accent1"/>
+          </a:lnRef>
+          <a:fillRef idx="0">
+            <a:schemeClr val="accent1"/>
+          </a:fillRef>
+          <a:effectRef idx="0">
+            <a:schemeClr val="accent1"/>
+          </a:effectRef>
+          <a:fontRef idx="minor">
+            <a:schemeClr val="tx1"/>
+          </a:fontRef>
+        </p:style>
+      </p:cxnSp>
+      <p:sp>
+        <p:nvSpPr>
+          <p:cNvPr id="86" name="TextBox 85"/>
+          <p:cNvSpPr txBox="1"/>
+          <p:nvPr/>
+        </p:nvSpPr>
+        <p:spPr>
+          <a:xfrm>
+            <a:off x="216720" y="3226493"/>
+            <a:ext cx="760765" cy="195447"/>
+          </a:xfrm>
+          <a:prstGeom prst="rect">
+            <a:avLst/>
+          </a:prstGeom>
+          <a:noFill/>
+        </p:spPr>
+        <p:txBody>
+          <a:bodyPr wrap="none" lIns="82945" tIns="41473" rIns="82945" bIns="41473" rtlCol="0">
+            <a:spAutoFit/>
+          </a:bodyPr>
+          <a:lstStyle/>
+          <a:p>
+            <a:pPr algn="ctr"/>
+            <a:r>
+              <a:rPr lang="en-US" sz="700" b="1" dirty="0" smtClean="0"/>
+              <a:t>Acc. Sensors</a:t>
+            </a:r>
+            <a:endParaRPr lang="tr-TR" sz="700" b="1" dirty="0"/>
+          </a:p>
+        </p:txBody>
+      </p:sp>
+      <p:sp>
+        <p:nvSpPr>
+          <p:cNvPr id="87" name="TextBox 86"/>
+          <p:cNvSpPr txBox="1"/>
+          <p:nvPr/>
+        </p:nvSpPr>
+        <p:spPr>
+          <a:xfrm>
+            <a:off x="195983" y="3468438"/>
+            <a:ext cx="807296" cy="195447"/>
+          </a:xfrm>
+          <a:prstGeom prst="rect">
+            <a:avLst/>
+          </a:prstGeom>
+          <a:noFill/>
+        </p:spPr>
+        <p:txBody>
+          <a:bodyPr wrap="none" lIns="82945" tIns="41473" rIns="82945" bIns="41473" rtlCol="0">
+            <a:spAutoFit/>
+          </a:bodyPr>
+          <a:lstStyle/>
+          <a:p>
+            <a:pPr algn="ctr"/>
+            <a:r>
+              <a:rPr lang="en-US" sz="700" b="1" dirty="0" smtClean="0"/>
+              <a:t>Gyro Sensors</a:t>
+            </a:r>
+            <a:endParaRPr lang="tr-TR" sz="700" b="1" dirty="0"/>
+          </a:p>
+        </p:txBody>
+      </p:sp>
+      <p:cxnSp>
+        <p:nvCxnSpPr>
+          <p:cNvPr id="91" name="Straight Arrow Connector 90"/>
+          <p:cNvCxnSpPr/>
+          <p:nvPr/>
+        </p:nvCxnSpPr>
+        <p:spPr>
+          <a:xfrm>
+            <a:off x="216719" y="3620518"/>
+            <a:ext cx="829440" cy="1441"/>
+          </a:xfrm>
+          <a:prstGeom prst="straightConnector1">
+            <a:avLst/>
+          </a:prstGeom>
+          <a:ln w="15875">
+            <a:tailEnd type="arrow"/>
+          </a:ln>
+        </p:spPr>
+        <p:style>
+          <a:lnRef idx="1">
+            <a:schemeClr val="accent1"/>
+          </a:lnRef>
+          <a:fillRef idx="0">
+            <a:schemeClr val="accent1"/>
+          </a:fillRef>
+          <a:effectRef idx="0">
+            <a:schemeClr val="accent1"/>
+          </a:effectRef>
+          <a:fontRef idx="minor">
+            <a:schemeClr val="tx1"/>
+          </a:fontRef>
+        </p:style>
+      </p:cxnSp>
+      <p:sp>
+        <p:nvSpPr>
+          <p:cNvPr id="93" name="TextBox 92"/>
+          <p:cNvSpPr txBox="1"/>
+          <p:nvPr/>
+        </p:nvSpPr>
+        <p:spPr>
+          <a:xfrm>
+            <a:off x="230543" y="3710384"/>
+            <a:ext cx="783063" cy="191478"/>
+          </a:xfrm>
+          <a:prstGeom prst="rect">
+            <a:avLst/>
+          </a:prstGeom>
+          <a:noFill/>
+        </p:spPr>
+        <p:txBody>
+          <a:bodyPr wrap="none" lIns="82945" tIns="41473" rIns="82945" bIns="41473" rtlCol="0">
+            <a:spAutoFit/>
+          </a:bodyPr>
+          <a:lstStyle/>
+          <a:p>
+            <a:pPr algn="ctr"/>
+            <a:r>
+              <a:rPr lang="en-US" sz="700" b="1" dirty="0" smtClean="0"/>
+              <a:t>Mag. Sensors</a:t>
+            </a:r>
+            <a:endParaRPr lang="tr-TR" sz="700" b="1" dirty="0"/>
+          </a:p>
+        </p:txBody>
+      </p:sp>
+      <p:sp>
+        <p:nvSpPr>
+          <p:cNvPr id="95" name="TextBox 94"/>
+          <p:cNvSpPr txBox="1"/>
+          <p:nvPr/>
+        </p:nvSpPr>
+        <p:spPr>
+          <a:xfrm>
+            <a:off x="1232784" y="1629653"/>
+            <a:ext cx="1045957" cy="191478"/>
+          </a:xfrm>
+          <a:prstGeom prst="rect">
+            <a:avLst/>
+          </a:prstGeom>
+          <a:noFill/>
+        </p:spPr>
+        <p:txBody>
+          <a:bodyPr wrap="none" lIns="82945" tIns="41473" rIns="82945" bIns="41473" rtlCol="0">
+            <a:spAutoFit/>
+          </a:bodyPr>
+          <a:lstStyle/>
+          <a:p>
+            <a:pPr algn="ctr"/>
+            <a:r>
+              <a:rPr lang="en-US" sz="700" b="1" dirty="0" smtClean="0"/>
+              <a:t>Ultrasonic Sensors</a:t>
+            </a:r>
+            <a:endParaRPr lang="tr-TR" sz="700" b="1" dirty="0"/>
+          </a:p>
+        </p:txBody>
+      </p:sp>
+      <p:cxnSp>
+        <p:nvCxnSpPr>
+          <p:cNvPr id="99" name="Straight Arrow Connector 98"/>
+          <p:cNvCxnSpPr/>
+          <p:nvPr/>
+        </p:nvCxnSpPr>
+        <p:spPr>
+          <a:xfrm>
+            <a:off x="1460879" y="1788646"/>
+            <a:ext cx="829440" cy="1441"/>
+          </a:xfrm>
+          <a:prstGeom prst="straightConnector1">
+            <a:avLst/>
+          </a:prstGeom>
+          <a:ln w="15875">
+            <a:tailEnd type="arrow"/>
+          </a:ln>
+        </p:spPr>
+        <p:style>
+          <a:lnRef idx="1">
+            <a:schemeClr val="accent1"/>
+          </a:lnRef>
+          <a:fillRef idx="0">
+            <a:schemeClr val="accent1"/>
+          </a:fillRef>
+          <a:effectRef idx="0">
+            <a:schemeClr val="accent1"/>
+          </a:effectRef>
+          <a:fontRef idx="minor">
+            <a:schemeClr val="tx1"/>
+          </a:fontRef>
+        </p:style>
+      </p:cxnSp>
+      <p:cxnSp>
+        <p:nvCxnSpPr>
+          <p:cNvPr id="102" name="Straight Connector 101"/>
+          <p:cNvCxnSpPr/>
+          <p:nvPr/>
+        </p:nvCxnSpPr>
+        <p:spPr>
+          <a:xfrm rot="16200000" flipH="1">
+            <a:off x="3549667" y="3224927"/>
+            <a:ext cx="3882542" cy="42198"/>
+          </a:xfrm>
+          <a:prstGeom prst="line">
+            <a:avLst/>
+          </a:prstGeom>
+          <a:ln w="22225">
+            <a:solidFill>
+              <a:srgbClr val="FF0000"/>
+            </a:solidFill>
+            <a:prstDash val="dashDot"/>
+          </a:ln>
+        </p:spPr>
+        <p:style>
+          <a:lnRef idx="1">
+            <a:schemeClr val="accent1"/>
+          </a:lnRef>
+          <a:fillRef idx="0">
+            <a:schemeClr val="accent1"/>
+          </a:fillRef>
+          <a:effectRef idx="0">
+            <a:schemeClr val="accent1"/>
+          </a:effectRef>
+          <a:fontRef idx="minor">
+            <a:schemeClr val="tx1"/>
+          </a:fontRef>
+        </p:style>
+      </p:cxnSp>
+      <p:sp>
+        <p:nvSpPr>
+          <p:cNvPr id="103" name="TextBox 102"/>
+          <p:cNvSpPr txBox="1"/>
+          <p:nvPr/>
+        </p:nvSpPr>
+        <p:spPr>
+          <a:xfrm>
+            <a:off x="1875599" y="1166501"/>
+            <a:ext cx="2073600" cy="283811"/>
+          </a:xfrm>
+          <a:prstGeom prst="rect">
+            <a:avLst/>
+          </a:prstGeom>
+          <a:noFill/>
+        </p:spPr>
+        <p:txBody>
+          <a:bodyPr wrap="square" lIns="82945" tIns="41473" rIns="82945" bIns="41473" rtlCol="0">
+            <a:spAutoFit/>
+          </a:bodyPr>
+          <a:lstStyle/>
+          <a:p>
+            <a:r>
+              <a:rPr lang="en-US" sz="1300" dirty="0" smtClean="0"/>
+              <a:t>LOCAL POSITIONING</a:t>
+            </a:r>
+            <a:endParaRPr lang="tr-TR" sz="1300" dirty="0"/>
+          </a:p>
+        </p:txBody>
+      </p:sp>
+      <p:sp>
+        <p:nvSpPr>
+          <p:cNvPr id="104" name="TextBox 103"/>
+          <p:cNvSpPr txBox="1"/>
+          <p:nvPr/>
+        </p:nvSpPr>
+        <p:spPr>
+          <a:xfrm>
+            <a:off x="6299279" y="1166501"/>
+            <a:ext cx="2211840" cy="283811"/>
+          </a:xfrm>
+          <a:prstGeom prst="rect">
+            <a:avLst/>
+          </a:prstGeom>
+          <a:noFill/>
+        </p:spPr>
+        <p:txBody>
+          <a:bodyPr wrap="square" lIns="82945" tIns="41473" rIns="82945" bIns="41473" rtlCol="0">
+            <a:spAutoFit/>
+          </a:bodyPr>
+          <a:lstStyle/>
+          <a:p>
+            <a:r>
+              <a:rPr lang="en-US" sz="1300" dirty="0" smtClean="0"/>
+              <a:t>FORMATION CONTROL</a:t>
+            </a:r>
+            <a:endParaRPr lang="tr-TR" sz="1300" dirty="0"/>
+          </a:p>
+        </p:txBody>
+      </p:sp>
+      <p:cxnSp>
+        <p:nvCxnSpPr>
+          <p:cNvPr id="105" name="Straight Connector 104"/>
+          <p:cNvCxnSpPr/>
+          <p:nvPr/>
+        </p:nvCxnSpPr>
+        <p:spPr>
+          <a:xfrm>
+            <a:off x="2113472" y="2130725"/>
+            <a:ext cx="181154" cy="1588"/>
+          </a:xfrm>
+          <a:prstGeom prst="line">
+            <a:avLst/>
+          </a:prstGeom>
+          <a:ln w="15875"/>
+        </p:spPr>
+        <p:style>
+          <a:lnRef idx="1">
+            <a:schemeClr val="accent1"/>
+          </a:lnRef>
+          <a:fillRef idx="0">
+            <a:schemeClr val="accent1"/>
+          </a:fillRef>
+          <a:effectRef idx="0">
+            <a:schemeClr val="accent1"/>
+          </a:effectRef>
+          <a:fontRef idx="minor">
+            <a:schemeClr val="tx1"/>
+          </a:fontRef>
+        </p:style>
+      </p:cxnSp>
     </p:spTree>
   </p:cSld>
   <p:clrMapOvr>

</xml_diff>